<commit_message>
add new content to Lecture 7
</commit_message>
<xml_diff>
--- a/course/compiler/LectureNotes/(Spring2018)Lecture7.pptx
+++ b/course/compiler/LectureNotes/(Spring2018)Lecture7.pptx
@@ -5,10 +5,10 @@
     <p:sldMasterId id="2147483648" r:id="rId4"/>
   </p:sldMasterIdLst>
   <p:notesMasterIdLst>
-    <p:notesMasterId r:id="rId26"/>
+    <p:notesMasterId r:id="rId45"/>
   </p:notesMasterIdLst>
   <p:handoutMasterIdLst>
-    <p:handoutMasterId r:id="rId27"/>
+    <p:handoutMasterId r:id="rId46"/>
   </p:handoutMasterIdLst>
   <p:sldIdLst>
     <p:sldId id="256" r:id="rId5"/>
@@ -32,6 +32,25 @@
     <p:sldId id="294" r:id="rId23"/>
     <p:sldId id="295" r:id="rId24"/>
     <p:sldId id="296" r:id="rId25"/>
+    <p:sldId id="297" r:id="rId26"/>
+    <p:sldId id="298" r:id="rId27"/>
+    <p:sldId id="299" r:id="rId28"/>
+    <p:sldId id="300" r:id="rId29"/>
+    <p:sldId id="302" r:id="rId30"/>
+    <p:sldId id="301" r:id="rId31"/>
+    <p:sldId id="303" r:id="rId32"/>
+    <p:sldId id="304" r:id="rId33"/>
+    <p:sldId id="305" r:id="rId34"/>
+    <p:sldId id="306" r:id="rId35"/>
+    <p:sldId id="307" r:id="rId36"/>
+    <p:sldId id="308" r:id="rId37"/>
+    <p:sldId id="309" r:id="rId38"/>
+    <p:sldId id="310" r:id="rId39"/>
+    <p:sldId id="311" r:id="rId40"/>
+    <p:sldId id="312" r:id="rId41"/>
+    <p:sldId id="313" r:id="rId42"/>
+    <p:sldId id="314" r:id="rId43"/>
+    <p:sldId id="315" r:id="rId44"/>
   </p:sldIdLst>
   <p:sldSz cx="9144000" cy="6858000" type="screen4x3"/>
   <p:notesSz cx="6858000" cy="9144000"/>
@@ -247,7 +266,7 @@
                 <a:ea typeface="微软雅黑" panose="020B0503020204020204" pitchFamily="34" charset="-122"/>
               </a:rPr>
               <a:pPr algn="r" rtl="0"/>
-              <a:t>2017/6/3</a:t>
+              <a:t>2018/6/6</a:t>
             </a:fld>
             <a:endParaRPr lang="zh-CN" altLang="en-US" dirty="0">
               <a:latin typeface="微软雅黑" panose="020B0503020204020204" pitchFamily="34" charset="-122"/>
@@ -434,7 +453,7 @@
             <a:fld id="{229B22C3-6CB1-491B-AD00-E0837F23A3F3}" type="datetime1">
               <a:rPr lang="zh-CN" altLang="en-US" smtClean="0"/>
               <a:pPr/>
-              <a:t>2017/6/3</a:t>
+              <a:t>2018/6/6</a:t>
             </a:fld>
             <a:endParaRPr lang="zh-CN" altLang="en-US" dirty="0"/>
           </a:p>
@@ -1030,7 +1049,7 @@
             <a:fld id="{A7392AAC-879E-4B39-8824-AF6B730A809E}" type="datetime1">
               <a:rPr lang="zh-CN" altLang="en-US" smtClean="0"/>
               <a:pPr/>
-              <a:t>2017/6/3</a:t>
+              <a:t>2018/6/6</a:t>
             </a:fld>
             <a:endParaRPr lang="zh-CN" altLang="en-US" dirty="0"/>
           </a:p>
@@ -1371,7 +1390,7 @@
             <a:fld id="{7118C275-B304-48F5-8C4F-015CBCF4E7C1}" type="datetime1">
               <a:rPr lang="zh-CN" altLang="en-US" smtClean="0"/>
               <a:pPr/>
-              <a:t>2017/6/3</a:t>
+              <a:t>2018/6/6</a:t>
             </a:fld>
             <a:r>
               <a:rPr lang="zh-CN" altLang="en-US" dirty="0"/>
@@ -1577,7 +1596,7 @@
             <a:fld id="{98791AA9-DDCB-4BA8-AD1D-963A3AA00622}" type="datetime1">
               <a:rPr lang="zh-CN" altLang="en-US" smtClean="0"/>
               <a:pPr/>
-              <a:t>2017/6/3</a:t>
+              <a:t>2018/6/6</a:t>
             </a:fld>
             <a:endParaRPr lang="zh-CN" altLang="en-US" dirty="0"/>
           </a:p>
@@ -1781,7 +1800,7 @@
             <a:fld id="{9170426F-E661-472B-BE42-25E072CD46D9}" type="datetime1">
               <a:rPr lang="zh-CN" altLang="en-US" smtClean="0"/>
               <a:pPr/>
-              <a:t>2017/6/3</a:t>
+              <a:t>2018/6/6</a:t>
             </a:fld>
             <a:endParaRPr lang="zh-CN" altLang="en-US" dirty="0"/>
           </a:p>
@@ -2103,7 +2122,7 @@
             <a:fld id="{9BA78444-6099-4C0A-A3A9-C6F3C5D7F289}" type="datetime1">
               <a:rPr lang="zh-CN" altLang="en-US" smtClean="0"/>
               <a:pPr/>
-              <a:t>2017/6/3</a:t>
+              <a:t>2018/6/6</a:t>
             </a:fld>
             <a:endParaRPr lang="zh-CN" altLang="en-US" dirty="0"/>
           </a:p>
@@ -3215,7 +3234,7 @@
             <a:fld id="{AF5F6A19-70BF-4380-9A40-68C9536408C6}" type="datetime1">
               <a:rPr lang="zh-CN" altLang="en-US" smtClean="0"/>
               <a:pPr/>
-              <a:t>2017/6/3</a:t>
+              <a:t>2018/6/6</a:t>
             </a:fld>
             <a:endParaRPr lang="zh-CN" altLang="en-US" dirty="0"/>
           </a:p>
@@ -3614,7 +3633,7 @@
             <a:fld id="{6017EB90-196C-4C15-BD31-13E0E0436C73}" type="datetime1">
               <a:rPr lang="zh-CN" altLang="en-US" smtClean="0"/>
               <a:pPr/>
-              <a:t>2017/6/3</a:t>
+              <a:t>2018/6/6</a:t>
             </a:fld>
             <a:r>
               <a:rPr lang="zh-CN" altLang="en-US" dirty="0"/>
@@ -4096,7 +4115,7 @@
             <a:fld id="{C2EC0F41-B48F-4298-A7F6-618EB9D22195}" type="datetime1">
               <a:rPr lang="zh-CN" altLang="en-US" smtClean="0"/>
               <a:pPr/>
-              <a:t>2017/6/3</a:t>
+              <a:t>2018/6/6</a:t>
             </a:fld>
             <a:endParaRPr lang="zh-CN" altLang="en-US" dirty="0"/>
           </a:p>
@@ -4247,7 +4266,7 @@
             <a:fld id="{7DB2D836-56E8-4B15-857C-14B1A5B3B67B}" type="datetime1">
               <a:rPr lang="zh-CN" altLang="en-US" smtClean="0"/>
               <a:pPr/>
-              <a:t>2017/6/3</a:t>
+              <a:t>2018/6/6</a:t>
             </a:fld>
             <a:endParaRPr lang="zh-CN" altLang="en-US" dirty="0"/>
           </a:p>
@@ -4365,7 +4384,7 @@
             <a:fld id="{038D929F-7D8C-4CC3-8AC7-BB9B8FE2DEBF}" type="datetime1">
               <a:rPr lang="zh-CN" altLang="en-US" smtClean="0"/>
               <a:pPr/>
-              <a:t>2017/6/3</a:t>
+              <a:t>2018/6/6</a:t>
             </a:fld>
             <a:endParaRPr lang="zh-CN" altLang="en-US" dirty="0"/>
           </a:p>
@@ -4668,7 +4687,7 @@
             <a:fld id="{F7892ACC-8BC8-4C9E-9D2B-0669DA5038B6}" type="datetime1">
               <a:rPr lang="zh-CN" altLang="en-US" smtClean="0"/>
               <a:pPr/>
-              <a:t>2017/6/3</a:t>
+              <a:t>2018/6/6</a:t>
             </a:fld>
             <a:endParaRPr lang="zh-CN" altLang="en-US" dirty="0"/>
           </a:p>
@@ -4934,7 +4953,7 @@
             <a:fld id="{660B6A15-7713-4A08-BBFD-F297CCC2B976}" type="datetime1">
               <a:rPr lang="zh-CN" altLang="en-US" smtClean="0"/>
               <a:pPr/>
-              <a:t>2017/6/3</a:t>
+              <a:t>2018/6/6</a:t>
             </a:fld>
             <a:r>
               <a:rPr lang="zh-CN" altLang="en-US" dirty="0"/>
@@ -7786,8 +7805,8 @@
         </p:nvSpPr>
         <p:spPr>
           <a:xfrm>
-            <a:off x="828675" y="1600199"/>
-            <a:ext cx="7486650" cy="4365171"/>
+            <a:off x="828675" y="1382487"/>
+            <a:ext cx="7486650" cy="4844142"/>
           </a:xfrm>
         </p:spPr>
         <p:txBody>
@@ -7977,7 +7996,7 @@
         </p:blipFill>
         <p:spPr>
           <a:xfrm>
-            <a:off x="1876193" y="2831048"/>
+            <a:off x="1876193" y="2667762"/>
             <a:ext cx="5390476" cy="1304762"/>
           </a:xfrm>
           <a:prstGeom prst="rect">
@@ -8029,6 +8048,46 @@
       </p:grpSpPr>
       <p:sp>
         <p:nvSpPr>
+          <p:cNvPr id="8" name="矩形 7"/>
+          <p:cNvSpPr/>
+          <p:nvPr/>
+        </p:nvSpPr>
+        <p:spPr>
+          <a:xfrm>
+            <a:off x="5848142" y="3940626"/>
+            <a:ext cx="3295857" cy="1469572"/>
+          </a:xfrm>
+          <a:prstGeom prst="rect">
+            <a:avLst/>
+          </a:prstGeom>
+        </p:spPr>
+        <p:style>
+          <a:lnRef idx="2">
+            <a:schemeClr val="accent1">
+              <a:shade val="50000"/>
+            </a:schemeClr>
+          </a:lnRef>
+          <a:fillRef idx="1">
+            <a:schemeClr val="accent1"/>
+          </a:fillRef>
+          <a:effectRef idx="0">
+            <a:schemeClr val="accent1"/>
+          </a:effectRef>
+          <a:fontRef idx="minor">
+            <a:schemeClr val="lt1"/>
+          </a:fontRef>
+        </p:style>
+        <p:txBody>
+          <a:bodyPr rtlCol="0" anchor="ctr"/>
+          <a:lstStyle/>
+          <a:p>
+            <a:pPr algn="ctr"/>
+            <a:endParaRPr lang="zh-CN" altLang="en-US"/>
+          </a:p>
+        </p:txBody>
+      </p:sp>
+      <p:sp>
+        <p:nvSpPr>
           <p:cNvPr id="2" name="标题 1"/>
           <p:cNvSpPr>
             <a:spLocks noGrp="1"/>
@@ -8068,19 +8127,2473 @@
             <p:ph idx="1"/>
           </p:nvPr>
         </p:nvSpPr>
+        <p:spPr>
+          <a:xfrm>
+            <a:off x="828675" y="1600200"/>
+            <a:ext cx="7486650" cy="1480457"/>
+          </a:xfrm>
+        </p:spPr>
+        <p:txBody>
+          <a:bodyPr/>
+          <a:lstStyle/>
+          <a:p>
+            <a:r>
+              <a:rPr lang="en-US" altLang="zh-CN" dirty="0"/>
+              <a:t>The syntax-directed definition in </a:t>
+            </a:r>
+            <a:r>
+              <a:rPr lang="en-US" altLang="zh-CN" dirty="0" smtClean="0"/>
+              <a:t>the following table </a:t>
+            </a:r>
+            <a:r>
+              <a:rPr lang="en-US" altLang="zh-CN" dirty="0"/>
+              <a:t>builds up the three-address code </a:t>
+            </a:r>
+            <a:r>
+              <a:rPr lang="en-US" altLang="zh-CN" dirty="0" smtClean="0"/>
+              <a:t>for an </a:t>
+            </a:r>
+            <a:r>
+              <a:rPr lang="en-US" altLang="zh-CN" dirty="0"/>
+              <a:t>assignment statement </a:t>
+            </a:r>
+            <a:r>
+              <a:rPr lang="en-US" altLang="zh-CN" i="1" dirty="0"/>
+              <a:t>S</a:t>
+            </a:r>
+            <a:r>
+              <a:rPr lang="en-US" altLang="zh-CN" dirty="0"/>
+              <a:t> using attribute code for </a:t>
+            </a:r>
+            <a:r>
+              <a:rPr lang="en-US" altLang="zh-CN" i="1" dirty="0"/>
+              <a:t>S</a:t>
+            </a:r>
+            <a:r>
+              <a:rPr lang="en-US" altLang="zh-CN" dirty="0"/>
+              <a:t> and attributes </a:t>
+            </a:r>
+            <a:r>
+              <a:rPr lang="en-US" altLang="zh-CN" i="1" dirty="0" err="1"/>
+              <a:t>addr</a:t>
+            </a:r>
+            <a:r>
+              <a:rPr lang="en-US" altLang="zh-CN" dirty="0"/>
+              <a:t> </a:t>
+            </a:r>
+            <a:r>
+              <a:rPr lang="en-US" altLang="zh-CN" dirty="0" smtClean="0"/>
+              <a:t>and </a:t>
+            </a:r>
+            <a:r>
+              <a:rPr lang="en-US" altLang="zh-CN" i="1" dirty="0" smtClean="0"/>
+              <a:t>code</a:t>
+            </a:r>
+            <a:r>
+              <a:rPr lang="en-US" altLang="zh-CN" dirty="0" smtClean="0"/>
+              <a:t> </a:t>
+            </a:r>
+            <a:r>
+              <a:rPr lang="en-US" altLang="zh-CN" dirty="0"/>
+              <a:t>for an expression </a:t>
+            </a:r>
+            <a:r>
+              <a:rPr lang="en-US" altLang="zh-CN" i="1" dirty="0"/>
+              <a:t>E</a:t>
+            </a:r>
+            <a:r>
+              <a:rPr lang="en-US" altLang="zh-CN" dirty="0"/>
+              <a:t>. Attributes </a:t>
+            </a:r>
+            <a:r>
+              <a:rPr lang="en-US" altLang="zh-CN" i="1" dirty="0"/>
+              <a:t>S. code </a:t>
+            </a:r>
+            <a:r>
+              <a:rPr lang="en-US" altLang="zh-CN" dirty="0"/>
+              <a:t>and </a:t>
+            </a:r>
+            <a:r>
+              <a:rPr lang="en-US" altLang="zh-CN" i="1" dirty="0"/>
+              <a:t>E. code </a:t>
+            </a:r>
+            <a:r>
+              <a:rPr lang="en-US" altLang="zh-CN" dirty="0"/>
+              <a:t>denote the </a:t>
+            </a:r>
+            <a:r>
+              <a:rPr lang="en-US" altLang="zh-CN" dirty="0" smtClean="0"/>
+              <a:t>three-address code </a:t>
+            </a:r>
+            <a:r>
+              <a:rPr lang="en-US" altLang="zh-CN" dirty="0"/>
+              <a:t>for </a:t>
+            </a:r>
+            <a:r>
+              <a:rPr lang="en-US" altLang="zh-CN" i="1" dirty="0"/>
+              <a:t>S</a:t>
+            </a:r>
+            <a:r>
+              <a:rPr lang="en-US" altLang="zh-CN" dirty="0"/>
+              <a:t> and </a:t>
+            </a:r>
+            <a:r>
+              <a:rPr lang="en-US" altLang="zh-CN" i="1" dirty="0"/>
+              <a:t>E</a:t>
+            </a:r>
+            <a:r>
+              <a:rPr lang="en-US" altLang="zh-CN" dirty="0"/>
+              <a:t>, respectively. Attribute </a:t>
+            </a:r>
+            <a:r>
+              <a:rPr lang="en-US" altLang="zh-CN" i="1" dirty="0" err="1"/>
+              <a:t>E.addr</a:t>
+            </a:r>
+            <a:r>
+              <a:rPr lang="en-US" altLang="zh-CN" i="1" dirty="0"/>
+              <a:t> </a:t>
+            </a:r>
+            <a:r>
+              <a:rPr lang="en-US" altLang="zh-CN" dirty="0"/>
+              <a:t>denotes the address that will hold the value of </a:t>
+            </a:r>
+            <a:r>
+              <a:rPr lang="en-US" altLang="zh-CN" i="1" dirty="0"/>
+              <a:t>E</a:t>
+            </a:r>
+            <a:r>
+              <a:rPr lang="en-US" altLang="zh-CN" dirty="0"/>
+              <a:t>.</a:t>
+            </a:r>
+            <a:endParaRPr lang="zh-CN" altLang="en-US" dirty="0"/>
+          </a:p>
+        </p:txBody>
+      </p:sp>
+      <p:pic>
+        <p:nvPicPr>
+          <p:cNvPr id="4" name="图片 3"/>
+          <p:cNvPicPr>
+            <a:picLocks noChangeAspect="1"/>
+          </p:cNvPicPr>
+          <p:nvPr/>
+        </p:nvPicPr>
+        <p:blipFill>
+          <a:blip r:embed="rId2"/>
+          <a:stretch>
+            <a:fillRect/>
+          </a:stretch>
+        </p:blipFill>
+        <p:spPr>
+          <a:xfrm>
+            <a:off x="315684" y="2699316"/>
+            <a:ext cx="5706630" cy="3997100"/>
+          </a:xfrm>
+          <a:prstGeom prst="rect">
+            <a:avLst/>
+          </a:prstGeom>
+        </p:spPr>
+      </p:pic>
+      <p:pic>
+        <p:nvPicPr>
+          <p:cNvPr id="6" name="图片 5"/>
+          <p:cNvPicPr>
+            <a:picLocks noChangeAspect="1"/>
+          </p:cNvPicPr>
+          <p:nvPr/>
+        </p:nvPicPr>
+        <p:blipFill>
+          <a:blip r:embed="rId3"/>
+          <a:stretch>
+            <a:fillRect/>
+          </a:stretch>
+        </p:blipFill>
+        <p:spPr>
+          <a:xfrm>
+            <a:off x="5943600" y="4061049"/>
+            <a:ext cx="3200400" cy="1228725"/>
+          </a:xfrm>
+          <a:prstGeom prst="rect">
+            <a:avLst/>
+          </a:prstGeom>
+        </p:spPr>
+      </p:pic>
+    </p:spTree>
+    <p:extLst>
+      <p:ext uri="{BB962C8B-B14F-4D97-AF65-F5344CB8AC3E}">
+        <p14:creationId xmlns:p14="http://schemas.microsoft.com/office/powerpoint/2010/main" val="1241107300"/>
+      </p:ext>
+    </p:extLst>
+  </p:cSld>
+  <p:clrMapOvr>
+    <a:masterClrMapping/>
+  </p:clrMapOvr>
+  <mc:AlternateContent xmlns:mc="http://schemas.openxmlformats.org/markup-compatibility/2006" xmlns:p14="http://schemas.microsoft.com/office/powerpoint/2010/main">
+    <mc:Choice Requires="p14">
+      <p:transition spd="med" p14:dur="700">
+        <p:fade/>
+      </p:transition>
+    </mc:Choice>
+    <mc:Fallback xmlns="">
+      <p:transition spd="med">
+        <p:fade/>
+      </p:transition>
+    </mc:Fallback>
+  </mc:AlternateContent>
+</p:sld>
+</file>
+
+<file path=ppt/slides/slide22.xml><?xml version="1.0" encoding="utf-8"?>
+<p:sld xmlns:a="http://schemas.openxmlformats.org/drawingml/2006/main" xmlns:r="http://schemas.openxmlformats.org/officeDocument/2006/relationships" xmlns:p="http://schemas.openxmlformats.org/presentationml/2006/main">
+  <p:cSld>
+    <p:spTree>
+      <p:nvGrpSpPr>
+        <p:cNvPr id="1" name=""/>
+        <p:cNvGrpSpPr/>
+        <p:nvPr/>
+      </p:nvGrpSpPr>
+      <p:grpSpPr>
+        <a:xfrm>
+          <a:off x="0" y="0"/>
+          <a:ext cx="0" cy="0"/>
+          <a:chOff x="0" y="0"/>
+          <a:chExt cx="0" cy="0"/>
+        </a:xfrm>
+      </p:grpSpPr>
+      <p:sp>
+        <p:nvSpPr>
+          <p:cNvPr id="2" name="标题 1"/>
+          <p:cNvSpPr>
+            <a:spLocks noGrp="1"/>
+          </p:cNvSpPr>
+          <p:nvPr>
+            <p:ph type="title"/>
+          </p:nvPr>
+        </p:nvSpPr>
         <p:spPr/>
         <p:txBody>
           <a:bodyPr/>
           <a:lstStyle/>
           <a:p>
-            <a:endParaRPr lang="zh-CN" altLang="en-US"/>
+            <a:r>
+              <a:rPr lang="en-US" altLang="zh-CN" dirty="0"/>
+              <a:t>7.4 Translation of </a:t>
+            </a:r>
+            <a:r>
+              <a:rPr lang="en-US" altLang="zh-CN" dirty="0" smtClean="0"/>
+              <a:t>Expressions-Incremental </a:t>
+            </a:r>
+            <a:r>
+              <a:rPr lang="en-US" altLang="zh-CN" dirty="0"/>
+              <a:t>Translation</a:t>
+            </a:r>
+            <a:endParaRPr lang="zh-CN" altLang="en-US" dirty="0"/>
+          </a:p>
+        </p:txBody>
+      </p:sp>
+      <p:sp>
+        <p:nvSpPr>
+          <p:cNvPr id="3" name="内容占位符 2"/>
+          <p:cNvSpPr>
+            <a:spLocks noGrp="1"/>
+          </p:cNvSpPr>
+          <p:nvPr>
+            <p:ph idx="1"/>
+          </p:nvPr>
+        </p:nvSpPr>
+        <p:spPr>
+          <a:xfrm>
+            <a:off x="828675" y="1600200"/>
+            <a:ext cx="7486650" cy="1545771"/>
+          </a:xfrm>
+        </p:spPr>
+        <p:txBody>
+          <a:bodyPr/>
+          <a:lstStyle/>
+          <a:p>
+            <a:r>
+              <a:rPr lang="en-US" altLang="zh-CN" dirty="0"/>
+              <a:t>Code attributes can be long strings, so they are usually generated </a:t>
+            </a:r>
+            <a:r>
+              <a:rPr lang="en-US" altLang="zh-CN" dirty="0" smtClean="0"/>
+              <a:t>incrementally. Thus </a:t>
+            </a:r>
+            <a:r>
+              <a:rPr lang="en-US" altLang="zh-CN" dirty="0"/>
+              <a:t>, instead of building up </a:t>
+            </a:r>
+            <a:r>
+              <a:rPr lang="en-US" altLang="zh-CN" i="1" dirty="0"/>
+              <a:t>E. </a:t>
+            </a:r>
+            <a:r>
+              <a:rPr lang="en-US" altLang="zh-CN" i="1" dirty="0" smtClean="0"/>
+              <a:t>code</a:t>
+            </a:r>
+            <a:r>
+              <a:rPr lang="en-US" altLang="zh-CN" dirty="0" smtClean="0"/>
+              <a:t>, </a:t>
+            </a:r>
+            <a:r>
+              <a:rPr lang="en-US" altLang="zh-CN" dirty="0"/>
+              <a:t>we can arrange to generate only the new three-address </a:t>
+            </a:r>
+            <a:r>
+              <a:rPr lang="en-US" altLang="zh-CN" dirty="0" smtClean="0"/>
+              <a:t>instructions, as </a:t>
+            </a:r>
+            <a:r>
+              <a:rPr lang="en-US" altLang="zh-CN" dirty="0"/>
+              <a:t>in </a:t>
+            </a:r>
+            <a:r>
+              <a:rPr lang="en-US" altLang="zh-CN" dirty="0" smtClean="0"/>
+              <a:t>the following </a:t>
+            </a:r>
+            <a:r>
+              <a:rPr lang="en-US" altLang="zh-CN" dirty="0"/>
+              <a:t>translation </a:t>
+            </a:r>
+            <a:r>
+              <a:rPr lang="en-US" altLang="zh-CN" dirty="0" smtClean="0"/>
+              <a:t>scheme. </a:t>
+            </a:r>
+            <a:r>
+              <a:rPr lang="en-US" altLang="zh-CN" dirty="0"/>
+              <a:t>In the incremental approach, </a:t>
+            </a:r>
+            <a:r>
+              <a:rPr lang="en-US" altLang="zh-CN" i="1" dirty="0">
+                <a:solidFill>
+                  <a:srgbClr val="7030A0"/>
+                </a:solidFill>
+              </a:rPr>
+              <a:t>gen</a:t>
+            </a:r>
+            <a:r>
+              <a:rPr lang="en-US" altLang="zh-CN" dirty="0"/>
+              <a:t> </a:t>
+            </a:r>
+            <a:r>
+              <a:rPr lang="en-US" altLang="zh-CN" dirty="0" smtClean="0"/>
+              <a:t>not only </a:t>
+            </a:r>
+            <a:r>
+              <a:rPr lang="en-US" altLang="zh-CN" dirty="0"/>
+              <a:t>constructs a three-address instruction, it appends the instruction to </a:t>
+            </a:r>
+            <a:r>
+              <a:rPr lang="en-US" altLang="zh-CN" dirty="0" smtClean="0"/>
+              <a:t>the sequence </a:t>
+            </a:r>
+            <a:r>
+              <a:rPr lang="en-US" altLang="zh-CN" dirty="0"/>
+              <a:t>of instructions generated so far. The sequence may either be </a:t>
+            </a:r>
+            <a:r>
+              <a:rPr lang="en-US" altLang="zh-CN" dirty="0" smtClean="0"/>
+              <a:t>retained in </a:t>
+            </a:r>
+            <a:r>
+              <a:rPr lang="en-US" altLang="zh-CN" dirty="0"/>
+              <a:t>memory for </a:t>
+            </a:r>
+            <a:r>
+              <a:rPr lang="en-US" altLang="zh-CN" dirty="0" smtClean="0"/>
+              <a:t>further </a:t>
+            </a:r>
+            <a:r>
+              <a:rPr lang="en-US" altLang="zh-CN" dirty="0"/>
+              <a:t>processing, or it may be output incrementally.</a:t>
+            </a:r>
+            <a:endParaRPr lang="zh-CN" altLang="en-US" dirty="0"/>
+          </a:p>
+        </p:txBody>
+      </p:sp>
+      <p:pic>
+        <p:nvPicPr>
+          <p:cNvPr id="4" name="图片 3"/>
+          <p:cNvPicPr>
+            <a:picLocks noChangeAspect="1"/>
+          </p:cNvPicPr>
+          <p:nvPr/>
+        </p:nvPicPr>
+        <p:blipFill>
+          <a:blip r:embed="rId2"/>
+          <a:stretch>
+            <a:fillRect/>
+          </a:stretch>
+        </p:blipFill>
+        <p:spPr>
+          <a:xfrm>
+            <a:off x="2637856" y="3320142"/>
+            <a:ext cx="4377104" cy="2242457"/>
+          </a:xfrm>
+          <a:prstGeom prst="rect">
+            <a:avLst/>
+          </a:prstGeom>
+        </p:spPr>
+      </p:pic>
+    </p:spTree>
+    <p:extLst>
+      <p:ext uri="{BB962C8B-B14F-4D97-AF65-F5344CB8AC3E}">
+        <p14:creationId xmlns:p14="http://schemas.microsoft.com/office/powerpoint/2010/main" val="3203362351"/>
+      </p:ext>
+    </p:extLst>
+  </p:cSld>
+  <p:clrMapOvr>
+    <a:masterClrMapping/>
+  </p:clrMapOvr>
+  <mc:AlternateContent xmlns:mc="http://schemas.openxmlformats.org/markup-compatibility/2006" xmlns:p14="http://schemas.microsoft.com/office/powerpoint/2010/main">
+    <mc:Choice Requires="p14">
+      <p:transition spd="med" p14:dur="700">
+        <p:fade/>
+      </p:transition>
+    </mc:Choice>
+    <mc:Fallback xmlns="">
+      <p:transition spd="med">
+        <p:fade/>
+      </p:transition>
+    </mc:Fallback>
+  </mc:AlternateContent>
+</p:sld>
+</file>
+
+<file path=ppt/slides/slide23.xml><?xml version="1.0" encoding="utf-8"?>
+<p:sld xmlns:a="http://schemas.openxmlformats.org/drawingml/2006/main" xmlns:r="http://schemas.openxmlformats.org/officeDocument/2006/relationships" xmlns:p="http://schemas.openxmlformats.org/presentationml/2006/main">
+  <p:cSld>
+    <p:spTree>
+      <p:nvGrpSpPr>
+        <p:cNvPr id="1" name=""/>
+        <p:cNvGrpSpPr/>
+        <p:nvPr/>
+      </p:nvGrpSpPr>
+      <p:grpSpPr>
+        <a:xfrm>
+          <a:off x="0" y="0"/>
+          <a:ext cx="0" cy="0"/>
+          <a:chOff x="0" y="0"/>
+          <a:chExt cx="0" cy="0"/>
+        </a:xfrm>
+      </p:grpSpPr>
+      <p:sp>
+        <p:nvSpPr>
+          <p:cNvPr id="2" name="标题 1"/>
+          <p:cNvSpPr>
+            <a:spLocks noGrp="1"/>
+          </p:cNvSpPr>
+          <p:nvPr>
+            <p:ph type="title"/>
+          </p:nvPr>
+        </p:nvSpPr>
+        <p:spPr/>
+        <p:txBody>
+          <a:bodyPr/>
+          <a:lstStyle/>
+          <a:p>
+            <a:r>
+              <a:rPr lang="en-US" altLang="zh-CN" dirty="0"/>
+              <a:t>7.4 Translation of Expressions-Addressing Array Elements</a:t>
+            </a:r>
+            <a:endParaRPr lang="zh-CN" altLang="en-US" dirty="0"/>
+          </a:p>
+        </p:txBody>
+      </p:sp>
+      <p:pic>
+        <p:nvPicPr>
+          <p:cNvPr id="7" name="图片 6"/>
+          <p:cNvPicPr>
+            <a:picLocks noChangeAspect="1"/>
+          </p:cNvPicPr>
+          <p:nvPr/>
+        </p:nvPicPr>
+        <p:blipFill>
+          <a:blip r:embed="rId2"/>
+          <a:stretch>
+            <a:fillRect/>
+          </a:stretch>
+        </p:blipFill>
+        <p:spPr>
+          <a:xfrm>
+            <a:off x="1542029" y="1277030"/>
+            <a:ext cx="5450341" cy="5450341"/>
+          </a:xfrm>
+          <a:prstGeom prst="rect">
+            <a:avLst/>
+          </a:prstGeom>
+        </p:spPr>
+      </p:pic>
+      <p:cxnSp>
+        <p:nvCxnSpPr>
+          <p:cNvPr id="9" name="直接连接符 8"/>
+          <p:cNvCxnSpPr/>
+          <p:nvPr/>
+        </p:nvCxnSpPr>
+        <p:spPr>
+          <a:xfrm flipV="1">
+            <a:off x="3646713" y="2393270"/>
+            <a:ext cx="1240972" cy="10886"/>
+          </a:xfrm>
+          <a:prstGeom prst="line">
+            <a:avLst/>
+          </a:prstGeom>
+          <a:ln/>
+        </p:spPr>
+        <p:style>
+          <a:lnRef idx="2">
+            <a:schemeClr val="accent5"/>
+          </a:lnRef>
+          <a:fillRef idx="0">
+            <a:schemeClr val="accent5"/>
+          </a:fillRef>
+          <a:effectRef idx="1">
+            <a:schemeClr val="accent5"/>
+          </a:effectRef>
+          <a:fontRef idx="minor">
+            <a:schemeClr val="tx1"/>
+          </a:fontRef>
+        </p:style>
+      </p:cxnSp>
+      <p:cxnSp>
+        <p:nvCxnSpPr>
+          <p:cNvPr id="12" name="直接连接符 11"/>
+          <p:cNvCxnSpPr/>
+          <p:nvPr/>
+        </p:nvCxnSpPr>
+        <p:spPr>
+          <a:xfrm flipV="1">
+            <a:off x="2677885" y="4691743"/>
+            <a:ext cx="3178628" cy="10886"/>
+          </a:xfrm>
+          <a:prstGeom prst="line">
+            <a:avLst/>
+          </a:prstGeom>
+          <a:ln/>
+        </p:spPr>
+        <p:style>
+          <a:lnRef idx="2">
+            <a:schemeClr val="accent5"/>
+          </a:lnRef>
+          <a:fillRef idx="0">
+            <a:schemeClr val="accent5"/>
+          </a:fillRef>
+          <a:effectRef idx="1">
+            <a:schemeClr val="accent5"/>
+          </a:effectRef>
+          <a:fontRef idx="minor">
+            <a:schemeClr val="tx1"/>
+          </a:fontRef>
+        </p:style>
+      </p:cxnSp>
+      <p:cxnSp>
+        <p:nvCxnSpPr>
+          <p:cNvPr id="14" name="直接连接符 13"/>
+          <p:cNvCxnSpPr/>
+          <p:nvPr/>
+        </p:nvCxnSpPr>
+        <p:spPr>
+          <a:xfrm flipV="1">
+            <a:off x="2209800" y="6727371"/>
+            <a:ext cx="4082143" cy="10886"/>
+          </a:xfrm>
+          <a:prstGeom prst="line">
+            <a:avLst/>
+          </a:prstGeom>
+          <a:ln/>
+        </p:spPr>
+        <p:style>
+          <a:lnRef idx="2">
+            <a:schemeClr val="accent5"/>
+          </a:lnRef>
+          <a:fillRef idx="0">
+            <a:schemeClr val="accent5"/>
+          </a:fillRef>
+          <a:effectRef idx="1">
+            <a:schemeClr val="accent5"/>
+          </a:effectRef>
+          <a:fontRef idx="minor">
+            <a:schemeClr val="tx1"/>
+          </a:fontRef>
+        </p:style>
+      </p:cxnSp>
+      <p:cxnSp>
+        <p:nvCxnSpPr>
+          <p:cNvPr id="16" name="直接连接符 15"/>
+          <p:cNvCxnSpPr/>
+          <p:nvPr/>
+        </p:nvCxnSpPr>
+        <p:spPr>
+          <a:xfrm flipV="1">
+            <a:off x="3330459" y="6085114"/>
+            <a:ext cx="1774941" cy="20184"/>
+          </a:xfrm>
+          <a:prstGeom prst="line">
+            <a:avLst/>
+          </a:prstGeom>
+          <a:ln/>
+        </p:spPr>
+        <p:style>
+          <a:lnRef idx="2">
+            <a:schemeClr val="accent5"/>
+          </a:lnRef>
+          <a:fillRef idx="0">
+            <a:schemeClr val="accent5"/>
+          </a:fillRef>
+          <a:effectRef idx="1">
+            <a:schemeClr val="accent5"/>
+          </a:effectRef>
+          <a:fontRef idx="minor">
+            <a:schemeClr val="tx1"/>
+          </a:fontRef>
+        </p:style>
+      </p:cxnSp>
+    </p:spTree>
+    <p:extLst>
+      <p:ext uri="{BB962C8B-B14F-4D97-AF65-F5344CB8AC3E}">
+        <p14:creationId xmlns:p14="http://schemas.microsoft.com/office/powerpoint/2010/main" val="158825509"/>
+      </p:ext>
+    </p:extLst>
+  </p:cSld>
+  <p:clrMapOvr>
+    <a:masterClrMapping/>
+  </p:clrMapOvr>
+  <mc:AlternateContent xmlns:mc="http://schemas.openxmlformats.org/markup-compatibility/2006" xmlns:p14="http://schemas.microsoft.com/office/powerpoint/2010/main">
+    <mc:Choice Requires="p14">
+      <p:transition spd="med" p14:dur="700">
+        <p:fade/>
+      </p:transition>
+    </mc:Choice>
+    <mc:Fallback xmlns="">
+      <p:transition spd="med">
+        <p:fade/>
+      </p:transition>
+    </mc:Fallback>
+  </mc:AlternateContent>
+</p:sld>
+</file>
+
+<file path=ppt/slides/slide24.xml><?xml version="1.0" encoding="utf-8"?>
+<p:sld xmlns:a="http://schemas.openxmlformats.org/drawingml/2006/main" xmlns:r="http://schemas.openxmlformats.org/officeDocument/2006/relationships" xmlns:p="http://schemas.openxmlformats.org/presentationml/2006/main">
+  <p:cSld>
+    <p:spTree>
+      <p:nvGrpSpPr>
+        <p:cNvPr id="1" name=""/>
+        <p:cNvGrpSpPr/>
+        <p:nvPr/>
+      </p:nvGrpSpPr>
+      <p:grpSpPr>
+        <a:xfrm>
+          <a:off x="0" y="0"/>
+          <a:ext cx="0" cy="0"/>
+          <a:chOff x="0" y="0"/>
+          <a:chExt cx="0" cy="0"/>
+        </a:xfrm>
+      </p:grpSpPr>
+      <p:sp>
+        <p:nvSpPr>
+          <p:cNvPr id="2" name="标题 1"/>
+          <p:cNvSpPr>
+            <a:spLocks noGrp="1"/>
+          </p:cNvSpPr>
+          <p:nvPr>
+            <p:ph type="title"/>
+          </p:nvPr>
+        </p:nvSpPr>
+        <p:spPr/>
+        <p:txBody>
+          <a:bodyPr/>
+          <a:lstStyle/>
+          <a:p>
+            <a:r>
+              <a:rPr lang="en-US" altLang="zh-CN" dirty="0"/>
+              <a:t>7.4 Translation of Expressions-Addressing Array Elements</a:t>
+            </a:r>
+            <a:endParaRPr lang="zh-CN" altLang="en-US" dirty="0"/>
+          </a:p>
+        </p:txBody>
+      </p:sp>
+      <p:pic>
+        <p:nvPicPr>
+          <p:cNvPr id="3" name="图片 2"/>
+          <p:cNvPicPr>
+            <a:picLocks noChangeAspect="1"/>
+          </p:cNvPicPr>
+          <p:nvPr/>
+        </p:nvPicPr>
+        <p:blipFill>
+          <a:blip r:embed="rId2"/>
+          <a:stretch>
+            <a:fillRect/>
+          </a:stretch>
+        </p:blipFill>
+        <p:spPr>
+          <a:xfrm>
+            <a:off x="828675" y="1499507"/>
+            <a:ext cx="6569862" cy="2930978"/>
+          </a:xfrm>
+          <a:prstGeom prst="rect">
+            <a:avLst/>
+          </a:prstGeom>
+        </p:spPr>
+      </p:pic>
+      <p:pic>
+        <p:nvPicPr>
+          <p:cNvPr id="4" name="图片 3"/>
+          <p:cNvPicPr>
+            <a:picLocks noChangeAspect="1"/>
+          </p:cNvPicPr>
+          <p:nvPr/>
+        </p:nvPicPr>
+        <p:blipFill>
+          <a:blip r:embed="rId3"/>
+          <a:stretch>
+            <a:fillRect/>
+          </a:stretch>
+        </p:blipFill>
+        <p:spPr>
+          <a:xfrm>
+            <a:off x="2323531" y="4756830"/>
+            <a:ext cx="4495800" cy="1733550"/>
+          </a:xfrm>
+          <a:prstGeom prst="rect">
+            <a:avLst/>
+          </a:prstGeom>
+        </p:spPr>
+      </p:pic>
+    </p:spTree>
+    <p:extLst>
+      <p:ext uri="{BB962C8B-B14F-4D97-AF65-F5344CB8AC3E}">
+        <p14:creationId xmlns:p14="http://schemas.microsoft.com/office/powerpoint/2010/main" val="446824894"/>
+      </p:ext>
+    </p:extLst>
+  </p:cSld>
+  <p:clrMapOvr>
+    <a:masterClrMapping/>
+  </p:clrMapOvr>
+  <mc:AlternateContent xmlns:mc="http://schemas.openxmlformats.org/markup-compatibility/2006" xmlns:p14="http://schemas.microsoft.com/office/powerpoint/2010/main">
+    <mc:Choice Requires="p14">
+      <p:transition spd="med" p14:dur="700">
+        <p:fade/>
+      </p:transition>
+    </mc:Choice>
+    <mc:Fallback xmlns="">
+      <p:transition spd="med">
+        <p:fade/>
+      </p:transition>
+    </mc:Fallback>
+  </mc:AlternateContent>
+</p:sld>
+</file>
+
+<file path=ppt/slides/slide25.xml><?xml version="1.0" encoding="utf-8"?>
+<p:sld xmlns:a="http://schemas.openxmlformats.org/drawingml/2006/main" xmlns:r="http://schemas.openxmlformats.org/officeDocument/2006/relationships" xmlns:p="http://schemas.openxmlformats.org/presentationml/2006/main">
+  <p:cSld>
+    <p:spTree>
+      <p:nvGrpSpPr>
+        <p:cNvPr id="1" name=""/>
+        <p:cNvGrpSpPr/>
+        <p:nvPr/>
+      </p:nvGrpSpPr>
+      <p:grpSpPr>
+        <a:xfrm>
+          <a:off x="0" y="0"/>
+          <a:ext cx="0" cy="0"/>
+          <a:chOff x="0" y="0"/>
+          <a:chExt cx="0" cy="0"/>
+        </a:xfrm>
+      </p:grpSpPr>
+      <p:sp>
+        <p:nvSpPr>
+          <p:cNvPr id="2" name="标题 1"/>
+          <p:cNvSpPr>
+            <a:spLocks noGrp="1"/>
+          </p:cNvSpPr>
+          <p:nvPr>
+            <p:ph type="title"/>
+          </p:nvPr>
+        </p:nvSpPr>
+        <p:spPr/>
+        <p:txBody>
+          <a:bodyPr/>
+          <a:lstStyle/>
+          <a:p>
+            <a:r>
+              <a:rPr lang="en-US" altLang="zh-CN" dirty="0"/>
+              <a:t>7.4 Translation of Expressions-Addressing Array Elements</a:t>
+            </a:r>
+            <a:endParaRPr lang="zh-CN" altLang="en-US" dirty="0"/>
+          </a:p>
+        </p:txBody>
+      </p:sp>
+      <p:sp>
+        <p:nvSpPr>
+          <p:cNvPr id="6" name="矩形 5"/>
+          <p:cNvSpPr/>
+          <p:nvPr/>
+        </p:nvSpPr>
+        <p:spPr>
+          <a:xfrm>
+            <a:off x="1251857" y="1304313"/>
+            <a:ext cx="5758543" cy="584775"/>
+          </a:xfrm>
+          <a:prstGeom prst="rect">
+            <a:avLst/>
+          </a:prstGeom>
+        </p:spPr>
+        <p:txBody>
+          <a:bodyPr wrap="square">
+            <a:spAutoFit/>
+          </a:bodyPr>
+          <a:lstStyle/>
+          <a:p>
+            <a:r>
+              <a:rPr lang="en-US" altLang="zh-CN" sz="1600" dirty="0" smtClean="0">
+                <a:solidFill>
+                  <a:schemeClr val="tx2"/>
+                </a:solidFill>
+              </a:rPr>
+              <a:t>Let nonterminal </a:t>
+            </a:r>
+            <a:r>
+              <a:rPr lang="en-US" altLang="zh-CN" sz="1600" i="1" dirty="0">
+                <a:solidFill>
+                  <a:schemeClr val="tx2"/>
+                </a:solidFill>
+              </a:rPr>
+              <a:t>L</a:t>
+            </a:r>
+            <a:r>
+              <a:rPr lang="en-US" altLang="zh-CN" sz="1600" dirty="0">
+                <a:solidFill>
+                  <a:schemeClr val="tx2"/>
+                </a:solidFill>
+              </a:rPr>
+              <a:t> generate an array name </a:t>
+            </a:r>
+            <a:r>
+              <a:rPr lang="en-US" altLang="zh-CN" sz="1600" dirty="0" smtClean="0">
+                <a:solidFill>
+                  <a:schemeClr val="tx2"/>
+                </a:solidFill>
+              </a:rPr>
+              <a:t>followed </a:t>
+            </a:r>
+            <a:r>
+              <a:rPr lang="en-US" altLang="zh-CN" sz="1600" dirty="0">
+                <a:solidFill>
+                  <a:schemeClr val="tx2"/>
+                </a:solidFill>
+              </a:rPr>
+              <a:t>by a sequence of </a:t>
+            </a:r>
+            <a:r>
+              <a:rPr lang="en-US" altLang="zh-CN" sz="1600" dirty="0" smtClean="0">
+                <a:solidFill>
+                  <a:schemeClr val="tx2"/>
+                </a:solidFill>
+              </a:rPr>
+              <a:t>indexed </a:t>
+            </a:r>
+            <a:r>
+              <a:rPr lang="en-US" altLang="zh-CN" sz="1600" dirty="0">
+                <a:solidFill>
+                  <a:schemeClr val="tx2"/>
+                </a:solidFill>
+              </a:rPr>
+              <a:t>expressions</a:t>
+            </a:r>
+            <a:endParaRPr lang="zh-CN" altLang="en-US" sz="1600" dirty="0">
+              <a:solidFill>
+                <a:schemeClr val="tx2"/>
+              </a:solidFill>
+            </a:endParaRPr>
+          </a:p>
+        </p:txBody>
+      </p:sp>
+      <p:pic>
+        <p:nvPicPr>
+          <p:cNvPr id="7" name="图片 6"/>
+          <p:cNvPicPr>
+            <a:picLocks noChangeAspect="1"/>
+          </p:cNvPicPr>
+          <p:nvPr/>
+        </p:nvPicPr>
+        <p:blipFill>
+          <a:blip r:embed="rId2"/>
+          <a:stretch>
+            <a:fillRect/>
+          </a:stretch>
+        </p:blipFill>
+        <p:spPr>
+          <a:xfrm>
+            <a:off x="2943904" y="1963215"/>
+            <a:ext cx="2669087" cy="373930"/>
+          </a:xfrm>
+          <a:prstGeom prst="rect">
+            <a:avLst/>
+          </a:prstGeom>
+        </p:spPr>
+      </p:pic>
+      <p:sp>
+        <p:nvSpPr>
+          <p:cNvPr id="8" name="矩形 7"/>
+          <p:cNvSpPr/>
+          <p:nvPr/>
+        </p:nvSpPr>
+        <p:spPr>
+          <a:xfrm>
+            <a:off x="828675" y="2411272"/>
+            <a:ext cx="7347857" cy="584775"/>
+          </a:xfrm>
+          <a:prstGeom prst="rect">
+            <a:avLst/>
+          </a:prstGeom>
+        </p:spPr>
+        <p:txBody>
+          <a:bodyPr wrap="square">
+            <a:spAutoFit/>
+          </a:bodyPr>
+          <a:lstStyle/>
+          <a:p>
+            <a:r>
+              <a:rPr lang="en-US" altLang="zh-CN" sz="1600" dirty="0">
+                <a:solidFill>
+                  <a:schemeClr val="tx2"/>
+                </a:solidFill>
+              </a:rPr>
+              <a:t>As in C and Java, assume that the </a:t>
+            </a:r>
+            <a:r>
+              <a:rPr lang="en-US" altLang="zh-CN" sz="1600" dirty="0" smtClean="0">
+                <a:solidFill>
+                  <a:schemeClr val="tx2"/>
+                </a:solidFill>
+              </a:rPr>
+              <a:t>lowest-numbered </a:t>
+            </a:r>
+            <a:r>
+              <a:rPr lang="en-US" altLang="zh-CN" sz="1600" dirty="0">
+                <a:solidFill>
+                  <a:schemeClr val="tx2"/>
+                </a:solidFill>
+              </a:rPr>
+              <a:t>array element is </a:t>
+            </a:r>
+            <a:r>
+              <a:rPr lang="en-US" altLang="zh-CN" sz="1600" dirty="0" smtClean="0">
+                <a:solidFill>
+                  <a:schemeClr val="tx2"/>
+                </a:solidFill>
+              </a:rPr>
+              <a:t>O. The translation scheme of the expression with arrays:</a:t>
+            </a:r>
+            <a:endParaRPr lang="zh-CN" altLang="en-US" sz="1600" dirty="0">
+              <a:solidFill>
+                <a:schemeClr val="tx2"/>
+              </a:solidFill>
+            </a:endParaRPr>
+          </a:p>
+        </p:txBody>
+      </p:sp>
+      <p:pic>
+        <p:nvPicPr>
+          <p:cNvPr id="9" name="图片 8"/>
+          <p:cNvPicPr>
+            <a:picLocks noChangeAspect="1"/>
+          </p:cNvPicPr>
+          <p:nvPr/>
+        </p:nvPicPr>
+        <p:blipFill>
+          <a:blip r:embed="rId3"/>
+          <a:stretch>
+            <a:fillRect/>
+          </a:stretch>
+        </p:blipFill>
+        <p:spPr>
+          <a:xfrm>
+            <a:off x="828675" y="3032809"/>
+            <a:ext cx="3842658" cy="3825191"/>
+          </a:xfrm>
+          <a:prstGeom prst="rect">
+            <a:avLst/>
+          </a:prstGeom>
+        </p:spPr>
+      </p:pic>
+      <p:sp>
+        <p:nvSpPr>
+          <p:cNvPr id="10" name="矩形 9"/>
+          <p:cNvSpPr/>
+          <p:nvPr/>
+        </p:nvSpPr>
+        <p:spPr>
+          <a:xfrm>
+            <a:off x="4724400" y="3129674"/>
+            <a:ext cx="4419600" cy="830997"/>
+          </a:xfrm>
+          <a:prstGeom prst="rect">
+            <a:avLst/>
+          </a:prstGeom>
+        </p:spPr>
+        <p:txBody>
+          <a:bodyPr wrap="square">
+            <a:spAutoFit/>
+          </a:bodyPr>
+          <a:lstStyle/>
+          <a:p>
+            <a:r>
+              <a:rPr lang="en-US" altLang="zh-CN" sz="1600" i="1" dirty="0" err="1" smtClean="0">
+                <a:solidFill>
+                  <a:srgbClr val="7030A0"/>
+                </a:solidFill>
+              </a:rPr>
+              <a:t>L.addr</a:t>
+            </a:r>
+            <a:r>
+              <a:rPr lang="en-US" altLang="zh-CN" sz="1600" dirty="0" smtClean="0">
+                <a:solidFill>
+                  <a:schemeClr val="tx2"/>
+                </a:solidFill>
+              </a:rPr>
+              <a:t> </a:t>
+            </a:r>
+            <a:r>
+              <a:rPr lang="en-US" altLang="zh-CN" sz="1600" dirty="0">
+                <a:solidFill>
+                  <a:schemeClr val="tx2"/>
+                </a:solidFill>
+              </a:rPr>
+              <a:t>denotes a temporary that is </a:t>
+            </a:r>
+            <a:r>
+              <a:rPr lang="en-US" altLang="zh-CN" sz="1600" dirty="0" smtClean="0">
+                <a:solidFill>
+                  <a:schemeClr val="tx2"/>
+                </a:solidFill>
+              </a:rPr>
+              <a:t>used while </a:t>
+            </a:r>
+            <a:r>
+              <a:rPr lang="en-US" altLang="zh-CN" sz="1600" dirty="0">
+                <a:solidFill>
+                  <a:schemeClr val="tx2"/>
+                </a:solidFill>
+              </a:rPr>
+              <a:t>computing the offset </a:t>
+            </a:r>
+            <a:r>
+              <a:rPr lang="en-US" altLang="zh-CN" sz="1600" dirty="0" smtClean="0">
+                <a:solidFill>
+                  <a:schemeClr val="tx2"/>
+                </a:solidFill>
+              </a:rPr>
+              <a:t>for the </a:t>
+            </a:r>
+            <a:r>
+              <a:rPr lang="en-US" altLang="zh-CN" sz="1600" dirty="0">
+                <a:solidFill>
+                  <a:schemeClr val="tx2"/>
+                </a:solidFill>
+              </a:rPr>
+              <a:t>array reference</a:t>
+            </a:r>
+            <a:endParaRPr lang="zh-CN" altLang="en-US" sz="1600" dirty="0">
+              <a:solidFill>
+                <a:schemeClr val="tx2"/>
+              </a:solidFill>
+            </a:endParaRPr>
+          </a:p>
+        </p:txBody>
+      </p:sp>
+      <p:sp>
+        <p:nvSpPr>
+          <p:cNvPr id="12" name="矩形 11"/>
+          <p:cNvSpPr/>
+          <p:nvPr/>
+        </p:nvSpPr>
+        <p:spPr>
+          <a:xfrm>
+            <a:off x="4648200" y="3960671"/>
+            <a:ext cx="4572000" cy="1569660"/>
+          </a:xfrm>
+          <a:prstGeom prst="rect">
+            <a:avLst/>
+          </a:prstGeom>
+        </p:spPr>
+        <p:txBody>
+          <a:bodyPr>
+            <a:spAutoFit/>
+          </a:bodyPr>
+          <a:lstStyle/>
+          <a:p>
+            <a:r>
+              <a:rPr lang="en-US" altLang="zh-CN" sz="1600" i="1" dirty="0" err="1" smtClean="0">
+                <a:solidFill>
+                  <a:srgbClr val="7030A0"/>
+                </a:solidFill>
+              </a:rPr>
+              <a:t>L.array</a:t>
+            </a:r>
+            <a:r>
+              <a:rPr lang="en-US" altLang="zh-CN" sz="1600" dirty="0" smtClean="0">
+                <a:solidFill>
+                  <a:schemeClr val="tx2"/>
+                </a:solidFill>
+              </a:rPr>
+              <a:t> </a:t>
+            </a:r>
+            <a:r>
+              <a:rPr lang="en-US" altLang="zh-CN" sz="1600" dirty="0">
+                <a:solidFill>
+                  <a:schemeClr val="tx2"/>
+                </a:solidFill>
+              </a:rPr>
+              <a:t>is a </a:t>
+            </a:r>
+            <a:r>
+              <a:rPr lang="en-US" altLang="zh-CN" sz="1600" dirty="0" smtClean="0">
+                <a:solidFill>
+                  <a:schemeClr val="tx2"/>
+                </a:solidFill>
+              </a:rPr>
+              <a:t>pointer to the symbol-table entry </a:t>
+            </a:r>
+            <a:r>
+              <a:rPr lang="en-US" altLang="zh-CN" sz="1600" dirty="0">
+                <a:solidFill>
+                  <a:schemeClr val="tx2"/>
+                </a:solidFill>
+              </a:rPr>
+              <a:t>for the array name. </a:t>
+            </a:r>
+            <a:r>
+              <a:rPr lang="en-US" altLang="zh-CN" sz="1600" dirty="0" smtClean="0">
+                <a:solidFill>
+                  <a:schemeClr val="tx2"/>
+                </a:solidFill>
+              </a:rPr>
+              <a:t>The base </a:t>
+            </a:r>
+            <a:r>
+              <a:rPr lang="en-US" altLang="zh-CN" sz="1600" dirty="0">
+                <a:solidFill>
+                  <a:schemeClr val="tx2"/>
+                </a:solidFill>
+              </a:rPr>
+              <a:t>address of the array, say,</a:t>
+            </a:r>
+            <a:r>
+              <a:rPr lang="en-US" altLang="zh-CN" sz="1600" i="1" dirty="0">
+                <a:solidFill>
+                  <a:srgbClr val="7030A0"/>
+                </a:solidFill>
+              </a:rPr>
+              <a:t> </a:t>
+            </a:r>
+            <a:r>
+              <a:rPr lang="en-US" altLang="zh-CN" sz="1600" i="1" dirty="0" err="1" smtClean="0">
+                <a:solidFill>
+                  <a:srgbClr val="7030A0"/>
+                </a:solidFill>
+              </a:rPr>
+              <a:t>L.array.base</a:t>
+            </a:r>
+            <a:r>
+              <a:rPr lang="en-US" altLang="zh-CN" sz="1600" i="1" dirty="0" smtClean="0">
+                <a:solidFill>
+                  <a:srgbClr val="7030A0"/>
+                </a:solidFill>
+              </a:rPr>
+              <a:t> </a:t>
+            </a:r>
+            <a:r>
+              <a:rPr lang="en-US" altLang="zh-CN" sz="1600" dirty="0">
+                <a:solidFill>
+                  <a:schemeClr val="tx2"/>
+                </a:solidFill>
+              </a:rPr>
+              <a:t>is used </a:t>
+            </a:r>
+            <a:r>
+              <a:rPr lang="en-US" altLang="zh-CN" sz="1600" dirty="0" smtClean="0">
+                <a:solidFill>
+                  <a:schemeClr val="tx2"/>
+                </a:solidFill>
+              </a:rPr>
+              <a:t>to determine </a:t>
+            </a:r>
+            <a:r>
+              <a:rPr lang="en-US" altLang="zh-CN" sz="1600" dirty="0">
+                <a:solidFill>
+                  <a:schemeClr val="tx2"/>
+                </a:solidFill>
+              </a:rPr>
+              <a:t>the </a:t>
+            </a:r>
+            <a:r>
+              <a:rPr lang="en-US" altLang="zh-CN" sz="1600" dirty="0" smtClean="0">
+                <a:solidFill>
+                  <a:schemeClr val="tx2"/>
+                </a:solidFill>
+              </a:rPr>
+              <a:t>actual l-value </a:t>
+            </a:r>
+            <a:r>
+              <a:rPr lang="en-US" altLang="zh-CN" sz="1600" dirty="0">
+                <a:solidFill>
+                  <a:schemeClr val="tx2"/>
+                </a:solidFill>
+              </a:rPr>
+              <a:t>of an array reference after all the index expressions are </a:t>
+            </a:r>
+            <a:r>
+              <a:rPr lang="en-US" altLang="zh-CN" sz="1600" dirty="0" smtClean="0">
+                <a:solidFill>
+                  <a:schemeClr val="tx2"/>
+                </a:solidFill>
+              </a:rPr>
+              <a:t>analyzed.</a:t>
+            </a:r>
+            <a:endParaRPr lang="zh-CN" altLang="en-US" sz="1600" dirty="0">
+              <a:solidFill>
+                <a:schemeClr val="tx2"/>
+              </a:solidFill>
+            </a:endParaRPr>
+          </a:p>
+        </p:txBody>
+      </p:sp>
+      <p:sp>
+        <p:nvSpPr>
+          <p:cNvPr id="13" name="矩形 12"/>
+          <p:cNvSpPr/>
+          <p:nvPr/>
+        </p:nvSpPr>
+        <p:spPr>
+          <a:xfrm>
+            <a:off x="4659767" y="5609390"/>
+            <a:ext cx="4572000" cy="584775"/>
+          </a:xfrm>
+          <a:prstGeom prst="rect">
+            <a:avLst/>
+          </a:prstGeom>
+        </p:spPr>
+        <p:txBody>
+          <a:bodyPr>
+            <a:spAutoFit/>
+          </a:bodyPr>
+          <a:lstStyle/>
+          <a:p>
+            <a:r>
+              <a:rPr lang="en-US" altLang="zh-CN" sz="1600" i="1" dirty="0" err="1" smtClean="0">
+                <a:solidFill>
+                  <a:srgbClr val="7030A0"/>
+                </a:solidFill>
+              </a:rPr>
+              <a:t>L.type</a:t>
+            </a:r>
+            <a:r>
+              <a:rPr lang="en-US" altLang="zh-CN" sz="1600" dirty="0" smtClean="0">
+                <a:solidFill>
+                  <a:schemeClr val="tx2"/>
+                </a:solidFill>
+              </a:rPr>
+              <a:t> </a:t>
+            </a:r>
+            <a:r>
+              <a:rPr lang="en-US" altLang="zh-CN" sz="1600" dirty="0">
+                <a:solidFill>
+                  <a:schemeClr val="tx2"/>
+                </a:solidFill>
+              </a:rPr>
+              <a:t>is the type of the sub </a:t>
+            </a:r>
+            <a:r>
+              <a:rPr lang="en-US" altLang="zh-CN" sz="1600" dirty="0" smtClean="0">
+                <a:solidFill>
+                  <a:schemeClr val="tx2"/>
+                </a:solidFill>
+              </a:rPr>
+              <a:t>array generated </a:t>
+            </a:r>
+            <a:r>
+              <a:rPr lang="en-US" altLang="zh-CN" sz="1600" dirty="0">
+                <a:solidFill>
+                  <a:schemeClr val="tx2"/>
+                </a:solidFill>
+              </a:rPr>
+              <a:t>by L.</a:t>
+            </a:r>
+            <a:endParaRPr lang="zh-CN" altLang="en-US" sz="1600" dirty="0">
+              <a:solidFill>
+                <a:schemeClr val="tx2"/>
+              </a:solidFill>
+            </a:endParaRPr>
           </a:p>
         </p:txBody>
       </p:sp>
     </p:spTree>
     <p:extLst>
       <p:ext uri="{BB962C8B-B14F-4D97-AF65-F5344CB8AC3E}">
-        <p14:creationId xmlns:p14="http://schemas.microsoft.com/office/powerpoint/2010/main" val="1241107300"/>
+        <p14:creationId xmlns:p14="http://schemas.microsoft.com/office/powerpoint/2010/main" val="1733800793"/>
+      </p:ext>
+    </p:extLst>
+  </p:cSld>
+  <p:clrMapOvr>
+    <a:masterClrMapping/>
+  </p:clrMapOvr>
+  <mc:AlternateContent xmlns:mc="http://schemas.openxmlformats.org/markup-compatibility/2006" xmlns:p14="http://schemas.microsoft.com/office/powerpoint/2010/main">
+    <mc:Choice Requires="p14">
+      <p:transition spd="med" p14:dur="700">
+        <p:fade/>
+      </p:transition>
+    </mc:Choice>
+    <mc:Fallback xmlns="">
+      <p:transition spd="med">
+        <p:fade/>
+      </p:transition>
+    </mc:Fallback>
+  </mc:AlternateContent>
+</p:sld>
+</file>
+
+<file path=ppt/slides/slide26.xml><?xml version="1.0" encoding="utf-8"?>
+<p:sld xmlns:a="http://schemas.openxmlformats.org/drawingml/2006/main" xmlns:r="http://schemas.openxmlformats.org/officeDocument/2006/relationships" xmlns:p="http://schemas.openxmlformats.org/presentationml/2006/main">
+  <p:cSld>
+    <p:spTree>
+      <p:nvGrpSpPr>
+        <p:cNvPr id="1" name=""/>
+        <p:cNvGrpSpPr/>
+        <p:nvPr/>
+      </p:nvGrpSpPr>
+      <p:grpSpPr>
+        <a:xfrm>
+          <a:off x="0" y="0"/>
+          <a:ext cx="0" cy="0"/>
+          <a:chOff x="0" y="0"/>
+          <a:chExt cx="0" cy="0"/>
+        </a:xfrm>
+      </p:grpSpPr>
+      <p:sp>
+        <p:nvSpPr>
+          <p:cNvPr id="2" name="标题 1"/>
+          <p:cNvSpPr>
+            <a:spLocks noGrp="1"/>
+          </p:cNvSpPr>
+          <p:nvPr>
+            <p:ph type="title"/>
+          </p:nvPr>
+        </p:nvSpPr>
+        <p:spPr/>
+        <p:txBody>
+          <a:bodyPr/>
+          <a:lstStyle/>
+          <a:p>
+            <a:r>
+              <a:rPr lang="en-US" altLang="zh-CN" dirty="0"/>
+              <a:t>7.4 Translation of Expressions-Addressing Array Elements</a:t>
+            </a:r>
+            <a:endParaRPr lang="zh-CN" altLang="en-US" dirty="0"/>
+          </a:p>
+        </p:txBody>
+      </p:sp>
+      <p:pic>
+        <p:nvPicPr>
+          <p:cNvPr id="3" name="图片 2"/>
+          <p:cNvPicPr>
+            <a:picLocks noChangeAspect="1"/>
+          </p:cNvPicPr>
+          <p:nvPr/>
+        </p:nvPicPr>
+        <p:blipFill>
+          <a:blip r:embed="rId2"/>
+          <a:stretch>
+            <a:fillRect/>
+          </a:stretch>
+        </p:blipFill>
+        <p:spPr>
+          <a:xfrm>
+            <a:off x="2290193" y="1679121"/>
+            <a:ext cx="4562475" cy="4762500"/>
+          </a:xfrm>
+          <a:prstGeom prst="rect">
+            <a:avLst/>
+          </a:prstGeom>
+        </p:spPr>
+      </p:pic>
+    </p:spTree>
+    <p:extLst>
+      <p:ext uri="{BB962C8B-B14F-4D97-AF65-F5344CB8AC3E}">
+        <p14:creationId xmlns:p14="http://schemas.microsoft.com/office/powerpoint/2010/main" val="3045919661"/>
+      </p:ext>
+    </p:extLst>
+  </p:cSld>
+  <p:clrMapOvr>
+    <a:masterClrMapping/>
+  </p:clrMapOvr>
+  <mc:AlternateContent xmlns:mc="http://schemas.openxmlformats.org/markup-compatibility/2006" xmlns:p14="http://schemas.microsoft.com/office/powerpoint/2010/main">
+    <mc:Choice Requires="p14">
+      <p:transition spd="med" p14:dur="700">
+        <p:fade/>
+      </p:transition>
+    </mc:Choice>
+    <mc:Fallback xmlns="">
+      <p:transition spd="med">
+        <p:fade/>
+      </p:transition>
+    </mc:Fallback>
+  </mc:AlternateContent>
+</p:sld>
+</file>
+
+<file path=ppt/slides/slide27.xml><?xml version="1.0" encoding="utf-8"?>
+<p:sld xmlns:a="http://schemas.openxmlformats.org/drawingml/2006/main" xmlns:r="http://schemas.openxmlformats.org/officeDocument/2006/relationships" xmlns:p="http://schemas.openxmlformats.org/presentationml/2006/main">
+  <p:cSld>
+    <p:spTree>
+      <p:nvGrpSpPr>
+        <p:cNvPr id="1" name=""/>
+        <p:cNvGrpSpPr/>
+        <p:nvPr/>
+      </p:nvGrpSpPr>
+      <p:grpSpPr>
+        <a:xfrm>
+          <a:off x="0" y="0"/>
+          <a:ext cx="0" cy="0"/>
+          <a:chOff x="0" y="0"/>
+          <a:chExt cx="0" cy="0"/>
+        </a:xfrm>
+      </p:grpSpPr>
+      <p:sp>
+        <p:nvSpPr>
+          <p:cNvPr id="2" name="标题 1"/>
+          <p:cNvSpPr>
+            <a:spLocks noGrp="1"/>
+          </p:cNvSpPr>
+          <p:nvPr>
+            <p:ph type="title"/>
+          </p:nvPr>
+        </p:nvSpPr>
+        <p:spPr/>
+        <p:txBody>
+          <a:bodyPr/>
+          <a:lstStyle/>
+          <a:p>
+            <a:r>
+              <a:rPr lang="en-US" altLang="zh-CN" dirty="0" smtClean="0"/>
+              <a:t>7.5 </a:t>
+            </a:r>
+            <a:r>
+              <a:rPr lang="en-US" altLang="zh-CN" dirty="0"/>
+              <a:t>Type checking-Rules </a:t>
+            </a:r>
+            <a:r>
+              <a:rPr lang="en-US" altLang="zh-CN" dirty="0" smtClean="0"/>
+              <a:t>for </a:t>
+            </a:r>
+            <a:r>
+              <a:rPr lang="en-US" altLang="zh-CN" dirty="0"/>
+              <a:t>Type Checking</a:t>
+            </a:r>
+            <a:endParaRPr lang="zh-CN" altLang="en-US" dirty="0"/>
+          </a:p>
+        </p:txBody>
+      </p:sp>
+      <p:sp>
+        <p:nvSpPr>
+          <p:cNvPr id="3" name="内容占位符 2"/>
+          <p:cNvSpPr>
+            <a:spLocks noGrp="1"/>
+          </p:cNvSpPr>
+          <p:nvPr>
+            <p:ph idx="1"/>
+          </p:nvPr>
+        </p:nvSpPr>
+        <p:spPr>
+          <a:xfrm>
+            <a:off x="828675" y="1600200"/>
+            <a:ext cx="7486650" cy="478971"/>
+          </a:xfrm>
+        </p:spPr>
+        <p:txBody>
+          <a:bodyPr/>
+          <a:lstStyle/>
+          <a:p>
+            <a:r>
+              <a:rPr lang="en-US" altLang="zh-CN" dirty="0"/>
+              <a:t>Type checking can take on two </a:t>
+            </a:r>
+            <a:r>
+              <a:rPr lang="en-US" altLang="zh-CN" dirty="0" smtClean="0"/>
+              <a:t>forms</a:t>
+            </a:r>
+            <a:r>
+              <a:rPr lang="en-US" altLang="zh-CN" dirty="0"/>
+              <a:t>: </a:t>
+            </a:r>
+            <a:r>
+              <a:rPr lang="en-US" altLang="zh-CN" i="1" dirty="0">
+                <a:solidFill>
+                  <a:srgbClr val="7030A0"/>
+                </a:solidFill>
+              </a:rPr>
+              <a:t>synthesis</a:t>
+            </a:r>
+            <a:r>
+              <a:rPr lang="en-US" altLang="zh-CN" dirty="0">
+                <a:solidFill>
+                  <a:srgbClr val="7030A0"/>
+                </a:solidFill>
+              </a:rPr>
+              <a:t> </a:t>
+            </a:r>
+            <a:r>
+              <a:rPr lang="en-US" altLang="zh-CN" dirty="0"/>
+              <a:t>and </a:t>
+            </a:r>
+            <a:r>
+              <a:rPr lang="en-US" altLang="zh-CN" i="1" dirty="0">
+                <a:solidFill>
+                  <a:srgbClr val="7030A0"/>
+                </a:solidFill>
+              </a:rPr>
+              <a:t>inference</a:t>
+            </a:r>
+            <a:r>
+              <a:rPr lang="en-US" altLang="zh-CN" dirty="0"/>
+              <a:t>.</a:t>
+            </a:r>
+            <a:endParaRPr lang="zh-CN" altLang="en-US" dirty="0"/>
+          </a:p>
+        </p:txBody>
+      </p:sp>
+      <p:sp>
+        <p:nvSpPr>
+          <p:cNvPr id="5" name="内容占位符 2"/>
+          <p:cNvSpPr txBox="1">
+            <a:spLocks/>
+          </p:cNvSpPr>
+          <p:nvPr/>
+        </p:nvSpPr>
+        <p:spPr>
+          <a:xfrm>
+            <a:off x="828675" y="2027238"/>
+            <a:ext cx="7486650" cy="1118733"/>
+          </a:xfrm>
+          <a:prstGeom prst="rect">
+            <a:avLst/>
+          </a:prstGeom>
+        </p:spPr>
+        <p:txBody>
+          <a:bodyPr vert="horz" lIns="0" tIns="45720" rIns="0" bIns="45720" rtlCol="0">
+            <a:normAutofit/>
+          </a:bodyPr>
+          <a:lstStyle>
+            <a:lvl1pPr marL="171450" indent="-171450" algn="l" defTabSz="685800" rtl="0" eaLnBrk="1" latinLnBrk="0" hangingPunct="1">
+              <a:lnSpc>
+                <a:spcPct val="90000"/>
+              </a:lnSpc>
+              <a:spcBef>
+                <a:spcPts val="1350"/>
+              </a:spcBef>
+              <a:buFont typeface="Wingdings" panose="05000000000000000000" pitchFamily="2" charset="2"/>
+              <a:buChar char="§"/>
+              <a:defRPr sz="1500" kern="1200">
+                <a:solidFill>
+                  <a:schemeClr val="tx1"/>
+                </a:solidFill>
+                <a:latin typeface="微软雅黑" panose="020B0503020204020204" pitchFamily="34" charset="-122"/>
+                <a:ea typeface="微软雅黑" panose="020B0503020204020204" pitchFamily="34" charset="-122"/>
+                <a:cs typeface="+mn-cs"/>
+              </a:defRPr>
+            </a:lvl1pPr>
+            <a:lvl2pPr marL="514350" indent="-171450" algn="l" defTabSz="685800" rtl="0" eaLnBrk="1" latinLnBrk="0" hangingPunct="1">
+              <a:lnSpc>
+                <a:spcPct val="90000"/>
+              </a:lnSpc>
+              <a:spcBef>
+                <a:spcPts val="450"/>
+              </a:spcBef>
+              <a:buFont typeface="Wingdings" panose="05000000000000000000" pitchFamily="2" charset="2"/>
+              <a:buChar char="§"/>
+              <a:defRPr sz="1200" kern="1200">
+                <a:solidFill>
+                  <a:schemeClr val="tx1"/>
+                </a:solidFill>
+                <a:latin typeface="微软雅黑" panose="020B0503020204020204" pitchFamily="34" charset="-122"/>
+                <a:ea typeface="微软雅黑" panose="020B0503020204020204" pitchFamily="34" charset="-122"/>
+                <a:cs typeface="+mn-cs"/>
+              </a:defRPr>
+            </a:lvl2pPr>
+            <a:lvl3pPr marL="857250" indent="-171450" algn="l" defTabSz="685800" rtl="0" eaLnBrk="1" latinLnBrk="0" hangingPunct="1">
+              <a:lnSpc>
+                <a:spcPct val="90000"/>
+              </a:lnSpc>
+              <a:spcBef>
+                <a:spcPts val="450"/>
+              </a:spcBef>
+              <a:buFont typeface="Wingdings" panose="05000000000000000000" pitchFamily="2" charset="2"/>
+              <a:buChar char="§"/>
+              <a:defRPr sz="1050" kern="1200">
+                <a:solidFill>
+                  <a:schemeClr val="tx1"/>
+                </a:solidFill>
+                <a:latin typeface="微软雅黑" panose="020B0503020204020204" pitchFamily="34" charset="-122"/>
+                <a:ea typeface="微软雅黑" panose="020B0503020204020204" pitchFamily="34" charset="-122"/>
+                <a:cs typeface="+mn-cs"/>
+              </a:defRPr>
+            </a:lvl3pPr>
+            <a:lvl4pPr marL="1200150" indent="-171450" algn="l" defTabSz="685800" rtl="0" eaLnBrk="1" latinLnBrk="0" hangingPunct="1">
+              <a:lnSpc>
+                <a:spcPct val="90000"/>
+              </a:lnSpc>
+              <a:spcBef>
+                <a:spcPts val="450"/>
+              </a:spcBef>
+              <a:buFont typeface="Wingdings" panose="05000000000000000000" pitchFamily="2" charset="2"/>
+              <a:buChar char="§"/>
+              <a:defRPr sz="1050" kern="1200">
+                <a:solidFill>
+                  <a:schemeClr val="tx1"/>
+                </a:solidFill>
+                <a:latin typeface="微软雅黑" panose="020B0503020204020204" pitchFamily="34" charset="-122"/>
+                <a:ea typeface="微软雅黑" panose="020B0503020204020204" pitchFamily="34" charset="-122"/>
+                <a:cs typeface="+mn-cs"/>
+              </a:defRPr>
+            </a:lvl4pPr>
+            <a:lvl5pPr marL="1543050" indent="-171450" algn="l" defTabSz="685800" rtl="0" eaLnBrk="1" latinLnBrk="0" hangingPunct="1">
+              <a:lnSpc>
+                <a:spcPct val="90000"/>
+              </a:lnSpc>
+              <a:spcBef>
+                <a:spcPts val="450"/>
+              </a:spcBef>
+              <a:buFont typeface="Wingdings" panose="05000000000000000000" pitchFamily="2" charset="2"/>
+              <a:buChar char="§"/>
+              <a:defRPr sz="1050" kern="1200">
+                <a:solidFill>
+                  <a:schemeClr val="tx1"/>
+                </a:solidFill>
+                <a:latin typeface="微软雅黑" panose="020B0503020204020204" pitchFamily="34" charset="-122"/>
+                <a:ea typeface="微软雅黑" panose="020B0503020204020204" pitchFamily="34" charset="-122"/>
+                <a:cs typeface="+mn-cs"/>
+              </a:defRPr>
+            </a:lvl5pPr>
+            <a:lvl6pPr marL="1885950" indent="-171450" algn="l" defTabSz="685800" rtl="0" eaLnBrk="1" latinLnBrk="0" hangingPunct="1">
+              <a:lnSpc>
+                <a:spcPct val="90000"/>
+              </a:lnSpc>
+              <a:spcBef>
+                <a:spcPts val="375"/>
+              </a:spcBef>
+              <a:buFont typeface="Wingdings" panose="05000000000000000000" pitchFamily="2" charset="2"/>
+              <a:buChar char="§"/>
+              <a:defRPr sz="1050" kern="1200">
+                <a:solidFill>
+                  <a:schemeClr val="tx1"/>
+                </a:solidFill>
+                <a:latin typeface="微软雅黑" panose="020B0503020204020204" pitchFamily="34" charset="-122"/>
+                <a:ea typeface="微软雅黑" panose="020B0503020204020204" pitchFamily="34" charset="-122"/>
+                <a:cs typeface="+mn-cs"/>
+              </a:defRPr>
+            </a:lvl6pPr>
+            <a:lvl7pPr marL="2228850" indent="-171450" algn="l" defTabSz="685800" rtl="0" eaLnBrk="1" latinLnBrk="0" hangingPunct="1">
+              <a:lnSpc>
+                <a:spcPct val="90000"/>
+              </a:lnSpc>
+              <a:spcBef>
+                <a:spcPts val="375"/>
+              </a:spcBef>
+              <a:buFont typeface="Wingdings" panose="05000000000000000000" pitchFamily="2" charset="2"/>
+              <a:buChar char="§"/>
+              <a:defRPr sz="1050" kern="1200">
+                <a:solidFill>
+                  <a:schemeClr val="tx1"/>
+                </a:solidFill>
+                <a:latin typeface="微软雅黑" panose="020B0503020204020204" pitchFamily="34" charset="-122"/>
+                <a:ea typeface="微软雅黑" panose="020B0503020204020204" pitchFamily="34" charset="-122"/>
+                <a:cs typeface="+mn-cs"/>
+              </a:defRPr>
+            </a:lvl7pPr>
+            <a:lvl8pPr marL="2571750" indent="-171450" algn="l" defTabSz="685800" rtl="0" eaLnBrk="1" latinLnBrk="0" hangingPunct="1">
+              <a:lnSpc>
+                <a:spcPct val="90000"/>
+              </a:lnSpc>
+              <a:spcBef>
+                <a:spcPts val="375"/>
+              </a:spcBef>
+              <a:buFont typeface="Wingdings" panose="05000000000000000000" pitchFamily="2" charset="2"/>
+              <a:buChar char="§"/>
+              <a:defRPr sz="1050" kern="1200">
+                <a:solidFill>
+                  <a:schemeClr val="tx1"/>
+                </a:solidFill>
+                <a:latin typeface="微软雅黑" panose="020B0503020204020204" pitchFamily="34" charset="-122"/>
+                <a:ea typeface="微软雅黑" panose="020B0503020204020204" pitchFamily="34" charset="-122"/>
+                <a:cs typeface="+mn-cs"/>
+              </a:defRPr>
+            </a:lvl8pPr>
+            <a:lvl9pPr marL="2914650" indent="-171450" algn="l" defTabSz="685800" rtl="0" eaLnBrk="1" latinLnBrk="0" hangingPunct="1">
+              <a:lnSpc>
+                <a:spcPct val="90000"/>
+              </a:lnSpc>
+              <a:spcBef>
+                <a:spcPts val="375"/>
+              </a:spcBef>
+              <a:buFont typeface="Wingdings" panose="05000000000000000000" pitchFamily="2" charset="2"/>
+              <a:buChar char="§"/>
+              <a:defRPr sz="1050" kern="1200">
+                <a:solidFill>
+                  <a:schemeClr val="tx1"/>
+                </a:solidFill>
+                <a:latin typeface="微软雅黑" panose="020B0503020204020204" pitchFamily="34" charset="-122"/>
+                <a:ea typeface="微软雅黑" panose="020B0503020204020204" pitchFamily="34" charset="-122"/>
+                <a:cs typeface="+mn-cs"/>
+              </a:defRPr>
+            </a:lvl9pPr>
+          </a:lstStyle>
+          <a:p>
+            <a:r>
+              <a:rPr lang="en-US" altLang="zh-CN" b="1" dirty="0" smtClean="0">
+                <a:solidFill>
+                  <a:srgbClr val="7030A0"/>
+                </a:solidFill>
+              </a:rPr>
+              <a:t>Type synthesis </a:t>
+            </a:r>
+            <a:r>
+              <a:rPr lang="en-US" altLang="zh-CN" dirty="0" smtClean="0"/>
+              <a:t>builds </a:t>
+            </a:r>
+            <a:r>
+              <a:rPr lang="en-US" altLang="zh-CN" dirty="0"/>
+              <a:t>up the type of an expression from the types of its subexpressions. </a:t>
+            </a:r>
+            <a:r>
+              <a:rPr lang="en-US" altLang="zh-CN" dirty="0" smtClean="0"/>
+              <a:t>It requires </a:t>
+            </a:r>
+            <a:r>
+              <a:rPr lang="en-US" altLang="zh-CN" dirty="0"/>
+              <a:t>names to be declared before they are </a:t>
+            </a:r>
+            <a:r>
+              <a:rPr lang="en-US" altLang="zh-CN" dirty="0" smtClean="0"/>
+              <a:t>used.</a:t>
+            </a:r>
+            <a:endParaRPr lang="zh-CN" altLang="en-US" dirty="0"/>
+          </a:p>
+        </p:txBody>
+      </p:sp>
+      <p:sp>
+        <p:nvSpPr>
+          <p:cNvPr id="6" name="内容占位符 2"/>
+          <p:cNvSpPr txBox="1">
+            <a:spLocks/>
+          </p:cNvSpPr>
+          <p:nvPr/>
+        </p:nvSpPr>
+        <p:spPr>
+          <a:xfrm>
+            <a:off x="828675" y="3954009"/>
+            <a:ext cx="7486650" cy="617991"/>
+          </a:xfrm>
+          <a:prstGeom prst="rect">
+            <a:avLst/>
+          </a:prstGeom>
+        </p:spPr>
+        <p:txBody>
+          <a:bodyPr vert="horz" lIns="0" tIns="45720" rIns="0" bIns="45720" rtlCol="0">
+            <a:normAutofit/>
+          </a:bodyPr>
+          <a:lstStyle>
+            <a:lvl1pPr marL="171450" indent="-171450" algn="l" defTabSz="685800" rtl="0" eaLnBrk="1" latinLnBrk="0" hangingPunct="1">
+              <a:lnSpc>
+                <a:spcPct val="90000"/>
+              </a:lnSpc>
+              <a:spcBef>
+                <a:spcPts val="1350"/>
+              </a:spcBef>
+              <a:buFont typeface="Wingdings" panose="05000000000000000000" pitchFamily="2" charset="2"/>
+              <a:buChar char="§"/>
+              <a:defRPr sz="1500" kern="1200">
+                <a:solidFill>
+                  <a:schemeClr val="tx1"/>
+                </a:solidFill>
+                <a:latin typeface="微软雅黑" panose="020B0503020204020204" pitchFamily="34" charset="-122"/>
+                <a:ea typeface="微软雅黑" panose="020B0503020204020204" pitchFamily="34" charset="-122"/>
+                <a:cs typeface="+mn-cs"/>
+              </a:defRPr>
+            </a:lvl1pPr>
+            <a:lvl2pPr marL="514350" indent="-171450" algn="l" defTabSz="685800" rtl="0" eaLnBrk="1" latinLnBrk="0" hangingPunct="1">
+              <a:lnSpc>
+                <a:spcPct val="90000"/>
+              </a:lnSpc>
+              <a:spcBef>
+                <a:spcPts val="450"/>
+              </a:spcBef>
+              <a:buFont typeface="Wingdings" panose="05000000000000000000" pitchFamily="2" charset="2"/>
+              <a:buChar char="§"/>
+              <a:defRPr sz="1200" kern="1200">
+                <a:solidFill>
+                  <a:schemeClr val="tx1"/>
+                </a:solidFill>
+                <a:latin typeface="微软雅黑" panose="020B0503020204020204" pitchFamily="34" charset="-122"/>
+                <a:ea typeface="微软雅黑" panose="020B0503020204020204" pitchFamily="34" charset="-122"/>
+                <a:cs typeface="+mn-cs"/>
+              </a:defRPr>
+            </a:lvl2pPr>
+            <a:lvl3pPr marL="857250" indent="-171450" algn="l" defTabSz="685800" rtl="0" eaLnBrk="1" latinLnBrk="0" hangingPunct="1">
+              <a:lnSpc>
+                <a:spcPct val="90000"/>
+              </a:lnSpc>
+              <a:spcBef>
+                <a:spcPts val="450"/>
+              </a:spcBef>
+              <a:buFont typeface="Wingdings" panose="05000000000000000000" pitchFamily="2" charset="2"/>
+              <a:buChar char="§"/>
+              <a:defRPr sz="1050" kern="1200">
+                <a:solidFill>
+                  <a:schemeClr val="tx1"/>
+                </a:solidFill>
+                <a:latin typeface="微软雅黑" panose="020B0503020204020204" pitchFamily="34" charset="-122"/>
+                <a:ea typeface="微软雅黑" panose="020B0503020204020204" pitchFamily="34" charset="-122"/>
+                <a:cs typeface="+mn-cs"/>
+              </a:defRPr>
+            </a:lvl3pPr>
+            <a:lvl4pPr marL="1200150" indent="-171450" algn="l" defTabSz="685800" rtl="0" eaLnBrk="1" latinLnBrk="0" hangingPunct="1">
+              <a:lnSpc>
+                <a:spcPct val="90000"/>
+              </a:lnSpc>
+              <a:spcBef>
+                <a:spcPts val="450"/>
+              </a:spcBef>
+              <a:buFont typeface="Wingdings" panose="05000000000000000000" pitchFamily="2" charset="2"/>
+              <a:buChar char="§"/>
+              <a:defRPr sz="1050" kern="1200">
+                <a:solidFill>
+                  <a:schemeClr val="tx1"/>
+                </a:solidFill>
+                <a:latin typeface="微软雅黑" panose="020B0503020204020204" pitchFamily="34" charset="-122"/>
+                <a:ea typeface="微软雅黑" panose="020B0503020204020204" pitchFamily="34" charset="-122"/>
+                <a:cs typeface="+mn-cs"/>
+              </a:defRPr>
+            </a:lvl4pPr>
+            <a:lvl5pPr marL="1543050" indent="-171450" algn="l" defTabSz="685800" rtl="0" eaLnBrk="1" latinLnBrk="0" hangingPunct="1">
+              <a:lnSpc>
+                <a:spcPct val="90000"/>
+              </a:lnSpc>
+              <a:spcBef>
+                <a:spcPts val="450"/>
+              </a:spcBef>
+              <a:buFont typeface="Wingdings" panose="05000000000000000000" pitchFamily="2" charset="2"/>
+              <a:buChar char="§"/>
+              <a:defRPr sz="1050" kern="1200">
+                <a:solidFill>
+                  <a:schemeClr val="tx1"/>
+                </a:solidFill>
+                <a:latin typeface="微软雅黑" panose="020B0503020204020204" pitchFamily="34" charset="-122"/>
+                <a:ea typeface="微软雅黑" panose="020B0503020204020204" pitchFamily="34" charset="-122"/>
+                <a:cs typeface="+mn-cs"/>
+              </a:defRPr>
+            </a:lvl5pPr>
+            <a:lvl6pPr marL="1885950" indent="-171450" algn="l" defTabSz="685800" rtl="0" eaLnBrk="1" latinLnBrk="0" hangingPunct="1">
+              <a:lnSpc>
+                <a:spcPct val="90000"/>
+              </a:lnSpc>
+              <a:spcBef>
+                <a:spcPts val="375"/>
+              </a:spcBef>
+              <a:buFont typeface="Wingdings" panose="05000000000000000000" pitchFamily="2" charset="2"/>
+              <a:buChar char="§"/>
+              <a:defRPr sz="1050" kern="1200">
+                <a:solidFill>
+                  <a:schemeClr val="tx1"/>
+                </a:solidFill>
+                <a:latin typeface="微软雅黑" panose="020B0503020204020204" pitchFamily="34" charset="-122"/>
+                <a:ea typeface="微软雅黑" panose="020B0503020204020204" pitchFamily="34" charset="-122"/>
+                <a:cs typeface="+mn-cs"/>
+              </a:defRPr>
+            </a:lvl6pPr>
+            <a:lvl7pPr marL="2228850" indent="-171450" algn="l" defTabSz="685800" rtl="0" eaLnBrk="1" latinLnBrk="0" hangingPunct="1">
+              <a:lnSpc>
+                <a:spcPct val="90000"/>
+              </a:lnSpc>
+              <a:spcBef>
+                <a:spcPts val="375"/>
+              </a:spcBef>
+              <a:buFont typeface="Wingdings" panose="05000000000000000000" pitchFamily="2" charset="2"/>
+              <a:buChar char="§"/>
+              <a:defRPr sz="1050" kern="1200">
+                <a:solidFill>
+                  <a:schemeClr val="tx1"/>
+                </a:solidFill>
+                <a:latin typeface="微软雅黑" panose="020B0503020204020204" pitchFamily="34" charset="-122"/>
+                <a:ea typeface="微软雅黑" panose="020B0503020204020204" pitchFamily="34" charset="-122"/>
+                <a:cs typeface="+mn-cs"/>
+              </a:defRPr>
+            </a:lvl7pPr>
+            <a:lvl8pPr marL="2571750" indent="-171450" algn="l" defTabSz="685800" rtl="0" eaLnBrk="1" latinLnBrk="0" hangingPunct="1">
+              <a:lnSpc>
+                <a:spcPct val="90000"/>
+              </a:lnSpc>
+              <a:spcBef>
+                <a:spcPts val="375"/>
+              </a:spcBef>
+              <a:buFont typeface="Wingdings" panose="05000000000000000000" pitchFamily="2" charset="2"/>
+              <a:buChar char="§"/>
+              <a:defRPr sz="1050" kern="1200">
+                <a:solidFill>
+                  <a:schemeClr val="tx1"/>
+                </a:solidFill>
+                <a:latin typeface="微软雅黑" panose="020B0503020204020204" pitchFamily="34" charset="-122"/>
+                <a:ea typeface="微软雅黑" panose="020B0503020204020204" pitchFamily="34" charset="-122"/>
+                <a:cs typeface="+mn-cs"/>
+              </a:defRPr>
+            </a:lvl8pPr>
+            <a:lvl9pPr marL="2914650" indent="-171450" algn="l" defTabSz="685800" rtl="0" eaLnBrk="1" latinLnBrk="0" hangingPunct="1">
+              <a:lnSpc>
+                <a:spcPct val="90000"/>
+              </a:lnSpc>
+              <a:spcBef>
+                <a:spcPts val="375"/>
+              </a:spcBef>
+              <a:buFont typeface="Wingdings" panose="05000000000000000000" pitchFamily="2" charset="2"/>
+              <a:buChar char="§"/>
+              <a:defRPr sz="1050" kern="1200">
+                <a:solidFill>
+                  <a:schemeClr val="tx1"/>
+                </a:solidFill>
+                <a:latin typeface="微软雅黑" panose="020B0503020204020204" pitchFamily="34" charset="-122"/>
+                <a:ea typeface="微软雅黑" panose="020B0503020204020204" pitchFamily="34" charset="-122"/>
+                <a:cs typeface="+mn-cs"/>
+              </a:defRPr>
+            </a:lvl9pPr>
+          </a:lstStyle>
+          <a:p>
+            <a:r>
+              <a:rPr lang="en-US" altLang="zh-CN" b="1" dirty="0" smtClean="0">
+                <a:solidFill>
+                  <a:srgbClr val="7030A0"/>
+                </a:solidFill>
+              </a:rPr>
+              <a:t>Type </a:t>
+            </a:r>
+            <a:r>
+              <a:rPr lang="en-US" altLang="zh-CN" b="1" dirty="0">
+                <a:solidFill>
+                  <a:srgbClr val="7030A0"/>
+                </a:solidFill>
+              </a:rPr>
+              <a:t>inference </a:t>
+            </a:r>
+            <a:r>
+              <a:rPr lang="en-US" altLang="zh-CN" dirty="0"/>
+              <a:t>determines the type of a language construct from the way </a:t>
+            </a:r>
+            <a:r>
+              <a:rPr lang="en-US" altLang="zh-CN" dirty="0" smtClean="0"/>
+              <a:t>it is </a:t>
+            </a:r>
+            <a:r>
+              <a:rPr lang="en-US" altLang="zh-CN" dirty="0"/>
+              <a:t>used.</a:t>
+            </a:r>
+            <a:endParaRPr lang="zh-CN" altLang="en-US" dirty="0"/>
+          </a:p>
+        </p:txBody>
+      </p:sp>
+      <p:pic>
+        <p:nvPicPr>
+          <p:cNvPr id="7" name="图片 6"/>
+          <p:cNvPicPr>
+            <a:picLocks noChangeAspect="1"/>
+          </p:cNvPicPr>
+          <p:nvPr/>
+        </p:nvPicPr>
+        <p:blipFill>
+          <a:blip r:embed="rId2"/>
+          <a:stretch>
+            <a:fillRect/>
+          </a:stretch>
+        </p:blipFill>
+        <p:spPr>
+          <a:xfrm>
+            <a:off x="2881992" y="2586603"/>
+            <a:ext cx="3780552" cy="733540"/>
+          </a:xfrm>
+          <a:prstGeom prst="rect">
+            <a:avLst/>
+          </a:prstGeom>
+        </p:spPr>
+      </p:pic>
+      <p:pic>
+        <p:nvPicPr>
+          <p:cNvPr id="8" name="图片 7"/>
+          <p:cNvPicPr>
+            <a:picLocks noChangeAspect="1"/>
+          </p:cNvPicPr>
+          <p:nvPr/>
+        </p:nvPicPr>
+        <p:blipFill>
+          <a:blip r:embed="rId3"/>
+          <a:stretch>
+            <a:fillRect/>
+          </a:stretch>
+        </p:blipFill>
+        <p:spPr>
+          <a:xfrm>
+            <a:off x="2575151" y="4498294"/>
+            <a:ext cx="5471048" cy="707572"/>
+          </a:xfrm>
+          <a:prstGeom prst="rect">
+            <a:avLst/>
+          </a:prstGeom>
+        </p:spPr>
+      </p:pic>
+    </p:spTree>
+    <p:extLst>
+      <p:ext uri="{BB962C8B-B14F-4D97-AF65-F5344CB8AC3E}">
+        <p14:creationId xmlns:p14="http://schemas.microsoft.com/office/powerpoint/2010/main" val="2891057639"/>
+      </p:ext>
+    </p:extLst>
+  </p:cSld>
+  <p:clrMapOvr>
+    <a:masterClrMapping/>
+  </p:clrMapOvr>
+  <mc:AlternateContent xmlns:mc="http://schemas.openxmlformats.org/markup-compatibility/2006" xmlns:p14="http://schemas.microsoft.com/office/powerpoint/2010/main">
+    <mc:Choice Requires="p14">
+      <p:transition spd="med" p14:dur="700">
+        <p:fade/>
+      </p:transition>
+    </mc:Choice>
+    <mc:Fallback xmlns="">
+      <p:transition spd="med">
+        <p:fade/>
+      </p:transition>
+    </mc:Fallback>
+  </mc:AlternateContent>
+</p:sld>
+</file>
+
+<file path=ppt/slides/slide28.xml><?xml version="1.0" encoding="utf-8"?>
+<p:sld xmlns:a="http://schemas.openxmlformats.org/drawingml/2006/main" xmlns:r="http://schemas.openxmlformats.org/officeDocument/2006/relationships" xmlns:p="http://schemas.openxmlformats.org/presentationml/2006/main">
+  <p:cSld>
+    <p:spTree>
+      <p:nvGrpSpPr>
+        <p:cNvPr id="1" name=""/>
+        <p:cNvGrpSpPr/>
+        <p:nvPr/>
+      </p:nvGrpSpPr>
+      <p:grpSpPr>
+        <a:xfrm>
+          <a:off x="0" y="0"/>
+          <a:ext cx="0" cy="0"/>
+          <a:chOff x="0" y="0"/>
+          <a:chExt cx="0" cy="0"/>
+        </a:xfrm>
+      </p:grpSpPr>
+      <p:sp>
+        <p:nvSpPr>
+          <p:cNvPr id="2" name="标题 1"/>
+          <p:cNvSpPr>
+            <a:spLocks noGrp="1"/>
+          </p:cNvSpPr>
+          <p:nvPr>
+            <p:ph type="title"/>
+          </p:nvPr>
+        </p:nvSpPr>
+        <p:spPr/>
+        <p:txBody>
+          <a:bodyPr/>
+          <a:lstStyle/>
+          <a:p>
+            <a:r>
+              <a:rPr lang="en-US" altLang="zh-CN" dirty="0" smtClean="0"/>
+              <a:t>7.5 </a:t>
+            </a:r>
+            <a:r>
+              <a:rPr lang="en-US" altLang="zh-CN" dirty="0"/>
+              <a:t>Type checking-Type Conversions</a:t>
+            </a:r>
+            <a:endParaRPr lang="zh-CN" altLang="en-US" dirty="0"/>
+          </a:p>
+        </p:txBody>
+      </p:sp>
+      <p:sp>
+        <p:nvSpPr>
+          <p:cNvPr id="3" name="内容占位符 2"/>
+          <p:cNvSpPr>
+            <a:spLocks noGrp="1"/>
+          </p:cNvSpPr>
+          <p:nvPr>
+            <p:ph idx="1"/>
+          </p:nvPr>
+        </p:nvSpPr>
+        <p:spPr>
+          <a:xfrm>
+            <a:off x="828675" y="1600200"/>
+            <a:ext cx="7486650" cy="1404257"/>
+          </a:xfrm>
+        </p:spPr>
+        <p:txBody>
+          <a:bodyPr>
+            <a:normAutofit/>
+          </a:bodyPr>
+          <a:lstStyle/>
+          <a:p>
+            <a:r>
+              <a:rPr lang="en-US" altLang="zh-CN" dirty="0"/>
+              <a:t>Consider expressions like </a:t>
+            </a:r>
+            <a:r>
+              <a:rPr lang="en-US" altLang="zh-CN" b="1" i="1" dirty="0">
+                <a:solidFill>
+                  <a:srgbClr val="7030A0"/>
+                </a:solidFill>
+              </a:rPr>
+              <a:t>x + </a:t>
+            </a:r>
+            <a:r>
+              <a:rPr lang="en-US" altLang="zh-CN" b="1" i="1" dirty="0" err="1">
+                <a:solidFill>
+                  <a:srgbClr val="7030A0"/>
+                </a:solidFill>
+              </a:rPr>
+              <a:t>i</a:t>
+            </a:r>
+            <a:r>
+              <a:rPr lang="en-US" altLang="zh-CN" dirty="0"/>
+              <a:t>, where </a:t>
+            </a:r>
+            <a:r>
+              <a:rPr lang="en-US" altLang="zh-CN" b="1" i="1" dirty="0">
+                <a:solidFill>
+                  <a:srgbClr val="7030A0"/>
+                </a:solidFill>
+              </a:rPr>
+              <a:t>x</a:t>
+            </a:r>
+            <a:r>
+              <a:rPr lang="en-US" altLang="zh-CN" dirty="0"/>
+              <a:t> is of type float and</a:t>
+            </a:r>
+            <a:r>
+              <a:rPr lang="en-US" altLang="zh-CN" i="1" dirty="0">
+                <a:solidFill>
+                  <a:srgbClr val="7030A0"/>
+                </a:solidFill>
+              </a:rPr>
+              <a:t> </a:t>
+            </a:r>
+            <a:r>
+              <a:rPr lang="en-US" altLang="zh-CN" i="1" dirty="0" err="1">
+                <a:solidFill>
+                  <a:srgbClr val="7030A0"/>
+                </a:solidFill>
+              </a:rPr>
+              <a:t>i</a:t>
+            </a:r>
+            <a:r>
+              <a:rPr lang="en-US" altLang="zh-CN" i="1" dirty="0">
+                <a:solidFill>
+                  <a:srgbClr val="7030A0"/>
+                </a:solidFill>
+              </a:rPr>
+              <a:t> </a:t>
+            </a:r>
+            <a:r>
+              <a:rPr lang="en-US" altLang="zh-CN" dirty="0"/>
+              <a:t>is of type </a:t>
+            </a:r>
+            <a:r>
+              <a:rPr lang="en-US" altLang="zh-CN" dirty="0" smtClean="0"/>
+              <a:t>integer. Since </a:t>
+            </a:r>
+            <a:r>
+              <a:rPr lang="en-US" altLang="zh-CN" dirty="0"/>
+              <a:t>the representation of integers and floating-point numbers is </a:t>
+            </a:r>
+            <a:r>
+              <a:rPr lang="en-US" altLang="zh-CN" dirty="0" smtClean="0"/>
+              <a:t>different within </a:t>
+            </a:r>
+            <a:r>
+              <a:rPr lang="en-US" altLang="zh-CN" dirty="0"/>
+              <a:t>a computer and different machine instructions are used for </a:t>
+            </a:r>
+            <a:r>
+              <a:rPr lang="en-US" altLang="zh-CN" dirty="0" smtClean="0"/>
+              <a:t>operations on </a:t>
+            </a:r>
+            <a:r>
+              <a:rPr lang="en-US" altLang="zh-CN" dirty="0"/>
+              <a:t>integers and floats, the compiler may need to convert one of the operands </a:t>
+            </a:r>
+            <a:r>
+              <a:rPr lang="en-US" altLang="zh-CN" dirty="0" smtClean="0"/>
+              <a:t>of </a:t>
+            </a:r>
+            <a:r>
+              <a:rPr lang="en-US" altLang="zh-CN" b="1" dirty="0" smtClean="0">
+                <a:solidFill>
+                  <a:srgbClr val="7030A0"/>
+                </a:solidFill>
+              </a:rPr>
+              <a:t>+</a:t>
+            </a:r>
+            <a:r>
+              <a:rPr lang="en-US" altLang="zh-CN" dirty="0" smtClean="0"/>
+              <a:t> </a:t>
+            </a:r>
+            <a:r>
+              <a:rPr lang="en-US" altLang="zh-CN" dirty="0"/>
+              <a:t>to ensure that both operands are of the same type when the </a:t>
+            </a:r>
+            <a:r>
+              <a:rPr lang="en-US" altLang="zh-CN" dirty="0" smtClean="0"/>
+              <a:t>addition occurs</a:t>
+            </a:r>
+            <a:r>
+              <a:rPr lang="en-US" altLang="zh-CN" dirty="0"/>
+              <a:t>.</a:t>
+            </a:r>
+            <a:endParaRPr lang="zh-CN" altLang="en-US" dirty="0"/>
+          </a:p>
+        </p:txBody>
+      </p:sp>
+      <p:pic>
+        <p:nvPicPr>
+          <p:cNvPr id="4" name="图片 3"/>
+          <p:cNvPicPr>
+            <a:picLocks noChangeAspect="1"/>
+          </p:cNvPicPr>
+          <p:nvPr/>
+        </p:nvPicPr>
+        <p:blipFill>
+          <a:blip r:embed="rId2"/>
+          <a:stretch>
+            <a:fillRect/>
+          </a:stretch>
+        </p:blipFill>
+        <p:spPr>
+          <a:xfrm>
+            <a:off x="3365726" y="2814637"/>
+            <a:ext cx="2175103" cy="766763"/>
+          </a:xfrm>
+          <a:prstGeom prst="rect">
+            <a:avLst/>
+          </a:prstGeom>
+        </p:spPr>
+      </p:pic>
+      <p:pic>
+        <p:nvPicPr>
+          <p:cNvPr id="9" name="图片 8"/>
+          <p:cNvPicPr>
+            <a:picLocks noChangeAspect="1"/>
+          </p:cNvPicPr>
+          <p:nvPr/>
+        </p:nvPicPr>
+        <p:blipFill>
+          <a:blip r:embed="rId3"/>
+          <a:stretch>
+            <a:fillRect/>
+          </a:stretch>
+        </p:blipFill>
+        <p:spPr>
+          <a:xfrm>
+            <a:off x="1514814" y="3873953"/>
+            <a:ext cx="6354991" cy="1264103"/>
+          </a:xfrm>
+          <a:prstGeom prst="rect">
+            <a:avLst/>
+          </a:prstGeom>
+        </p:spPr>
+      </p:pic>
+    </p:spTree>
+    <p:extLst>
+      <p:ext uri="{BB962C8B-B14F-4D97-AF65-F5344CB8AC3E}">
+        <p14:creationId xmlns:p14="http://schemas.microsoft.com/office/powerpoint/2010/main" val="458694124"/>
+      </p:ext>
+    </p:extLst>
+  </p:cSld>
+  <p:clrMapOvr>
+    <a:masterClrMapping/>
+  </p:clrMapOvr>
+  <mc:AlternateContent xmlns:mc="http://schemas.openxmlformats.org/markup-compatibility/2006" xmlns:p14="http://schemas.microsoft.com/office/powerpoint/2010/main">
+    <mc:Choice Requires="p14">
+      <p:transition spd="med" p14:dur="700">
+        <p:fade/>
+      </p:transition>
+    </mc:Choice>
+    <mc:Fallback xmlns="">
+      <p:transition spd="med">
+        <p:fade/>
+      </p:transition>
+    </mc:Fallback>
+  </mc:AlternateContent>
+</p:sld>
+</file>
+
+<file path=ppt/slides/slide29.xml><?xml version="1.0" encoding="utf-8"?>
+<p:sld xmlns:a="http://schemas.openxmlformats.org/drawingml/2006/main" xmlns:r="http://schemas.openxmlformats.org/officeDocument/2006/relationships" xmlns:p="http://schemas.openxmlformats.org/presentationml/2006/main">
+  <p:cSld>
+    <p:spTree>
+      <p:nvGrpSpPr>
+        <p:cNvPr id="1" name=""/>
+        <p:cNvGrpSpPr/>
+        <p:nvPr/>
+      </p:nvGrpSpPr>
+      <p:grpSpPr>
+        <a:xfrm>
+          <a:off x="0" y="0"/>
+          <a:ext cx="0" cy="0"/>
+          <a:chOff x="0" y="0"/>
+          <a:chExt cx="0" cy="0"/>
+        </a:xfrm>
+      </p:grpSpPr>
+      <p:sp>
+        <p:nvSpPr>
+          <p:cNvPr id="2" name="标题 1"/>
+          <p:cNvSpPr>
+            <a:spLocks noGrp="1"/>
+          </p:cNvSpPr>
+          <p:nvPr>
+            <p:ph type="title"/>
+          </p:nvPr>
+        </p:nvSpPr>
+        <p:spPr/>
+        <p:txBody>
+          <a:bodyPr/>
+          <a:lstStyle/>
+          <a:p>
+            <a:r>
+              <a:rPr lang="en-US" altLang="zh-CN" dirty="0" smtClean="0"/>
+              <a:t>7.5 </a:t>
+            </a:r>
+            <a:r>
+              <a:rPr lang="en-US" altLang="zh-CN" dirty="0"/>
+              <a:t>Type checking-Type Conversions</a:t>
+            </a:r>
+            <a:endParaRPr lang="zh-CN" altLang="en-US" dirty="0"/>
+          </a:p>
+        </p:txBody>
+      </p:sp>
+      <p:sp>
+        <p:nvSpPr>
+          <p:cNvPr id="3" name="内容占位符 2"/>
+          <p:cNvSpPr>
+            <a:spLocks noGrp="1"/>
+          </p:cNvSpPr>
+          <p:nvPr>
+            <p:ph idx="1"/>
+          </p:nvPr>
+        </p:nvSpPr>
+        <p:spPr>
+          <a:xfrm>
+            <a:off x="828675" y="1600200"/>
+            <a:ext cx="7486650" cy="1404257"/>
+          </a:xfrm>
+        </p:spPr>
+        <p:txBody>
+          <a:bodyPr>
+            <a:normAutofit/>
+          </a:bodyPr>
+          <a:lstStyle/>
+          <a:p>
+            <a:r>
+              <a:rPr lang="en-US" altLang="zh-CN" dirty="0"/>
+              <a:t>Type conversion rules vary </a:t>
+            </a:r>
+            <a:r>
+              <a:rPr lang="en-US" altLang="zh-CN" dirty="0" smtClean="0"/>
+              <a:t>from </a:t>
+            </a:r>
+            <a:r>
+              <a:rPr lang="en-US" altLang="zh-CN" dirty="0"/>
+              <a:t>language to language. The rules for </a:t>
+            </a:r>
+            <a:r>
+              <a:rPr lang="en-US" altLang="zh-CN" dirty="0" smtClean="0"/>
+              <a:t>Java in the following figure </a:t>
+            </a:r>
+            <a:r>
+              <a:rPr lang="en-US" altLang="zh-CN" dirty="0"/>
+              <a:t>distinguish between </a:t>
+            </a:r>
+            <a:r>
+              <a:rPr lang="en-US" altLang="zh-CN" b="1" dirty="0">
+                <a:solidFill>
+                  <a:srgbClr val="7030A0"/>
+                </a:solidFill>
+              </a:rPr>
+              <a:t>widening</a:t>
+            </a:r>
+            <a:r>
+              <a:rPr lang="en-US" altLang="zh-CN" dirty="0"/>
+              <a:t> conversions, which are intended </a:t>
+            </a:r>
+            <a:r>
+              <a:rPr lang="en-US" altLang="zh-CN" dirty="0" smtClean="0"/>
+              <a:t>to preserve </a:t>
+            </a:r>
+            <a:r>
+              <a:rPr lang="en-US" altLang="zh-CN" dirty="0"/>
+              <a:t>information, and </a:t>
+            </a:r>
+            <a:r>
+              <a:rPr lang="en-US" altLang="zh-CN" b="1" dirty="0">
+                <a:solidFill>
+                  <a:srgbClr val="7030A0"/>
+                </a:solidFill>
+              </a:rPr>
+              <a:t>narrowing</a:t>
+            </a:r>
+            <a:r>
+              <a:rPr lang="en-US" altLang="zh-CN" dirty="0">
+                <a:solidFill>
+                  <a:srgbClr val="7030A0"/>
+                </a:solidFill>
+              </a:rPr>
+              <a:t> </a:t>
+            </a:r>
+            <a:r>
+              <a:rPr lang="en-US" altLang="zh-CN" dirty="0"/>
+              <a:t>conversions, which can lose </a:t>
+            </a:r>
+            <a:r>
+              <a:rPr lang="en-US" altLang="zh-CN" dirty="0" smtClean="0"/>
+              <a:t>information.</a:t>
+            </a:r>
+            <a:endParaRPr lang="zh-CN" altLang="en-US" dirty="0"/>
+          </a:p>
+        </p:txBody>
+      </p:sp>
+      <p:pic>
+        <p:nvPicPr>
+          <p:cNvPr id="5" name="图片 4"/>
+          <p:cNvPicPr>
+            <a:picLocks noChangeAspect="1"/>
+          </p:cNvPicPr>
+          <p:nvPr/>
+        </p:nvPicPr>
+        <p:blipFill>
+          <a:blip r:embed="rId2"/>
+          <a:stretch>
+            <a:fillRect/>
+          </a:stretch>
+        </p:blipFill>
+        <p:spPr>
+          <a:xfrm>
+            <a:off x="2137793" y="2708501"/>
+            <a:ext cx="4867275" cy="3248025"/>
+          </a:xfrm>
+          <a:prstGeom prst="rect">
+            <a:avLst/>
+          </a:prstGeom>
+        </p:spPr>
+      </p:pic>
+    </p:spTree>
+    <p:extLst>
+      <p:ext uri="{BB962C8B-B14F-4D97-AF65-F5344CB8AC3E}">
+        <p14:creationId xmlns:p14="http://schemas.microsoft.com/office/powerpoint/2010/main" val="2235248527"/>
       </p:ext>
     </p:extLst>
   </p:cSld>
@@ -8199,8 +10712,50 @@
             </a:r>
             <a:r>
               <a:rPr lang="en-US" altLang="zh-CN" dirty="0"/>
-              <a:t>of Expressions</a:t>
-            </a:r>
+              <a:t>of </a:t>
+            </a:r>
+            <a:r>
+              <a:rPr lang="en-US" altLang="zh-CN" dirty="0" smtClean="0"/>
+              <a:t>Expressions</a:t>
+            </a:r>
+          </a:p>
+          <a:p>
+            <a:r>
+              <a:rPr lang="en-US" altLang="zh-CN" dirty="0" smtClean="0"/>
+              <a:t>Type Checking</a:t>
+            </a:r>
+          </a:p>
+          <a:p>
+            <a:r>
+              <a:rPr lang="en-US" altLang="zh-CN" dirty="0" smtClean="0"/>
+              <a:t>Control Flow</a:t>
+            </a:r>
+          </a:p>
+          <a:p>
+            <a:r>
+              <a:rPr lang="en-US" altLang="zh-CN" dirty="0"/>
+              <a:t>Switch- </a:t>
+            </a:r>
+            <a:r>
+              <a:rPr lang="en-US" altLang="zh-CN" dirty="0" smtClean="0"/>
+              <a:t>Statements</a:t>
+            </a:r>
+          </a:p>
+          <a:p>
+            <a:r>
+              <a:rPr lang="it-IT" altLang="zh-CN" dirty="0"/>
+              <a:t>Intermediate Code </a:t>
+            </a:r>
+            <a:r>
+              <a:rPr lang="it-IT" altLang="zh-CN" dirty="0" smtClean="0"/>
+              <a:t>for Procedures</a:t>
+            </a:r>
+            <a:endParaRPr lang="en-US" altLang="zh-CN" dirty="0" smtClean="0"/>
+          </a:p>
+          <a:p>
+            <a:endParaRPr lang="en-US" altLang="zh-CN" dirty="0" smtClean="0"/>
+          </a:p>
+          <a:p>
             <a:endParaRPr lang="en-US" altLang="zh-CN" dirty="0"/>
           </a:p>
           <a:p>
@@ -8233,6 +10788,1339 @@
     <p:extLst>
       <p:ext uri="{BB962C8B-B14F-4D97-AF65-F5344CB8AC3E}">
         <p14:creationId xmlns:p14="http://schemas.microsoft.com/office/powerpoint/2010/main" val="1955709725"/>
+      </p:ext>
+    </p:extLst>
+  </p:cSld>
+  <p:clrMapOvr>
+    <a:masterClrMapping/>
+  </p:clrMapOvr>
+  <mc:AlternateContent xmlns:mc="http://schemas.openxmlformats.org/markup-compatibility/2006" xmlns:p14="http://schemas.microsoft.com/office/powerpoint/2010/main">
+    <mc:Choice Requires="p14">
+      <p:transition spd="med" p14:dur="700">
+        <p:fade/>
+      </p:transition>
+    </mc:Choice>
+    <mc:Fallback xmlns="">
+      <p:transition spd="med">
+        <p:fade/>
+      </p:transition>
+    </mc:Fallback>
+  </mc:AlternateContent>
+</p:sld>
+</file>
+
+<file path=ppt/slides/slide30.xml><?xml version="1.0" encoding="utf-8"?>
+<p:sld xmlns:a="http://schemas.openxmlformats.org/drawingml/2006/main" xmlns:r="http://schemas.openxmlformats.org/officeDocument/2006/relationships" xmlns:p="http://schemas.openxmlformats.org/presentationml/2006/main">
+  <p:cSld>
+    <p:spTree>
+      <p:nvGrpSpPr>
+        <p:cNvPr id="1" name=""/>
+        <p:cNvGrpSpPr/>
+        <p:nvPr/>
+      </p:nvGrpSpPr>
+      <p:grpSpPr>
+        <a:xfrm>
+          <a:off x="0" y="0"/>
+          <a:ext cx="0" cy="0"/>
+          <a:chOff x="0" y="0"/>
+          <a:chExt cx="0" cy="0"/>
+        </a:xfrm>
+      </p:grpSpPr>
+      <p:sp>
+        <p:nvSpPr>
+          <p:cNvPr id="2" name="标题 1"/>
+          <p:cNvSpPr>
+            <a:spLocks noGrp="1"/>
+          </p:cNvSpPr>
+          <p:nvPr>
+            <p:ph type="title"/>
+          </p:nvPr>
+        </p:nvSpPr>
+        <p:spPr/>
+        <p:txBody>
+          <a:bodyPr/>
+          <a:lstStyle/>
+          <a:p>
+            <a:r>
+              <a:rPr lang="en-US" altLang="zh-CN" dirty="0" smtClean="0"/>
+              <a:t>7.5 </a:t>
+            </a:r>
+            <a:r>
+              <a:rPr lang="en-US" altLang="zh-CN" dirty="0"/>
+              <a:t>Type checking-Type Conversions</a:t>
+            </a:r>
+            <a:endParaRPr lang="zh-CN" altLang="en-US" dirty="0"/>
+          </a:p>
+        </p:txBody>
+      </p:sp>
+      <p:pic>
+        <p:nvPicPr>
+          <p:cNvPr id="6" name="图片 5"/>
+          <p:cNvPicPr>
+            <a:picLocks noChangeAspect="1"/>
+          </p:cNvPicPr>
+          <p:nvPr/>
+        </p:nvPicPr>
+        <p:blipFill>
+          <a:blip r:embed="rId2"/>
+          <a:stretch>
+            <a:fillRect/>
+          </a:stretch>
+        </p:blipFill>
+        <p:spPr>
+          <a:xfrm>
+            <a:off x="922564" y="1709058"/>
+            <a:ext cx="3771900" cy="2590800"/>
+          </a:xfrm>
+          <a:prstGeom prst="rect">
+            <a:avLst/>
+          </a:prstGeom>
+        </p:spPr>
+      </p:pic>
+      <p:pic>
+        <p:nvPicPr>
+          <p:cNvPr id="7" name="图片 6"/>
+          <p:cNvPicPr>
+            <a:picLocks noChangeAspect="1"/>
+          </p:cNvPicPr>
+          <p:nvPr/>
+        </p:nvPicPr>
+        <p:blipFill>
+          <a:blip r:embed="rId3"/>
+          <a:stretch>
+            <a:fillRect/>
+          </a:stretch>
+        </p:blipFill>
+        <p:spPr>
+          <a:xfrm>
+            <a:off x="3666444" y="4702629"/>
+            <a:ext cx="4772025" cy="1676400"/>
+          </a:xfrm>
+          <a:prstGeom prst="rect">
+            <a:avLst/>
+          </a:prstGeom>
+        </p:spPr>
+      </p:pic>
+    </p:spTree>
+    <p:extLst>
+      <p:ext uri="{BB962C8B-B14F-4D97-AF65-F5344CB8AC3E}">
+        <p14:creationId xmlns:p14="http://schemas.microsoft.com/office/powerpoint/2010/main" val="3306091539"/>
+      </p:ext>
+    </p:extLst>
+  </p:cSld>
+  <p:clrMapOvr>
+    <a:masterClrMapping/>
+  </p:clrMapOvr>
+  <mc:AlternateContent xmlns:mc="http://schemas.openxmlformats.org/markup-compatibility/2006" xmlns:p14="http://schemas.microsoft.com/office/powerpoint/2010/main">
+    <mc:Choice Requires="p14">
+      <p:transition spd="med" p14:dur="700">
+        <p:fade/>
+      </p:transition>
+    </mc:Choice>
+    <mc:Fallback xmlns="">
+      <p:transition spd="med">
+        <p:fade/>
+      </p:transition>
+    </mc:Fallback>
+  </mc:AlternateContent>
+</p:sld>
+</file>
+
+<file path=ppt/slides/slide31.xml><?xml version="1.0" encoding="utf-8"?>
+<p:sld xmlns:a="http://schemas.openxmlformats.org/drawingml/2006/main" xmlns:r="http://schemas.openxmlformats.org/officeDocument/2006/relationships" xmlns:p="http://schemas.openxmlformats.org/presentationml/2006/main">
+  <p:cSld>
+    <p:spTree>
+      <p:nvGrpSpPr>
+        <p:cNvPr id="1" name=""/>
+        <p:cNvGrpSpPr/>
+        <p:nvPr/>
+      </p:nvGrpSpPr>
+      <p:grpSpPr>
+        <a:xfrm>
+          <a:off x="0" y="0"/>
+          <a:ext cx="0" cy="0"/>
+          <a:chOff x="0" y="0"/>
+          <a:chExt cx="0" cy="0"/>
+        </a:xfrm>
+      </p:grpSpPr>
+      <p:sp>
+        <p:nvSpPr>
+          <p:cNvPr id="2" name="标题 1"/>
+          <p:cNvSpPr>
+            <a:spLocks noGrp="1"/>
+          </p:cNvSpPr>
+          <p:nvPr>
+            <p:ph type="title"/>
+          </p:nvPr>
+        </p:nvSpPr>
+        <p:spPr/>
+        <p:txBody>
+          <a:bodyPr/>
+          <a:lstStyle/>
+          <a:p>
+            <a:r>
+              <a:rPr lang="en-US" altLang="zh-CN" dirty="0" smtClean="0"/>
+              <a:t>7.6 Control Flow – Introduction</a:t>
+            </a:r>
+            <a:endParaRPr lang="zh-CN" altLang="en-US" dirty="0"/>
+          </a:p>
+        </p:txBody>
+      </p:sp>
+      <p:pic>
+        <p:nvPicPr>
+          <p:cNvPr id="3" name="图片 2"/>
+          <p:cNvPicPr>
+            <a:picLocks noChangeAspect="1"/>
+          </p:cNvPicPr>
+          <p:nvPr/>
+        </p:nvPicPr>
+        <p:blipFill>
+          <a:blip r:embed="rId2"/>
+          <a:stretch>
+            <a:fillRect/>
+          </a:stretch>
+        </p:blipFill>
+        <p:spPr>
+          <a:xfrm>
+            <a:off x="329408" y="1617208"/>
+            <a:ext cx="7984779" cy="3499077"/>
+          </a:xfrm>
+          <a:prstGeom prst="rect">
+            <a:avLst/>
+          </a:prstGeom>
+        </p:spPr>
+      </p:pic>
+      <p:cxnSp>
+        <p:nvCxnSpPr>
+          <p:cNvPr id="5" name="直接连接符 4"/>
+          <p:cNvCxnSpPr/>
+          <p:nvPr/>
+        </p:nvCxnSpPr>
+        <p:spPr>
+          <a:xfrm flipV="1">
+            <a:off x="1088571" y="2960914"/>
+            <a:ext cx="2329543" cy="10886"/>
+          </a:xfrm>
+          <a:prstGeom prst="line">
+            <a:avLst/>
+          </a:prstGeom>
+          <a:ln/>
+        </p:spPr>
+        <p:style>
+          <a:lnRef idx="2">
+            <a:schemeClr val="accent5"/>
+          </a:lnRef>
+          <a:fillRef idx="0">
+            <a:schemeClr val="accent5"/>
+          </a:fillRef>
+          <a:effectRef idx="1">
+            <a:schemeClr val="accent5"/>
+          </a:effectRef>
+          <a:fontRef idx="minor">
+            <a:schemeClr val="tx1"/>
+          </a:fontRef>
+        </p:style>
+      </p:cxnSp>
+      <p:cxnSp>
+        <p:nvCxnSpPr>
+          <p:cNvPr id="8" name="直接连接符 7"/>
+          <p:cNvCxnSpPr/>
+          <p:nvPr/>
+        </p:nvCxnSpPr>
+        <p:spPr>
+          <a:xfrm flipV="1">
+            <a:off x="1088570" y="4463142"/>
+            <a:ext cx="2329543" cy="10886"/>
+          </a:xfrm>
+          <a:prstGeom prst="line">
+            <a:avLst/>
+          </a:prstGeom>
+          <a:ln/>
+        </p:spPr>
+        <p:style>
+          <a:lnRef idx="2">
+            <a:schemeClr val="accent5"/>
+          </a:lnRef>
+          <a:fillRef idx="0">
+            <a:schemeClr val="accent5"/>
+          </a:fillRef>
+          <a:effectRef idx="1">
+            <a:schemeClr val="accent5"/>
+          </a:effectRef>
+          <a:fontRef idx="minor">
+            <a:schemeClr val="tx1"/>
+          </a:fontRef>
+        </p:style>
+      </p:cxnSp>
+    </p:spTree>
+    <p:extLst>
+      <p:ext uri="{BB962C8B-B14F-4D97-AF65-F5344CB8AC3E}">
+        <p14:creationId xmlns:p14="http://schemas.microsoft.com/office/powerpoint/2010/main" val="3700396542"/>
+      </p:ext>
+    </p:extLst>
+  </p:cSld>
+  <p:clrMapOvr>
+    <a:masterClrMapping/>
+  </p:clrMapOvr>
+  <mc:AlternateContent xmlns:mc="http://schemas.openxmlformats.org/markup-compatibility/2006" xmlns:p14="http://schemas.microsoft.com/office/powerpoint/2010/main">
+    <mc:Choice Requires="p14">
+      <p:transition spd="med" p14:dur="700">
+        <p:fade/>
+      </p:transition>
+    </mc:Choice>
+    <mc:Fallback xmlns="">
+      <p:transition spd="med">
+        <p:fade/>
+      </p:transition>
+    </mc:Fallback>
+  </mc:AlternateContent>
+</p:sld>
+</file>
+
+<file path=ppt/slides/slide32.xml><?xml version="1.0" encoding="utf-8"?>
+<p:sld xmlns:a="http://schemas.openxmlformats.org/drawingml/2006/main" xmlns:r="http://schemas.openxmlformats.org/officeDocument/2006/relationships" xmlns:p="http://schemas.openxmlformats.org/presentationml/2006/main">
+  <p:cSld>
+    <p:spTree>
+      <p:nvGrpSpPr>
+        <p:cNvPr id="1" name=""/>
+        <p:cNvGrpSpPr/>
+        <p:nvPr/>
+      </p:nvGrpSpPr>
+      <p:grpSpPr>
+        <a:xfrm>
+          <a:off x="0" y="0"/>
+          <a:ext cx="0" cy="0"/>
+          <a:chOff x="0" y="0"/>
+          <a:chExt cx="0" cy="0"/>
+        </a:xfrm>
+      </p:grpSpPr>
+      <p:sp>
+        <p:nvSpPr>
+          <p:cNvPr id="2" name="标题 1"/>
+          <p:cNvSpPr>
+            <a:spLocks noGrp="1"/>
+          </p:cNvSpPr>
+          <p:nvPr>
+            <p:ph type="title"/>
+          </p:nvPr>
+        </p:nvSpPr>
+        <p:spPr/>
+        <p:txBody>
+          <a:bodyPr/>
+          <a:lstStyle/>
+          <a:p>
+            <a:r>
+              <a:rPr lang="en-US" altLang="zh-CN" dirty="0" smtClean="0"/>
+              <a:t>7.6 Control Flow </a:t>
+            </a:r>
+            <a:r>
+              <a:rPr lang="en-US" altLang="zh-CN" dirty="0"/>
+              <a:t>– Boolean Expressions</a:t>
+            </a:r>
+            <a:endParaRPr lang="zh-CN" altLang="en-US" dirty="0"/>
+          </a:p>
+        </p:txBody>
+      </p:sp>
+      <p:pic>
+        <p:nvPicPr>
+          <p:cNvPr id="4" name="图片 3"/>
+          <p:cNvPicPr>
+            <a:picLocks noChangeAspect="1"/>
+          </p:cNvPicPr>
+          <p:nvPr/>
+        </p:nvPicPr>
+        <p:blipFill>
+          <a:blip r:embed="rId2"/>
+          <a:stretch>
+            <a:fillRect/>
+          </a:stretch>
+        </p:blipFill>
+        <p:spPr>
+          <a:xfrm>
+            <a:off x="1277710" y="1364633"/>
+            <a:ext cx="6000750" cy="457200"/>
+          </a:xfrm>
+          <a:prstGeom prst="rect">
+            <a:avLst/>
+          </a:prstGeom>
+        </p:spPr>
+      </p:pic>
+      <p:sp>
+        <p:nvSpPr>
+          <p:cNvPr id="6" name="矩形 5"/>
+          <p:cNvSpPr/>
+          <p:nvPr/>
+        </p:nvSpPr>
+        <p:spPr>
+          <a:xfrm>
+            <a:off x="980394" y="1884847"/>
+            <a:ext cx="7182072" cy="1200329"/>
+          </a:xfrm>
+          <a:prstGeom prst="rect">
+            <a:avLst/>
+          </a:prstGeom>
+        </p:spPr>
+        <p:txBody>
+          <a:bodyPr wrap="square">
+            <a:spAutoFit/>
+          </a:bodyPr>
+          <a:lstStyle/>
+          <a:p>
+            <a:r>
+              <a:rPr lang="en-US" altLang="zh-CN" dirty="0"/>
+              <a:t>In </a:t>
+            </a:r>
+            <a:r>
+              <a:rPr lang="en-US" altLang="zh-CN" b="1" dirty="0">
+                <a:solidFill>
+                  <a:srgbClr val="7030A0"/>
+                </a:solidFill>
+              </a:rPr>
+              <a:t>short-circuit (or jumping) </a:t>
+            </a:r>
+            <a:r>
+              <a:rPr lang="en-US" altLang="zh-CN" dirty="0"/>
+              <a:t>code, the </a:t>
+            </a:r>
+            <a:r>
+              <a:rPr lang="en-US" altLang="zh-CN" dirty="0" smtClean="0"/>
+              <a:t>Boolean operators </a:t>
+            </a:r>
+            <a:r>
+              <a:rPr lang="en-US" altLang="zh-CN" dirty="0">
+                <a:solidFill>
+                  <a:srgbClr val="7030A0"/>
+                </a:solidFill>
+              </a:rPr>
+              <a:t>&amp;&amp;</a:t>
+            </a:r>
+            <a:r>
+              <a:rPr lang="en-US" altLang="zh-CN" dirty="0"/>
+              <a:t>, </a:t>
+            </a:r>
+            <a:r>
+              <a:rPr lang="en-US" altLang="zh-CN" b="1" dirty="0" smtClean="0">
+                <a:solidFill>
+                  <a:srgbClr val="7030A0"/>
+                </a:solidFill>
+              </a:rPr>
+              <a:t>||</a:t>
+            </a:r>
+            <a:r>
+              <a:rPr lang="en-US" altLang="zh-CN" dirty="0" smtClean="0"/>
+              <a:t>, </a:t>
+            </a:r>
+            <a:r>
+              <a:rPr lang="en-US" altLang="zh-CN" dirty="0"/>
+              <a:t>and </a:t>
+            </a:r>
+            <a:r>
+              <a:rPr lang="en-US" altLang="zh-CN" b="1" dirty="0">
+                <a:solidFill>
+                  <a:srgbClr val="7030A0"/>
+                </a:solidFill>
+              </a:rPr>
+              <a:t>!</a:t>
+            </a:r>
+            <a:r>
+              <a:rPr lang="en-US" altLang="zh-CN" dirty="0"/>
+              <a:t> </a:t>
+            </a:r>
+            <a:r>
+              <a:rPr lang="en-US" altLang="zh-CN" dirty="0" smtClean="0"/>
+              <a:t>translate into jumps. The operators </a:t>
+            </a:r>
+            <a:r>
+              <a:rPr lang="en-US" altLang="zh-CN" dirty="0"/>
+              <a:t>themselves do not appear in the </a:t>
+            </a:r>
+            <a:r>
+              <a:rPr lang="en-US" altLang="zh-CN" dirty="0" smtClean="0"/>
+              <a:t>code; </a:t>
+            </a:r>
+            <a:r>
+              <a:rPr lang="en-US" altLang="zh-CN" dirty="0" err="1" smtClean="0"/>
+              <a:t>Instead,the</a:t>
+            </a:r>
+            <a:r>
+              <a:rPr lang="en-US" altLang="zh-CN" dirty="0" smtClean="0"/>
+              <a:t> </a:t>
+            </a:r>
+            <a:r>
+              <a:rPr lang="en-US" altLang="zh-CN" dirty="0"/>
+              <a:t>value of a </a:t>
+            </a:r>
+            <a:r>
+              <a:rPr lang="en-US" altLang="zh-CN" dirty="0" smtClean="0"/>
+              <a:t>Boolean </a:t>
+            </a:r>
+            <a:r>
+              <a:rPr lang="en-US" altLang="zh-CN" dirty="0"/>
+              <a:t>expression is represented by a </a:t>
+            </a:r>
+            <a:r>
+              <a:rPr lang="en-US" altLang="zh-CN" dirty="0" smtClean="0"/>
+              <a:t>position </a:t>
+            </a:r>
+            <a:r>
+              <a:rPr lang="en-US" altLang="zh-CN" dirty="0"/>
+              <a:t>in the code sequence.</a:t>
+            </a:r>
+            <a:endParaRPr lang="zh-CN" altLang="en-US" dirty="0"/>
+          </a:p>
+        </p:txBody>
+      </p:sp>
+      <p:pic>
+        <p:nvPicPr>
+          <p:cNvPr id="9" name="图片 8"/>
+          <p:cNvPicPr>
+            <a:picLocks noChangeAspect="1"/>
+          </p:cNvPicPr>
+          <p:nvPr/>
+        </p:nvPicPr>
+        <p:blipFill>
+          <a:blip r:embed="rId3"/>
+          <a:stretch>
+            <a:fillRect/>
+          </a:stretch>
+        </p:blipFill>
+        <p:spPr>
+          <a:xfrm>
+            <a:off x="1453922" y="3148190"/>
+            <a:ext cx="6410325" cy="3590925"/>
+          </a:xfrm>
+          <a:prstGeom prst="rect">
+            <a:avLst/>
+          </a:prstGeom>
+        </p:spPr>
+      </p:pic>
+    </p:spTree>
+    <p:extLst>
+      <p:ext uri="{BB962C8B-B14F-4D97-AF65-F5344CB8AC3E}">
+        <p14:creationId xmlns:p14="http://schemas.microsoft.com/office/powerpoint/2010/main" val="3336654542"/>
+      </p:ext>
+    </p:extLst>
+  </p:cSld>
+  <p:clrMapOvr>
+    <a:masterClrMapping/>
+  </p:clrMapOvr>
+  <mc:AlternateContent xmlns:mc="http://schemas.openxmlformats.org/markup-compatibility/2006" xmlns:p14="http://schemas.microsoft.com/office/powerpoint/2010/main">
+    <mc:Choice Requires="p14">
+      <p:transition spd="med" p14:dur="700">
+        <p:fade/>
+      </p:transition>
+    </mc:Choice>
+    <mc:Fallback xmlns="">
+      <p:transition spd="med">
+        <p:fade/>
+      </p:transition>
+    </mc:Fallback>
+  </mc:AlternateContent>
+</p:sld>
+</file>
+
+<file path=ppt/slides/slide33.xml><?xml version="1.0" encoding="utf-8"?>
+<p:sld xmlns:a="http://schemas.openxmlformats.org/drawingml/2006/main" xmlns:r="http://schemas.openxmlformats.org/officeDocument/2006/relationships" xmlns:p="http://schemas.openxmlformats.org/presentationml/2006/main">
+  <p:cSld>
+    <p:spTree>
+      <p:nvGrpSpPr>
+        <p:cNvPr id="1" name=""/>
+        <p:cNvGrpSpPr/>
+        <p:nvPr/>
+      </p:nvGrpSpPr>
+      <p:grpSpPr>
+        <a:xfrm>
+          <a:off x="0" y="0"/>
+          <a:ext cx="0" cy="0"/>
+          <a:chOff x="0" y="0"/>
+          <a:chExt cx="0" cy="0"/>
+        </a:xfrm>
+      </p:grpSpPr>
+      <p:sp>
+        <p:nvSpPr>
+          <p:cNvPr id="2" name="标题 1"/>
+          <p:cNvSpPr>
+            <a:spLocks noGrp="1"/>
+          </p:cNvSpPr>
+          <p:nvPr>
+            <p:ph type="title"/>
+          </p:nvPr>
+        </p:nvSpPr>
+        <p:spPr/>
+        <p:txBody>
+          <a:bodyPr/>
+          <a:lstStyle/>
+          <a:p>
+            <a:r>
+              <a:rPr lang="en-US" altLang="zh-CN" dirty="0" smtClean="0"/>
+              <a:t>7.5 Control Flow </a:t>
+            </a:r>
+            <a:r>
+              <a:rPr lang="en-US" altLang="zh-CN" dirty="0"/>
+              <a:t>– Flow-of-Control Statements</a:t>
+            </a:r>
+            <a:endParaRPr lang="zh-CN" altLang="en-US" dirty="0"/>
+          </a:p>
+        </p:txBody>
+      </p:sp>
+      <p:pic>
+        <p:nvPicPr>
+          <p:cNvPr id="3" name="图片 2"/>
+          <p:cNvPicPr>
+            <a:picLocks noChangeAspect="1"/>
+          </p:cNvPicPr>
+          <p:nvPr/>
+        </p:nvPicPr>
+        <p:blipFill>
+          <a:blip r:embed="rId2"/>
+          <a:stretch>
+            <a:fillRect/>
+          </a:stretch>
+        </p:blipFill>
+        <p:spPr>
+          <a:xfrm>
+            <a:off x="1042361" y="1327710"/>
+            <a:ext cx="6467475" cy="1438275"/>
+          </a:xfrm>
+          <a:prstGeom prst="rect">
+            <a:avLst/>
+          </a:prstGeom>
+        </p:spPr>
+      </p:pic>
+      <p:pic>
+        <p:nvPicPr>
+          <p:cNvPr id="5" name="图片 4"/>
+          <p:cNvPicPr>
+            <a:picLocks noChangeAspect="1"/>
+          </p:cNvPicPr>
+          <p:nvPr/>
+        </p:nvPicPr>
+        <p:blipFill>
+          <a:blip r:embed="rId3"/>
+          <a:stretch>
+            <a:fillRect/>
+          </a:stretch>
+        </p:blipFill>
+        <p:spPr>
+          <a:xfrm>
+            <a:off x="1672428" y="2920533"/>
+            <a:ext cx="5207343" cy="3937467"/>
+          </a:xfrm>
+          <a:prstGeom prst="rect">
+            <a:avLst/>
+          </a:prstGeom>
+        </p:spPr>
+      </p:pic>
+    </p:spTree>
+    <p:extLst>
+      <p:ext uri="{BB962C8B-B14F-4D97-AF65-F5344CB8AC3E}">
+        <p14:creationId xmlns:p14="http://schemas.microsoft.com/office/powerpoint/2010/main" val="2449586718"/>
+      </p:ext>
+    </p:extLst>
+  </p:cSld>
+  <p:clrMapOvr>
+    <a:masterClrMapping/>
+  </p:clrMapOvr>
+  <mc:AlternateContent xmlns:mc="http://schemas.openxmlformats.org/markup-compatibility/2006" xmlns:p14="http://schemas.microsoft.com/office/powerpoint/2010/main">
+    <mc:Choice Requires="p14">
+      <p:transition spd="med" p14:dur="700">
+        <p:fade/>
+      </p:transition>
+    </mc:Choice>
+    <mc:Fallback xmlns="">
+      <p:transition spd="med">
+        <p:fade/>
+      </p:transition>
+    </mc:Fallback>
+  </mc:AlternateContent>
+</p:sld>
+</file>
+
+<file path=ppt/slides/slide34.xml><?xml version="1.0" encoding="utf-8"?>
+<p:sld xmlns:a="http://schemas.openxmlformats.org/drawingml/2006/main" xmlns:r="http://schemas.openxmlformats.org/officeDocument/2006/relationships" xmlns:p="http://schemas.openxmlformats.org/presentationml/2006/main">
+  <p:cSld>
+    <p:spTree>
+      <p:nvGrpSpPr>
+        <p:cNvPr id="1" name=""/>
+        <p:cNvGrpSpPr/>
+        <p:nvPr/>
+      </p:nvGrpSpPr>
+      <p:grpSpPr>
+        <a:xfrm>
+          <a:off x="0" y="0"/>
+          <a:ext cx="0" cy="0"/>
+          <a:chOff x="0" y="0"/>
+          <a:chExt cx="0" cy="0"/>
+        </a:xfrm>
+      </p:grpSpPr>
+      <p:sp>
+        <p:nvSpPr>
+          <p:cNvPr id="2" name="标题 1"/>
+          <p:cNvSpPr>
+            <a:spLocks noGrp="1"/>
+          </p:cNvSpPr>
+          <p:nvPr>
+            <p:ph type="title"/>
+          </p:nvPr>
+        </p:nvSpPr>
+        <p:spPr/>
+        <p:txBody>
+          <a:bodyPr/>
+          <a:lstStyle/>
+          <a:p>
+            <a:r>
+              <a:rPr lang="en-US" altLang="zh-CN" dirty="0" smtClean="0"/>
+              <a:t>7.6 Control Flow </a:t>
+            </a:r>
+            <a:r>
+              <a:rPr lang="en-US" altLang="zh-CN" dirty="0"/>
+              <a:t>– Flow-of-Control Statements</a:t>
+            </a:r>
+            <a:endParaRPr lang="zh-CN" altLang="en-US" dirty="0"/>
+          </a:p>
+        </p:txBody>
+      </p:sp>
+      <p:pic>
+        <p:nvPicPr>
+          <p:cNvPr id="4" name="图片 3"/>
+          <p:cNvPicPr>
+            <a:picLocks noChangeAspect="1"/>
+          </p:cNvPicPr>
+          <p:nvPr/>
+        </p:nvPicPr>
+        <p:blipFill>
+          <a:blip r:embed="rId2"/>
+          <a:stretch>
+            <a:fillRect/>
+          </a:stretch>
+        </p:blipFill>
+        <p:spPr>
+          <a:xfrm>
+            <a:off x="1426029" y="1576911"/>
+            <a:ext cx="4659086" cy="5174273"/>
+          </a:xfrm>
+          <a:prstGeom prst="rect">
+            <a:avLst/>
+          </a:prstGeom>
+        </p:spPr>
+      </p:pic>
+    </p:spTree>
+    <p:extLst>
+      <p:ext uri="{BB962C8B-B14F-4D97-AF65-F5344CB8AC3E}">
+        <p14:creationId xmlns:p14="http://schemas.microsoft.com/office/powerpoint/2010/main" val="1672766761"/>
+      </p:ext>
+    </p:extLst>
+  </p:cSld>
+  <p:clrMapOvr>
+    <a:masterClrMapping/>
+  </p:clrMapOvr>
+  <mc:AlternateContent xmlns:mc="http://schemas.openxmlformats.org/markup-compatibility/2006" xmlns:p14="http://schemas.microsoft.com/office/powerpoint/2010/main">
+    <mc:Choice Requires="p14">
+      <p:transition spd="med" p14:dur="700">
+        <p:fade/>
+      </p:transition>
+    </mc:Choice>
+    <mc:Fallback xmlns="">
+      <p:transition spd="med">
+        <p:fade/>
+      </p:transition>
+    </mc:Fallback>
+  </mc:AlternateContent>
+</p:sld>
+</file>
+
+<file path=ppt/slides/slide35.xml><?xml version="1.0" encoding="utf-8"?>
+<p:sld xmlns:a="http://schemas.openxmlformats.org/drawingml/2006/main" xmlns:r="http://schemas.openxmlformats.org/officeDocument/2006/relationships" xmlns:p="http://schemas.openxmlformats.org/presentationml/2006/main">
+  <p:cSld>
+    <p:spTree>
+      <p:nvGrpSpPr>
+        <p:cNvPr id="1" name=""/>
+        <p:cNvGrpSpPr/>
+        <p:nvPr/>
+      </p:nvGrpSpPr>
+      <p:grpSpPr>
+        <a:xfrm>
+          <a:off x="0" y="0"/>
+          <a:ext cx="0" cy="0"/>
+          <a:chOff x="0" y="0"/>
+          <a:chExt cx="0" cy="0"/>
+        </a:xfrm>
+      </p:grpSpPr>
+      <p:sp>
+        <p:nvSpPr>
+          <p:cNvPr id="2" name="标题 1"/>
+          <p:cNvSpPr>
+            <a:spLocks noGrp="1"/>
+          </p:cNvSpPr>
+          <p:nvPr>
+            <p:ph type="title"/>
+          </p:nvPr>
+        </p:nvSpPr>
+        <p:spPr/>
+        <p:txBody>
+          <a:bodyPr/>
+          <a:lstStyle/>
+          <a:p>
+            <a:r>
+              <a:rPr lang="en-US" altLang="zh-CN" dirty="0" smtClean="0"/>
+              <a:t>7.6 </a:t>
+            </a:r>
+            <a:r>
+              <a:rPr lang="en-US" altLang="zh-CN" dirty="0"/>
+              <a:t>Control Flow – </a:t>
+            </a:r>
+            <a:r>
+              <a:rPr lang="en-US" altLang="zh-CN" dirty="0"/>
+              <a:t>Translation of Boolean Expressions</a:t>
+            </a:r>
+            <a:endParaRPr lang="zh-CN" altLang="en-US" dirty="0"/>
+          </a:p>
+        </p:txBody>
+      </p:sp>
+      <p:pic>
+        <p:nvPicPr>
+          <p:cNvPr id="4" name="图片 3"/>
+          <p:cNvPicPr>
+            <a:picLocks noChangeAspect="1"/>
+          </p:cNvPicPr>
+          <p:nvPr/>
+        </p:nvPicPr>
+        <p:blipFill>
+          <a:blip r:embed="rId2"/>
+          <a:stretch>
+            <a:fillRect/>
+          </a:stretch>
+        </p:blipFill>
+        <p:spPr>
+          <a:xfrm>
+            <a:off x="2093230" y="1494711"/>
+            <a:ext cx="4956402" cy="4893162"/>
+          </a:xfrm>
+          <a:prstGeom prst="rect">
+            <a:avLst/>
+          </a:prstGeom>
+        </p:spPr>
+      </p:pic>
+    </p:spTree>
+    <p:extLst>
+      <p:ext uri="{BB962C8B-B14F-4D97-AF65-F5344CB8AC3E}">
+        <p14:creationId xmlns:p14="http://schemas.microsoft.com/office/powerpoint/2010/main" val="2352864102"/>
+      </p:ext>
+    </p:extLst>
+  </p:cSld>
+  <p:clrMapOvr>
+    <a:masterClrMapping/>
+  </p:clrMapOvr>
+  <mc:AlternateContent xmlns:mc="http://schemas.openxmlformats.org/markup-compatibility/2006" xmlns:p14="http://schemas.microsoft.com/office/powerpoint/2010/main">
+    <mc:Choice Requires="p14">
+      <p:transition spd="med" p14:dur="700">
+        <p:fade/>
+      </p:transition>
+    </mc:Choice>
+    <mc:Fallback xmlns="">
+      <p:transition spd="med">
+        <p:fade/>
+      </p:transition>
+    </mc:Fallback>
+  </mc:AlternateContent>
+</p:sld>
+</file>
+
+<file path=ppt/slides/slide36.xml><?xml version="1.0" encoding="utf-8"?>
+<p:sld xmlns:a="http://schemas.openxmlformats.org/drawingml/2006/main" xmlns:r="http://schemas.openxmlformats.org/officeDocument/2006/relationships" xmlns:p="http://schemas.openxmlformats.org/presentationml/2006/main">
+  <p:cSld>
+    <p:spTree>
+      <p:nvGrpSpPr>
+        <p:cNvPr id="1" name=""/>
+        <p:cNvGrpSpPr/>
+        <p:nvPr/>
+      </p:nvGrpSpPr>
+      <p:grpSpPr>
+        <a:xfrm>
+          <a:off x="0" y="0"/>
+          <a:ext cx="0" cy="0"/>
+          <a:chOff x="0" y="0"/>
+          <a:chExt cx="0" cy="0"/>
+        </a:xfrm>
+      </p:grpSpPr>
+      <p:sp>
+        <p:nvSpPr>
+          <p:cNvPr id="2" name="标题 1"/>
+          <p:cNvSpPr>
+            <a:spLocks noGrp="1"/>
+          </p:cNvSpPr>
+          <p:nvPr>
+            <p:ph type="title"/>
+          </p:nvPr>
+        </p:nvSpPr>
+        <p:spPr/>
+        <p:txBody>
+          <a:bodyPr/>
+          <a:lstStyle/>
+          <a:p>
+            <a:r>
+              <a:rPr lang="en-US" altLang="zh-CN" dirty="0"/>
+              <a:t>7.7 Switch- Statements</a:t>
+            </a:r>
+            <a:endParaRPr lang="zh-CN" altLang="en-US" dirty="0"/>
+          </a:p>
+        </p:txBody>
+      </p:sp>
+      <p:sp>
+        <p:nvSpPr>
+          <p:cNvPr id="3" name="内容占位符 2"/>
+          <p:cNvSpPr>
+            <a:spLocks noGrp="1"/>
+          </p:cNvSpPr>
+          <p:nvPr>
+            <p:ph idx="1"/>
+          </p:nvPr>
+        </p:nvSpPr>
+        <p:spPr>
+          <a:xfrm>
+            <a:off x="828675" y="1600200"/>
+            <a:ext cx="4668611" cy="642257"/>
+          </a:xfrm>
+        </p:spPr>
+        <p:txBody>
+          <a:bodyPr/>
+          <a:lstStyle/>
+          <a:p>
+            <a:r>
+              <a:rPr lang="en-US" altLang="zh-CN" dirty="0"/>
+              <a:t>The "switch" or "case" statement is available in a variety of languages</a:t>
+            </a:r>
+            <a:endParaRPr lang="zh-CN" altLang="en-US" dirty="0"/>
+          </a:p>
+        </p:txBody>
+      </p:sp>
+      <p:pic>
+        <p:nvPicPr>
+          <p:cNvPr id="4" name="图片 3"/>
+          <p:cNvPicPr>
+            <a:picLocks noChangeAspect="1"/>
+          </p:cNvPicPr>
+          <p:nvPr/>
+        </p:nvPicPr>
+        <p:blipFill>
+          <a:blip r:embed="rId2"/>
+          <a:stretch>
+            <a:fillRect/>
+          </a:stretch>
+        </p:blipFill>
+        <p:spPr>
+          <a:xfrm>
+            <a:off x="5868761" y="1456644"/>
+            <a:ext cx="2152650" cy="1571625"/>
+          </a:xfrm>
+          <a:prstGeom prst="rect">
+            <a:avLst/>
+          </a:prstGeom>
+        </p:spPr>
+      </p:pic>
+      <p:pic>
+        <p:nvPicPr>
+          <p:cNvPr id="5" name="图片 4"/>
+          <p:cNvPicPr>
+            <a:picLocks noChangeAspect="1"/>
+          </p:cNvPicPr>
+          <p:nvPr/>
+        </p:nvPicPr>
+        <p:blipFill>
+          <a:blip r:embed="rId3"/>
+          <a:stretch>
+            <a:fillRect/>
+          </a:stretch>
+        </p:blipFill>
+        <p:spPr>
+          <a:xfrm>
+            <a:off x="1004207" y="3455307"/>
+            <a:ext cx="6438900" cy="1876425"/>
+          </a:xfrm>
+          <a:prstGeom prst="rect">
+            <a:avLst/>
+          </a:prstGeom>
+        </p:spPr>
+      </p:pic>
+    </p:spTree>
+    <p:extLst>
+      <p:ext uri="{BB962C8B-B14F-4D97-AF65-F5344CB8AC3E}">
+        <p14:creationId xmlns:p14="http://schemas.microsoft.com/office/powerpoint/2010/main" val="2534764288"/>
+      </p:ext>
+    </p:extLst>
+  </p:cSld>
+  <p:clrMapOvr>
+    <a:masterClrMapping/>
+  </p:clrMapOvr>
+  <mc:AlternateContent xmlns:mc="http://schemas.openxmlformats.org/markup-compatibility/2006" xmlns:p14="http://schemas.microsoft.com/office/powerpoint/2010/main">
+    <mc:Choice Requires="p14">
+      <p:transition spd="med" p14:dur="700">
+        <p:fade/>
+      </p:transition>
+    </mc:Choice>
+    <mc:Fallback xmlns="">
+      <p:transition spd="med">
+        <p:fade/>
+      </p:transition>
+    </mc:Fallback>
+  </mc:AlternateContent>
+</p:sld>
+</file>
+
+<file path=ppt/slides/slide37.xml><?xml version="1.0" encoding="utf-8"?>
+<p:sld xmlns:a="http://schemas.openxmlformats.org/drawingml/2006/main" xmlns:r="http://schemas.openxmlformats.org/officeDocument/2006/relationships" xmlns:p="http://schemas.openxmlformats.org/presentationml/2006/main">
+  <p:cSld>
+    <p:spTree>
+      <p:nvGrpSpPr>
+        <p:cNvPr id="1" name=""/>
+        <p:cNvGrpSpPr/>
+        <p:nvPr/>
+      </p:nvGrpSpPr>
+      <p:grpSpPr>
+        <a:xfrm>
+          <a:off x="0" y="0"/>
+          <a:ext cx="0" cy="0"/>
+          <a:chOff x="0" y="0"/>
+          <a:chExt cx="0" cy="0"/>
+        </a:xfrm>
+      </p:grpSpPr>
+      <p:sp>
+        <p:nvSpPr>
+          <p:cNvPr id="2" name="标题 1"/>
+          <p:cNvSpPr>
+            <a:spLocks noGrp="1"/>
+          </p:cNvSpPr>
+          <p:nvPr>
+            <p:ph type="title"/>
+          </p:nvPr>
+        </p:nvSpPr>
+        <p:spPr/>
+        <p:txBody>
+          <a:bodyPr/>
+          <a:lstStyle/>
+          <a:p>
+            <a:r>
+              <a:rPr lang="en-US" altLang="zh-CN" dirty="0"/>
+              <a:t>7.7 Switch- Statements</a:t>
+            </a:r>
+            <a:endParaRPr lang="zh-CN" altLang="en-US" dirty="0"/>
+          </a:p>
+        </p:txBody>
+      </p:sp>
+      <p:pic>
+        <p:nvPicPr>
+          <p:cNvPr id="7" name="图片 6"/>
+          <p:cNvPicPr>
+            <a:picLocks noChangeAspect="1"/>
+          </p:cNvPicPr>
+          <p:nvPr/>
+        </p:nvPicPr>
+        <p:blipFill>
+          <a:blip r:embed="rId2"/>
+          <a:stretch>
+            <a:fillRect/>
+          </a:stretch>
+        </p:blipFill>
+        <p:spPr>
+          <a:xfrm>
+            <a:off x="1022576" y="1505630"/>
+            <a:ext cx="2962275" cy="4086225"/>
+          </a:xfrm>
+          <a:prstGeom prst="rect">
+            <a:avLst/>
+          </a:prstGeom>
+        </p:spPr>
+      </p:pic>
+      <p:pic>
+        <p:nvPicPr>
+          <p:cNvPr id="8" name="图片 7"/>
+          <p:cNvPicPr>
+            <a:picLocks noChangeAspect="1"/>
+          </p:cNvPicPr>
+          <p:nvPr/>
+        </p:nvPicPr>
+        <p:blipFill>
+          <a:blip r:embed="rId3"/>
+          <a:stretch>
+            <a:fillRect/>
+          </a:stretch>
+        </p:blipFill>
+        <p:spPr>
+          <a:xfrm>
+            <a:off x="4454298" y="1505630"/>
+            <a:ext cx="3457575" cy="3400425"/>
+          </a:xfrm>
+          <a:prstGeom prst="rect">
+            <a:avLst/>
+          </a:prstGeom>
+        </p:spPr>
+      </p:pic>
+      <p:pic>
+        <p:nvPicPr>
+          <p:cNvPr id="9" name="图片 8"/>
+          <p:cNvPicPr>
+            <a:picLocks noChangeAspect="1"/>
+          </p:cNvPicPr>
+          <p:nvPr/>
+        </p:nvPicPr>
+        <p:blipFill>
+          <a:blip r:embed="rId4"/>
+          <a:stretch>
+            <a:fillRect/>
+          </a:stretch>
+        </p:blipFill>
+        <p:spPr>
+          <a:xfrm>
+            <a:off x="5011511" y="5238523"/>
+            <a:ext cx="1581150" cy="1371600"/>
+          </a:xfrm>
+          <a:prstGeom prst="rect">
+            <a:avLst/>
+          </a:prstGeom>
+        </p:spPr>
+      </p:pic>
+      <p:pic>
+        <p:nvPicPr>
+          <p:cNvPr id="10" name="图片 9"/>
+          <p:cNvPicPr>
+            <a:picLocks noChangeAspect="1"/>
+          </p:cNvPicPr>
+          <p:nvPr/>
+        </p:nvPicPr>
+        <p:blipFill>
+          <a:blip r:embed="rId5"/>
+          <a:stretch>
+            <a:fillRect/>
+          </a:stretch>
+        </p:blipFill>
+        <p:spPr>
+          <a:xfrm>
+            <a:off x="6852558" y="5781448"/>
+            <a:ext cx="1533525" cy="285750"/>
+          </a:xfrm>
+          <a:prstGeom prst="rect">
+            <a:avLst/>
+          </a:prstGeom>
+        </p:spPr>
+      </p:pic>
+    </p:spTree>
+    <p:extLst>
+      <p:ext uri="{BB962C8B-B14F-4D97-AF65-F5344CB8AC3E}">
+        <p14:creationId xmlns:p14="http://schemas.microsoft.com/office/powerpoint/2010/main" val="3991861652"/>
+      </p:ext>
+    </p:extLst>
+  </p:cSld>
+  <p:clrMapOvr>
+    <a:masterClrMapping/>
+  </p:clrMapOvr>
+  <mc:AlternateContent xmlns:mc="http://schemas.openxmlformats.org/markup-compatibility/2006" xmlns:p14="http://schemas.microsoft.com/office/powerpoint/2010/main">
+    <mc:Choice Requires="p14">
+      <p:transition spd="med" p14:dur="700">
+        <p:fade/>
+      </p:transition>
+    </mc:Choice>
+    <mc:Fallback xmlns="">
+      <p:transition spd="med">
+        <p:fade/>
+      </p:transition>
+    </mc:Fallback>
+  </mc:AlternateContent>
+</p:sld>
+</file>
+
+<file path=ppt/slides/slide38.xml><?xml version="1.0" encoding="utf-8"?>
+<p:sld xmlns:a="http://schemas.openxmlformats.org/drawingml/2006/main" xmlns:r="http://schemas.openxmlformats.org/officeDocument/2006/relationships" xmlns:p="http://schemas.openxmlformats.org/presentationml/2006/main">
+  <p:cSld>
+    <p:spTree>
+      <p:nvGrpSpPr>
+        <p:cNvPr id="1" name=""/>
+        <p:cNvGrpSpPr/>
+        <p:nvPr/>
+      </p:nvGrpSpPr>
+      <p:grpSpPr>
+        <a:xfrm>
+          <a:off x="0" y="0"/>
+          <a:ext cx="0" cy="0"/>
+          <a:chOff x="0" y="0"/>
+          <a:chExt cx="0" cy="0"/>
+        </a:xfrm>
+      </p:grpSpPr>
+      <p:sp>
+        <p:nvSpPr>
+          <p:cNvPr id="2" name="标题 1"/>
+          <p:cNvSpPr>
+            <a:spLocks noGrp="1"/>
+          </p:cNvSpPr>
+          <p:nvPr>
+            <p:ph type="title"/>
+          </p:nvPr>
+        </p:nvSpPr>
+        <p:spPr/>
+        <p:txBody>
+          <a:bodyPr/>
+          <a:lstStyle/>
+          <a:p>
+            <a:r>
+              <a:rPr lang="en-US" altLang="zh-CN" dirty="0" smtClean="0"/>
+              <a:t>7.8 </a:t>
+            </a:r>
+            <a:r>
+              <a:rPr lang="it-IT" altLang="zh-CN" dirty="0"/>
+              <a:t>Intermediate Code </a:t>
+            </a:r>
+            <a:r>
+              <a:rPr lang="it-IT" altLang="zh-CN" dirty="0" smtClean="0"/>
+              <a:t>for Procedures</a:t>
+            </a:r>
+            <a:endParaRPr lang="zh-CN" altLang="en-US" dirty="0"/>
+          </a:p>
+        </p:txBody>
+      </p:sp>
+      <p:pic>
+        <p:nvPicPr>
+          <p:cNvPr id="3" name="图片 2"/>
+          <p:cNvPicPr>
+            <a:picLocks noChangeAspect="1"/>
+          </p:cNvPicPr>
+          <p:nvPr/>
+        </p:nvPicPr>
+        <p:blipFill>
+          <a:blip r:embed="rId2"/>
+          <a:stretch>
+            <a:fillRect/>
+          </a:stretch>
+        </p:blipFill>
+        <p:spPr>
+          <a:xfrm>
+            <a:off x="1373641" y="1550533"/>
+            <a:ext cx="4829175" cy="2581275"/>
+          </a:xfrm>
+          <a:prstGeom prst="rect">
+            <a:avLst/>
+          </a:prstGeom>
+        </p:spPr>
+      </p:pic>
+      <p:pic>
+        <p:nvPicPr>
+          <p:cNvPr id="4" name="图片 3"/>
+          <p:cNvPicPr>
+            <a:picLocks noChangeAspect="1"/>
+          </p:cNvPicPr>
+          <p:nvPr/>
+        </p:nvPicPr>
+        <p:blipFill>
+          <a:blip r:embed="rId3"/>
+          <a:stretch>
+            <a:fillRect/>
+          </a:stretch>
+        </p:blipFill>
+        <p:spPr>
+          <a:xfrm>
+            <a:off x="2126115" y="4589690"/>
+            <a:ext cx="3324225" cy="1771650"/>
+          </a:xfrm>
+          <a:prstGeom prst="rect">
+            <a:avLst/>
+          </a:prstGeom>
+        </p:spPr>
+      </p:pic>
+    </p:spTree>
+    <p:extLst>
+      <p:ext uri="{BB962C8B-B14F-4D97-AF65-F5344CB8AC3E}">
+        <p14:creationId xmlns:p14="http://schemas.microsoft.com/office/powerpoint/2010/main" val="2979253615"/>
+      </p:ext>
+    </p:extLst>
+  </p:cSld>
+  <p:clrMapOvr>
+    <a:masterClrMapping/>
+  </p:clrMapOvr>
+  <mc:AlternateContent xmlns:mc="http://schemas.openxmlformats.org/markup-compatibility/2006" xmlns:p14="http://schemas.microsoft.com/office/powerpoint/2010/main">
+    <mc:Choice Requires="p14">
+      <p:transition spd="med" p14:dur="700">
+        <p:fade/>
+      </p:transition>
+    </mc:Choice>
+    <mc:Fallback xmlns="">
+      <p:transition spd="med">
+        <p:fade/>
+      </p:transition>
+    </mc:Fallback>
+  </mc:AlternateContent>
+</p:sld>
+</file>
+
+<file path=ppt/slides/slide39.xml><?xml version="1.0" encoding="utf-8"?>
+<p:sld xmlns:a="http://schemas.openxmlformats.org/drawingml/2006/main" xmlns:r="http://schemas.openxmlformats.org/officeDocument/2006/relationships" xmlns:p="http://schemas.openxmlformats.org/presentationml/2006/main">
+  <p:cSld>
+    <p:spTree>
+      <p:nvGrpSpPr>
+        <p:cNvPr id="1" name=""/>
+        <p:cNvGrpSpPr/>
+        <p:nvPr/>
+      </p:nvGrpSpPr>
+      <p:grpSpPr>
+        <a:xfrm>
+          <a:off x="0" y="0"/>
+          <a:ext cx="0" cy="0"/>
+          <a:chOff x="0" y="0"/>
+          <a:chExt cx="0" cy="0"/>
+        </a:xfrm>
+      </p:grpSpPr>
+      <p:sp>
+        <p:nvSpPr>
+          <p:cNvPr id="2" name="标题 1"/>
+          <p:cNvSpPr>
+            <a:spLocks noGrp="1"/>
+          </p:cNvSpPr>
+          <p:nvPr>
+            <p:ph type="title"/>
+          </p:nvPr>
+        </p:nvSpPr>
+        <p:spPr/>
+        <p:txBody>
+          <a:bodyPr/>
+          <a:lstStyle/>
+          <a:p>
+            <a:r>
+              <a:rPr lang="en-US" altLang="zh-CN" dirty="0"/>
+              <a:t>7.8 </a:t>
+            </a:r>
+            <a:r>
+              <a:rPr lang="it-IT" altLang="zh-CN" dirty="0"/>
+              <a:t>Intermediate Code for Procedures</a:t>
+            </a:r>
+            <a:endParaRPr lang="zh-CN" altLang="en-US" dirty="0"/>
+          </a:p>
+        </p:txBody>
+      </p:sp>
+      <p:pic>
+        <p:nvPicPr>
+          <p:cNvPr id="5" name="图片 4"/>
+          <p:cNvPicPr>
+            <a:picLocks noChangeAspect="1"/>
+          </p:cNvPicPr>
+          <p:nvPr/>
+        </p:nvPicPr>
+        <p:blipFill>
+          <a:blip r:embed="rId2"/>
+          <a:stretch>
+            <a:fillRect/>
+          </a:stretch>
+        </p:blipFill>
+        <p:spPr>
+          <a:xfrm>
+            <a:off x="1413893" y="1695450"/>
+            <a:ext cx="6315075" cy="4533900"/>
+          </a:xfrm>
+          <a:prstGeom prst="rect">
+            <a:avLst/>
+          </a:prstGeom>
+        </p:spPr>
+      </p:pic>
+    </p:spTree>
+    <p:extLst>
+      <p:ext uri="{BB962C8B-B14F-4D97-AF65-F5344CB8AC3E}">
+        <p14:creationId xmlns:p14="http://schemas.microsoft.com/office/powerpoint/2010/main" val="953425905"/>
       </p:ext>
     </p:extLst>
   </p:cSld>
@@ -8493,6 +12381,99 @@
     <p:extLst>
       <p:ext uri="{BB962C8B-B14F-4D97-AF65-F5344CB8AC3E}">
         <p14:creationId xmlns:p14="http://schemas.microsoft.com/office/powerpoint/2010/main" val="2983461307"/>
+      </p:ext>
+    </p:extLst>
+  </p:cSld>
+  <p:clrMapOvr>
+    <a:masterClrMapping/>
+  </p:clrMapOvr>
+  <mc:AlternateContent xmlns:mc="http://schemas.openxmlformats.org/markup-compatibility/2006" xmlns:p14="http://schemas.microsoft.com/office/powerpoint/2010/main">
+    <mc:Choice Requires="p14">
+      <p:transition spd="med" p14:dur="700">
+        <p:fade/>
+      </p:transition>
+    </mc:Choice>
+    <mc:Fallback xmlns="">
+      <p:transition spd="med">
+        <p:fade/>
+      </p:transition>
+    </mc:Fallback>
+  </mc:AlternateContent>
+</p:sld>
+</file>
+
+<file path=ppt/slides/slide40.xml><?xml version="1.0" encoding="utf-8"?>
+<p:sld xmlns:a="http://schemas.openxmlformats.org/drawingml/2006/main" xmlns:r="http://schemas.openxmlformats.org/officeDocument/2006/relationships" xmlns:p="http://schemas.openxmlformats.org/presentationml/2006/main">
+  <p:cSld>
+    <p:spTree>
+      <p:nvGrpSpPr>
+        <p:cNvPr id="1" name=""/>
+        <p:cNvGrpSpPr/>
+        <p:nvPr/>
+      </p:nvGrpSpPr>
+      <p:grpSpPr>
+        <a:xfrm>
+          <a:off x="0" y="0"/>
+          <a:ext cx="0" cy="0"/>
+          <a:chOff x="0" y="0"/>
+          <a:chExt cx="0" cy="0"/>
+        </a:xfrm>
+      </p:grpSpPr>
+      <p:sp>
+        <p:nvSpPr>
+          <p:cNvPr id="2" name="标题 1"/>
+          <p:cNvSpPr>
+            <a:spLocks noGrp="1"/>
+          </p:cNvSpPr>
+          <p:nvPr>
+            <p:ph type="title"/>
+          </p:nvPr>
+        </p:nvSpPr>
+        <p:spPr/>
+        <p:txBody>
+          <a:bodyPr/>
+          <a:lstStyle/>
+          <a:p>
+            <a:r>
+              <a:rPr lang="en-US" altLang="zh-CN" dirty="0"/>
+              <a:t>7.8 </a:t>
+            </a:r>
+            <a:r>
+              <a:rPr lang="it-IT" altLang="zh-CN" dirty="0"/>
+              <a:t>Intermediate Code for Procedures</a:t>
+            </a:r>
+            <a:endParaRPr lang="zh-CN" altLang="en-US" dirty="0"/>
+          </a:p>
+        </p:txBody>
+      </p:sp>
+      <p:pic>
+        <p:nvPicPr>
+          <p:cNvPr id="3" name="图片 2"/>
+          <p:cNvPicPr>
+            <a:picLocks noChangeAspect="1"/>
+          </p:cNvPicPr>
+          <p:nvPr/>
+        </p:nvPicPr>
+        <p:blipFill>
+          <a:blip r:embed="rId2"/>
+          <a:stretch>
+            <a:fillRect/>
+          </a:stretch>
+        </p:blipFill>
+        <p:spPr>
+          <a:xfrm>
+            <a:off x="1414462" y="1852612"/>
+            <a:ext cx="6315075" cy="3152775"/>
+          </a:xfrm>
+          <a:prstGeom prst="rect">
+            <a:avLst/>
+          </a:prstGeom>
+        </p:spPr>
+      </p:pic>
+    </p:spTree>
+    <p:extLst>
+      <p:ext uri="{BB962C8B-B14F-4D97-AF65-F5344CB8AC3E}">
+        <p14:creationId xmlns:p14="http://schemas.microsoft.com/office/powerpoint/2010/main" val="2671018606"/>
       </p:ext>
     </p:extLst>
   </p:cSld>
@@ -8902,7 +12883,7 @@
           <a:graphicData uri="http://schemas.openxmlformats.org/presentationml/2006/ole">
             <mc:AlternateContent xmlns:mc="http://schemas.openxmlformats.org/markup-compatibility/2006">
               <mc:Choice xmlns:v="urn:schemas-microsoft-com:vml" Requires="v">
-                <p:oleObj spid="_x0000_s1078" name="Equation" r:id="rId3" imgW="596880" imgH="457200" progId="Equation.DSMT4">
+                <p:oleObj spid="_x0000_s1113" name="Equation" r:id="rId3" imgW="596880" imgH="457200" progId="Equation.DSMT4">
                   <p:embed/>
                 </p:oleObj>
               </mc:Choice>
@@ -11161,6 +15142,141 @@
 </file>
 
 <file path=customXml/item1.xml><?xml version="1.0" encoding="utf-8"?>
+<p:properties xmlns:p="http://schemas.microsoft.com/office/2006/metadata/properties" xmlns:xsi="http://www.w3.org/2001/XMLSchema-instance" xmlns:pc="http://schemas.microsoft.com/office/infopath/2007/PartnerControls">
+  <documentManagement>
+    <APDescription xmlns="4873beb7-5857-4685-be1f-d57550cc96cc" xsi:nil="true"/>
+    <AssetExpire xmlns="4873beb7-5857-4685-be1f-d57550cc96cc">2029-01-01T08:00:00+00:00</AssetExpire>
+    <CampaignTagsTaxHTField0 xmlns="4873beb7-5857-4685-be1f-d57550cc96cc">
+      <Terms xmlns="http://schemas.microsoft.com/office/infopath/2007/PartnerControls"/>
+    </CampaignTagsTaxHTField0>
+    <IntlLangReviewDate xmlns="4873beb7-5857-4685-be1f-d57550cc96cc" xsi:nil="true"/>
+    <TPFriendlyName xmlns="4873beb7-5857-4685-be1f-d57550cc96cc" xsi:nil="true"/>
+    <IntlLangReview xmlns="4873beb7-5857-4685-be1f-d57550cc96cc">false</IntlLangReview>
+    <LocLastLocAttemptVersionLookup xmlns="4873beb7-5857-4685-be1f-d57550cc96cc">855024</LocLastLocAttemptVersionLookup>
+    <PolicheckWords xmlns="4873beb7-5857-4685-be1f-d57550cc96cc" xsi:nil="true"/>
+    <SubmitterId xmlns="4873beb7-5857-4685-be1f-d57550cc96cc" xsi:nil="true"/>
+    <AcquiredFrom xmlns="4873beb7-5857-4685-be1f-d57550cc96cc">Internal MS</AcquiredFrom>
+    <EditorialStatus xmlns="4873beb7-5857-4685-be1f-d57550cc96cc">Complete</EditorialStatus>
+    <Markets xmlns="4873beb7-5857-4685-be1f-d57550cc96cc"/>
+    <OriginAsset xmlns="4873beb7-5857-4685-be1f-d57550cc96cc" xsi:nil="true"/>
+    <AssetStart xmlns="4873beb7-5857-4685-be1f-d57550cc96cc">2012-08-31T08:50:00+00:00</AssetStart>
+    <FriendlyTitle xmlns="4873beb7-5857-4685-be1f-d57550cc96cc" xsi:nil="true"/>
+    <MarketSpecific xmlns="4873beb7-5857-4685-be1f-d57550cc96cc">false</MarketSpecific>
+    <TPNamespace xmlns="4873beb7-5857-4685-be1f-d57550cc96cc" xsi:nil="true"/>
+    <PublishStatusLookup xmlns="4873beb7-5857-4685-be1f-d57550cc96cc">
+      <Value>1616423</Value>
+    </PublishStatusLookup>
+    <APAuthor xmlns="4873beb7-5857-4685-be1f-d57550cc96cc">
+      <UserInfo>
+        <DisplayName>REDMOND\kristaa</DisplayName>
+        <AccountId>136</AccountId>
+        <AccountType/>
+      </UserInfo>
+    </APAuthor>
+    <TPCommandLine xmlns="4873beb7-5857-4685-be1f-d57550cc96cc" xsi:nil="true"/>
+    <IntlLangReviewer xmlns="4873beb7-5857-4685-be1f-d57550cc96cc" xsi:nil="true"/>
+    <OpenTemplate xmlns="4873beb7-5857-4685-be1f-d57550cc96cc">true</OpenTemplate>
+    <CSXSubmissionDate xmlns="4873beb7-5857-4685-be1f-d57550cc96cc" xsi:nil="true"/>
+    <TaxCatchAll xmlns="4873beb7-5857-4685-be1f-d57550cc96cc"/>
+    <Manager xmlns="4873beb7-5857-4685-be1f-d57550cc96cc" xsi:nil="true"/>
+    <NumericId xmlns="4873beb7-5857-4685-be1f-d57550cc96cc" xsi:nil="true"/>
+    <ParentAssetId xmlns="4873beb7-5857-4685-be1f-d57550cc96cc" xsi:nil="true"/>
+    <OriginalSourceMarket xmlns="4873beb7-5857-4685-be1f-d57550cc96cc" xsi:nil="true"/>
+    <ApprovalStatus xmlns="4873beb7-5857-4685-be1f-d57550cc96cc">InProgress</ApprovalStatus>
+    <TPComponent xmlns="4873beb7-5857-4685-be1f-d57550cc96cc" xsi:nil="true"/>
+    <EditorialTags xmlns="4873beb7-5857-4685-be1f-d57550cc96cc" xsi:nil="true"/>
+    <TPExecutable xmlns="4873beb7-5857-4685-be1f-d57550cc96cc" xsi:nil="true"/>
+    <TPLaunchHelpLink xmlns="4873beb7-5857-4685-be1f-d57550cc96cc" xsi:nil="true"/>
+    <LocComments xmlns="4873beb7-5857-4685-be1f-d57550cc96cc" xsi:nil="true"/>
+    <LocRecommendedHandoff xmlns="4873beb7-5857-4685-be1f-d57550cc96cc" xsi:nil="true"/>
+    <SourceTitle xmlns="4873beb7-5857-4685-be1f-d57550cc96cc" xsi:nil="true"/>
+    <CSXUpdate xmlns="4873beb7-5857-4685-be1f-d57550cc96cc">false</CSXUpdate>
+    <IntlLocPriority xmlns="4873beb7-5857-4685-be1f-d57550cc96cc" xsi:nil="true"/>
+    <UAProjectedTotalWords xmlns="4873beb7-5857-4685-be1f-d57550cc96cc" xsi:nil="true"/>
+    <AssetType xmlns="4873beb7-5857-4685-be1f-d57550cc96cc">TP</AssetType>
+    <MachineTranslated xmlns="4873beb7-5857-4685-be1f-d57550cc96cc">false</MachineTranslated>
+    <OutputCachingOn xmlns="4873beb7-5857-4685-be1f-d57550cc96cc">false</OutputCachingOn>
+    <TemplateStatus xmlns="4873beb7-5857-4685-be1f-d57550cc96cc">Complete</TemplateStatus>
+    <IsSearchable xmlns="4873beb7-5857-4685-be1f-d57550cc96cc">true</IsSearchable>
+    <ContentItem xmlns="4873beb7-5857-4685-be1f-d57550cc96cc" xsi:nil="true"/>
+    <HandoffToMSDN xmlns="4873beb7-5857-4685-be1f-d57550cc96cc" xsi:nil="true"/>
+    <ShowIn xmlns="4873beb7-5857-4685-be1f-d57550cc96cc">Show everywhere</ShowIn>
+    <ThumbnailAssetId xmlns="4873beb7-5857-4685-be1f-d57550cc96cc" xsi:nil="true"/>
+    <UALocComments xmlns="4873beb7-5857-4685-be1f-d57550cc96cc" xsi:nil="true"/>
+    <UALocRecommendation xmlns="4873beb7-5857-4685-be1f-d57550cc96cc">Localize</UALocRecommendation>
+    <LastModifiedDateTime xmlns="4873beb7-5857-4685-be1f-d57550cc96cc" xsi:nil="true"/>
+    <LegacyData xmlns="4873beb7-5857-4685-be1f-d57550cc96cc" xsi:nil="true"/>
+    <LocManualTestRequired xmlns="4873beb7-5857-4685-be1f-d57550cc96cc">false</LocManualTestRequired>
+    <LocMarketGroupTiers2 xmlns="4873beb7-5857-4685-be1f-d57550cc96cc" xsi:nil="true"/>
+    <ClipArtFilename xmlns="4873beb7-5857-4685-be1f-d57550cc96cc" xsi:nil="true"/>
+    <TPApplication xmlns="4873beb7-5857-4685-be1f-d57550cc96cc" xsi:nil="true"/>
+    <CSXHash xmlns="4873beb7-5857-4685-be1f-d57550cc96cc" xsi:nil="true"/>
+    <DirectSourceMarket xmlns="4873beb7-5857-4685-be1f-d57550cc96cc" xsi:nil="true"/>
+    <PrimaryImageGen xmlns="4873beb7-5857-4685-be1f-d57550cc96cc">true</PrimaryImageGen>
+    <PlannedPubDate xmlns="4873beb7-5857-4685-be1f-d57550cc96cc" xsi:nil="true"/>
+    <CSXSubmissionMarket xmlns="4873beb7-5857-4685-be1f-d57550cc96cc" xsi:nil="true"/>
+    <Downloads xmlns="4873beb7-5857-4685-be1f-d57550cc96cc">0</Downloads>
+    <ArtSampleDocs xmlns="4873beb7-5857-4685-be1f-d57550cc96cc" xsi:nil="true"/>
+    <TrustLevel xmlns="4873beb7-5857-4685-be1f-d57550cc96cc">1 Microsoft Managed Content</TrustLevel>
+    <BlockPublish xmlns="4873beb7-5857-4685-be1f-d57550cc96cc">false</BlockPublish>
+    <TPLaunchHelpLinkType xmlns="4873beb7-5857-4685-be1f-d57550cc96cc">Template</TPLaunchHelpLinkType>
+    <LocalizationTagsTaxHTField0 xmlns="4873beb7-5857-4685-be1f-d57550cc96cc">
+      <Terms xmlns="http://schemas.microsoft.com/office/infopath/2007/PartnerControls"/>
+    </LocalizationTagsTaxHTField0>
+    <BusinessGroup xmlns="4873beb7-5857-4685-be1f-d57550cc96cc" xsi:nil="true"/>
+    <Providers xmlns="4873beb7-5857-4685-be1f-d57550cc96cc" xsi:nil="true"/>
+    <TemplateTemplateType xmlns="4873beb7-5857-4685-be1f-d57550cc96cc">PowerPoint Presentation Template</TemplateTemplateType>
+    <TimesCloned xmlns="4873beb7-5857-4685-be1f-d57550cc96cc" xsi:nil="true"/>
+    <TPAppVersion xmlns="4873beb7-5857-4685-be1f-d57550cc96cc" xsi:nil="true"/>
+    <VoteCount xmlns="4873beb7-5857-4685-be1f-d57550cc96cc" xsi:nil="true"/>
+    <AverageRating xmlns="4873beb7-5857-4685-be1f-d57550cc96cc" xsi:nil="true"/>
+    <FeatureTagsTaxHTField0 xmlns="4873beb7-5857-4685-be1f-d57550cc96cc">
+      <Terms xmlns="http://schemas.microsoft.com/office/infopath/2007/PartnerControls"/>
+    </FeatureTagsTaxHTField0>
+    <Provider xmlns="4873beb7-5857-4685-be1f-d57550cc96cc" xsi:nil="true"/>
+    <UACurrentWords xmlns="4873beb7-5857-4685-be1f-d57550cc96cc" xsi:nil="true"/>
+    <AssetId xmlns="4873beb7-5857-4685-be1f-d57550cc96cc">TP103431361</AssetId>
+    <TPClientViewer xmlns="4873beb7-5857-4685-be1f-d57550cc96cc" xsi:nil="true"/>
+    <DSATActionTaken xmlns="4873beb7-5857-4685-be1f-d57550cc96cc" xsi:nil="true"/>
+    <APEditor xmlns="4873beb7-5857-4685-be1f-d57550cc96cc">
+      <UserInfo>
+        <DisplayName/>
+        <AccountId xsi:nil="true"/>
+        <AccountType/>
+      </UserInfo>
+    </APEditor>
+    <TPInstallLocation xmlns="4873beb7-5857-4685-be1f-d57550cc96cc" xsi:nil="true"/>
+    <OOCacheId xmlns="4873beb7-5857-4685-be1f-d57550cc96cc" xsi:nil="true"/>
+    <IsDeleted xmlns="4873beb7-5857-4685-be1f-d57550cc96cc">false</IsDeleted>
+    <PublishTargets xmlns="4873beb7-5857-4685-be1f-d57550cc96cc">OfficeOnlineVNext</PublishTargets>
+    <ApprovalLog xmlns="4873beb7-5857-4685-be1f-d57550cc96cc" xsi:nil="true"/>
+    <BugNumber xmlns="4873beb7-5857-4685-be1f-d57550cc96cc" xsi:nil="true"/>
+    <CrawlForDependencies xmlns="4873beb7-5857-4685-be1f-d57550cc96cc">false</CrawlForDependencies>
+    <InternalTagsTaxHTField0 xmlns="4873beb7-5857-4685-be1f-d57550cc96cc">
+      <Terms xmlns="http://schemas.microsoft.com/office/infopath/2007/PartnerControls"/>
+    </InternalTagsTaxHTField0>
+    <LastHandOff xmlns="4873beb7-5857-4685-be1f-d57550cc96cc" xsi:nil="true"/>
+    <Milestone xmlns="4873beb7-5857-4685-be1f-d57550cc96cc" xsi:nil="true"/>
+    <OriginalRelease xmlns="4873beb7-5857-4685-be1f-d57550cc96cc">15</OriginalRelease>
+    <RecommendationsModifier xmlns="4873beb7-5857-4685-be1f-d57550cc96cc" xsi:nil="true"/>
+    <ScenarioTagsTaxHTField0 xmlns="4873beb7-5857-4685-be1f-d57550cc96cc">
+      <Terms xmlns="http://schemas.microsoft.com/office/infopath/2007/PartnerControls"/>
+    </ScenarioTagsTaxHTField0>
+    <UANotes xmlns="4873beb7-5857-4685-be1f-d57550cc96cc" xsi:nil="true"/>
+  </documentManagement>
+</p:properties>
+</file>
+
+<file path=customXml/item2.xml><?xml version="1.0" encoding="utf-8"?>
+<?mso-contentType ?>
+<FormTemplates xmlns="http://schemas.microsoft.com/sharepoint/v3/contenttype/forms">
+  <Display>DocumentLibraryForm</Display>
+  <Edit>AssetEditForm</Edit>
+  <New>DocumentLibraryForm</New>
+</FormTemplates>
+</file>
+
+<file path=customXml/item3.xml><?xml version="1.0" encoding="utf-8"?>
 <ct:contentTypeSchema xmlns:ct="http://schemas.microsoft.com/office/2006/metadata/contentType" xmlns:ma="http://schemas.microsoft.com/office/2006/metadata/properties/metaAttributes" ct:_="" ma:_="" ma:contentTypeName="TemplateFile" ma:contentTypeID="0x0101006EDDDB5EE6D98C44930B742096920B300400F5B6D36B3EF94B4E9A635CDF2A18F5B8" ma:contentTypeVersion="72" ma:contentTypeDescription="Create a new document." ma:contentTypeScope="" ma:versionID="a23e56308344d904b51738559c3d67c9">
   <xsd:schema xmlns:xsd="http://www.w3.org/2001/XMLSchema" xmlns:xs="http://www.w3.org/2001/XMLSchema" xmlns:p="http://schemas.microsoft.com/office/2006/metadata/properties" xmlns:ns2="4873beb7-5857-4685-be1f-d57550cc96cc" targetNamespace="http://schemas.microsoft.com/office/2006/metadata/properties" ma:root="true" ma:fieldsID="cd0908cc4600e77bf5da051303e00c8d" ns2:_="">
     <xsd:import namespace="4873beb7-5857-4685-be1f-d57550cc96cc"/>
@@ -12200,142 +16316,31 @@
 </ct:contentTypeSchema>
 </file>
 
-<file path=customXml/item2.xml><?xml version="1.0" encoding="utf-8"?>
-<?mso-contentType ?>
-<FormTemplates xmlns="http://schemas.microsoft.com/sharepoint/v3/contenttype/forms">
-  <Display>DocumentLibraryForm</Display>
-  <Edit>AssetEditForm</Edit>
-  <New>DocumentLibraryForm</New>
-</FormTemplates>
+<file path=customXml/itemProps1.xml><?xml version="1.0" encoding="utf-8"?>
+<ds:datastoreItem xmlns:ds="http://schemas.openxmlformats.org/officeDocument/2006/customXml" ds:itemID="{8CDDBB83-77C1-4099-A0AA-289882E745E2}">
+  <ds:schemaRefs>
+    <ds:schemaRef ds:uri="http://purl.org/dc/terms/"/>
+    <ds:schemaRef ds:uri="http://purl.org/dc/dcmitype/"/>
+    <ds:schemaRef ds:uri="http://www.w3.org/XML/1998/namespace"/>
+    <ds:schemaRef ds:uri="http://purl.org/dc/elements/1.1/"/>
+    <ds:schemaRef ds:uri="http://schemas.microsoft.com/office/infopath/2007/PartnerControls"/>
+    <ds:schemaRef ds:uri="http://schemas.microsoft.com/office/2006/documentManagement/types"/>
+    <ds:schemaRef ds:uri="http://schemas.openxmlformats.org/package/2006/metadata/core-properties"/>
+    <ds:schemaRef ds:uri="4873beb7-5857-4685-be1f-d57550cc96cc"/>
+    <ds:schemaRef ds:uri="http://schemas.microsoft.com/office/2006/metadata/properties"/>
+  </ds:schemaRefs>
+</ds:datastoreItem>
 </file>
 
-<file path=customXml/item3.xml><?xml version="1.0" encoding="utf-8"?>
-<p:properties xmlns:p="http://schemas.microsoft.com/office/2006/metadata/properties" xmlns:xsi="http://www.w3.org/2001/XMLSchema-instance" xmlns:pc="http://schemas.microsoft.com/office/infopath/2007/PartnerControls">
-  <documentManagement>
-    <APDescription xmlns="4873beb7-5857-4685-be1f-d57550cc96cc" xsi:nil="true"/>
-    <AssetExpire xmlns="4873beb7-5857-4685-be1f-d57550cc96cc">2029-01-01T08:00:00+00:00</AssetExpire>
-    <CampaignTagsTaxHTField0 xmlns="4873beb7-5857-4685-be1f-d57550cc96cc">
-      <Terms xmlns="http://schemas.microsoft.com/office/infopath/2007/PartnerControls"/>
-    </CampaignTagsTaxHTField0>
-    <IntlLangReviewDate xmlns="4873beb7-5857-4685-be1f-d57550cc96cc" xsi:nil="true"/>
-    <TPFriendlyName xmlns="4873beb7-5857-4685-be1f-d57550cc96cc" xsi:nil="true"/>
-    <IntlLangReview xmlns="4873beb7-5857-4685-be1f-d57550cc96cc">false</IntlLangReview>
-    <LocLastLocAttemptVersionLookup xmlns="4873beb7-5857-4685-be1f-d57550cc96cc">855024</LocLastLocAttemptVersionLookup>
-    <PolicheckWords xmlns="4873beb7-5857-4685-be1f-d57550cc96cc" xsi:nil="true"/>
-    <SubmitterId xmlns="4873beb7-5857-4685-be1f-d57550cc96cc" xsi:nil="true"/>
-    <AcquiredFrom xmlns="4873beb7-5857-4685-be1f-d57550cc96cc">Internal MS</AcquiredFrom>
-    <EditorialStatus xmlns="4873beb7-5857-4685-be1f-d57550cc96cc">Complete</EditorialStatus>
-    <Markets xmlns="4873beb7-5857-4685-be1f-d57550cc96cc"/>
-    <OriginAsset xmlns="4873beb7-5857-4685-be1f-d57550cc96cc" xsi:nil="true"/>
-    <AssetStart xmlns="4873beb7-5857-4685-be1f-d57550cc96cc">2012-08-31T08:50:00+00:00</AssetStart>
-    <FriendlyTitle xmlns="4873beb7-5857-4685-be1f-d57550cc96cc" xsi:nil="true"/>
-    <MarketSpecific xmlns="4873beb7-5857-4685-be1f-d57550cc96cc">false</MarketSpecific>
-    <TPNamespace xmlns="4873beb7-5857-4685-be1f-d57550cc96cc" xsi:nil="true"/>
-    <PublishStatusLookup xmlns="4873beb7-5857-4685-be1f-d57550cc96cc">
-      <Value>1616423</Value>
-    </PublishStatusLookup>
-    <APAuthor xmlns="4873beb7-5857-4685-be1f-d57550cc96cc">
-      <UserInfo>
-        <DisplayName>REDMOND\kristaa</DisplayName>
-        <AccountId>136</AccountId>
-        <AccountType/>
-      </UserInfo>
-    </APAuthor>
-    <TPCommandLine xmlns="4873beb7-5857-4685-be1f-d57550cc96cc" xsi:nil="true"/>
-    <IntlLangReviewer xmlns="4873beb7-5857-4685-be1f-d57550cc96cc" xsi:nil="true"/>
-    <OpenTemplate xmlns="4873beb7-5857-4685-be1f-d57550cc96cc">true</OpenTemplate>
-    <CSXSubmissionDate xmlns="4873beb7-5857-4685-be1f-d57550cc96cc" xsi:nil="true"/>
-    <TaxCatchAll xmlns="4873beb7-5857-4685-be1f-d57550cc96cc"/>
-    <Manager xmlns="4873beb7-5857-4685-be1f-d57550cc96cc" xsi:nil="true"/>
-    <NumericId xmlns="4873beb7-5857-4685-be1f-d57550cc96cc" xsi:nil="true"/>
-    <ParentAssetId xmlns="4873beb7-5857-4685-be1f-d57550cc96cc" xsi:nil="true"/>
-    <OriginalSourceMarket xmlns="4873beb7-5857-4685-be1f-d57550cc96cc" xsi:nil="true"/>
-    <ApprovalStatus xmlns="4873beb7-5857-4685-be1f-d57550cc96cc">InProgress</ApprovalStatus>
-    <TPComponent xmlns="4873beb7-5857-4685-be1f-d57550cc96cc" xsi:nil="true"/>
-    <EditorialTags xmlns="4873beb7-5857-4685-be1f-d57550cc96cc" xsi:nil="true"/>
-    <TPExecutable xmlns="4873beb7-5857-4685-be1f-d57550cc96cc" xsi:nil="true"/>
-    <TPLaunchHelpLink xmlns="4873beb7-5857-4685-be1f-d57550cc96cc" xsi:nil="true"/>
-    <LocComments xmlns="4873beb7-5857-4685-be1f-d57550cc96cc" xsi:nil="true"/>
-    <LocRecommendedHandoff xmlns="4873beb7-5857-4685-be1f-d57550cc96cc" xsi:nil="true"/>
-    <SourceTitle xmlns="4873beb7-5857-4685-be1f-d57550cc96cc" xsi:nil="true"/>
-    <CSXUpdate xmlns="4873beb7-5857-4685-be1f-d57550cc96cc">false</CSXUpdate>
-    <IntlLocPriority xmlns="4873beb7-5857-4685-be1f-d57550cc96cc" xsi:nil="true"/>
-    <UAProjectedTotalWords xmlns="4873beb7-5857-4685-be1f-d57550cc96cc" xsi:nil="true"/>
-    <AssetType xmlns="4873beb7-5857-4685-be1f-d57550cc96cc">TP</AssetType>
-    <MachineTranslated xmlns="4873beb7-5857-4685-be1f-d57550cc96cc">false</MachineTranslated>
-    <OutputCachingOn xmlns="4873beb7-5857-4685-be1f-d57550cc96cc">false</OutputCachingOn>
-    <TemplateStatus xmlns="4873beb7-5857-4685-be1f-d57550cc96cc">Complete</TemplateStatus>
-    <IsSearchable xmlns="4873beb7-5857-4685-be1f-d57550cc96cc">true</IsSearchable>
-    <ContentItem xmlns="4873beb7-5857-4685-be1f-d57550cc96cc" xsi:nil="true"/>
-    <HandoffToMSDN xmlns="4873beb7-5857-4685-be1f-d57550cc96cc" xsi:nil="true"/>
-    <ShowIn xmlns="4873beb7-5857-4685-be1f-d57550cc96cc">Show everywhere</ShowIn>
-    <ThumbnailAssetId xmlns="4873beb7-5857-4685-be1f-d57550cc96cc" xsi:nil="true"/>
-    <UALocComments xmlns="4873beb7-5857-4685-be1f-d57550cc96cc" xsi:nil="true"/>
-    <UALocRecommendation xmlns="4873beb7-5857-4685-be1f-d57550cc96cc">Localize</UALocRecommendation>
-    <LastModifiedDateTime xmlns="4873beb7-5857-4685-be1f-d57550cc96cc" xsi:nil="true"/>
-    <LegacyData xmlns="4873beb7-5857-4685-be1f-d57550cc96cc" xsi:nil="true"/>
-    <LocManualTestRequired xmlns="4873beb7-5857-4685-be1f-d57550cc96cc">false</LocManualTestRequired>
-    <LocMarketGroupTiers2 xmlns="4873beb7-5857-4685-be1f-d57550cc96cc" xsi:nil="true"/>
-    <ClipArtFilename xmlns="4873beb7-5857-4685-be1f-d57550cc96cc" xsi:nil="true"/>
-    <TPApplication xmlns="4873beb7-5857-4685-be1f-d57550cc96cc" xsi:nil="true"/>
-    <CSXHash xmlns="4873beb7-5857-4685-be1f-d57550cc96cc" xsi:nil="true"/>
-    <DirectSourceMarket xmlns="4873beb7-5857-4685-be1f-d57550cc96cc" xsi:nil="true"/>
-    <PrimaryImageGen xmlns="4873beb7-5857-4685-be1f-d57550cc96cc">true</PrimaryImageGen>
-    <PlannedPubDate xmlns="4873beb7-5857-4685-be1f-d57550cc96cc" xsi:nil="true"/>
-    <CSXSubmissionMarket xmlns="4873beb7-5857-4685-be1f-d57550cc96cc" xsi:nil="true"/>
-    <Downloads xmlns="4873beb7-5857-4685-be1f-d57550cc96cc">0</Downloads>
-    <ArtSampleDocs xmlns="4873beb7-5857-4685-be1f-d57550cc96cc" xsi:nil="true"/>
-    <TrustLevel xmlns="4873beb7-5857-4685-be1f-d57550cc96cc">1 Microsoft Managed Content</TrustLevel>
-    <BlockPublish xmlns="4873beb7-5857-4685-be1f-d57550cc96cc">false</BlockPublish>
-    <TPLaunchHelpLinkType xmlns="4873beb7-5857-4685-be1f-d57550cc96cc">Template</TPLaunchHelpLinkType>
-    <LocalizationTagsTaxHTField0 xmlns="4873beb7-5857-4685-be1f-d57550cc96cc">
-      <Terms xmlns="http://schemas.microsoft.com/office/infopath/2007/PartnerControls"/>
-    </LocalizationTagsTaxHTField0>
-    <BusinessGroup xmlns="4873beb7-5857-4685-be1f-d57550cc96cc" xsi:nil="true"/>
-    <Providers xmlns="4873beb7-5857-4685-be1f-d57550cc96cc" xsi:nil="true"/>
-    <TemplateTemplateType xmlns="4873beb7-5857-4685-be1f-d57550cc96cc">PowerPoint Presentation Template</TemplateTemplateType>
-    <TimesCloned xmlns="4873beb7-5857-4685-be1f-d57550cc96cc" xsi:nil="true"/>
-    <TPAppVersion xmlns="4873beb7-5857-4685-be1f-d57550cc96cc" xsi:nil="true"/>
-    <VoteCount xmlns="4873beb7-5857-4685-be1f-d57550cc96cc" xsi:nil="true"/>
-    <AverageRating xmlns="4873beb7-5857-4685-be1f-d57550cc96cc" xsi:nil="true"/>
-    <FeatureTagsTaxHTField0 xmlns="4873beb7-5857-4685-be1f-d57550cc96cc">
-      <Terms xmlns="http://schemas.microsoft.com/office/infopath/2007/PartnerControls"/>
-    </FeatureTagsTaxHTField0>
-    <Provider xmlns="4873beb7-5857-4685-be1f-d57550cc96cc" xsi:nil="true"/>
-    <UACurrentWords xmlns="4873beb7-5857-4685-be1f-d57550cc96cc" xsi:nil="true"/>
-    <AssetId xmlns="4873beb7-5857-4685-be1f-d57550cc96cc">TP103431361</AssetId>
-    <TPClientViewer xmlns="4873beb7-5857-4685-be1f-d57550cc96cc" xsi:nil="true"/>
-    <DSATActionTaken xmlns="4873beb7-5857-4685-be1f-d57550cc96cc" xsi:nil="true"/>
-    <APEditor xmlns="4873beb7-5857-4685-be1f-d57550cc96cc">
-      <UserInfo>
-        <DisplayName/>
-        <AccountId xsi:nil="true"/>
-        <AccountType/>
-      </UserInfo>
-    </APEditor>
-    <TPInstallLocation xmlns="4873beb7-5857-4685-be1f-d57550cc96cc" xsi:nil="true"/>
-    <OOCacheId xmlns="4873beb7-5857-4685-be1f-d57550cc96cc" xsi:nil="true"/>
-    <IsDeleted xmlns="4873beb7-5857-4685-be1f-d57550cc96cc">false</IsDeleted>
-    <PublishTargets xmlns="4873beb7-5857-4685-be1f-d57550cc96cc">OfficeOnlineVNext</PublishTargets>
-    <ApprovalLog xmlns="4873beb7-5857-4685-be1f-d57550cc96cc" xsi:nil="true"/>
-    <BugNumber xmlns="4873beb7-5857-4685-be1f-d57550cc96cc" xsi:nil="true"/>
-    <CrawlForDependencies xmlns="4873beb7-5857-4685-be1f-d57550cc96cc">false</CrawlForDependencies>
-    <InternalTagsTaxHTField0 xmlns="4873beb7-5857-4685-be1f-d57550cc96cc">
-      <Terms xmlns="http://schemas.microsoft.com/office/infopath/2007/PartnerControls"/>
-    </InternalTagsTaxHTField0>
-    <LastHandOff xmlns="4873beb7-5857-4685-be1f-d57550cc96cc" xsi:nil="true"/>
-    <Milestone xmlns="4873beb7-5857-4685-be1f-d57550cc96cc" xsi:nil="true"/>
-    <OriginalRelease xmlns="4873beb7-5857-4685-be1f-d57550cc96cc">15</OriginalRelease>
-    <RecommendationsModifier xmlns="4873beb7-5857-4685-be1f-d57550cc96cc" xsi:nil="true"/>
-    <ScenarioTagsTaxHTField0 xmlns="4873beb7-5857-4685-be1f-d57550cc96cc">
-      <Terms xmlns="http://schemas.microsoft.com/office/infopath/2007/PartnerControls"/>
-    </ScenarioTagsTaxHTField0>
-    <UANotes xmlns="4873beb7-5857-4685-be1f-d57550cc96cc" xsi:nil="true"/>
-  </documentManagement>
-</p:properties>
+<file path=customXml/itemProps2.xml><?xml version="1.0" encoding="utf-8"?>
+<ds:datastoreItem xmlns:ds="http://schemas.openxmlformats.org/officeDocument/2006/customXml" ds:itemID="{561E720F-F05D-4536-9C34-0CFCED65D3B7}">
+  <ds:schemaRefs>
+    <ds:schemaRef ds:uri="http://schemas.microsoft.com/sharepoint/v3/contenttype/forms"/>
+  </ds:schemaRefs>
+</ds:datastoreItem>
 </file>
 
-<file path=customXml/itemProps1.xml><?xml version="1.0" encoding="utf-8"?>
+<file path=customXml/itemProps3.xml><?xml version="1.0" encoding="utf-8"?>
 <ds:datastoreItem xmlns:ds="http://schemas.openxmlformats.org/officeDocument/2006/customXml" ds:itemID="{28C8B9CA-0273-4370-889A-FC05DA5C2FA5}">
   <ds:schemaRefs>
     <ds:schemaRef ds:uri="http://schemas.microsoft.com/office/2006/metadata/contentType"/>
@@ -12351,28 +16356,4 @@
     <ds:schemaRef ds:uri="http://schemas.microsoft.com/internal/obd"/>
   </ds:schemaRefs>
 </ds:datastoreItem>
-</file>
-
-<file path=customXml/itemProps2.xml><?xml version="1.0" encoding="utf-8"?>
-<ds:datastoreItem xmlns:ds="http://schemas.openxmlformats.org/officeDocument/2006/customXml" ds:itemID="{561E720F-F05D-4536-9C34-0CFCED65D3B7}">
-  <ds:schemaRefs>
-    <ds:schemaRef ds:uri="http://schemas.microsoft.com/sharepoint/v3/contenttype/forms"/>
-  </ds:schemaRefs>
-</ds:datastoreItem>
-</file>
-
-<file path=customXml/itemProps3.xml><?xml version="1.0" encoding="utf-8"?>
-<ds:datastoreItem xmlns:ds="http://schemas.openxmlformats.org/officeDocument/2006/customXml" ds:itemID="{8CDDBB83-77C1-4099-A0AA-289882E745E2}">
-  <ds:schemaRefs>
-    <ds:schemaRef ds:uri="http://purl.org/dc/terms/"/>
-    <ds:schemaRef ds:uri="http://purl.org/dc/dcmitype/"/>
-    <ds:schemaRef ds:uri="http://www.w3.org/XML/1998/namespace"/>
-    <ds:schemaRef ds:uri="http://purl.org/dc/elements/1.1/"/>
-    <ds:schemaRef ds:uri="http://schemas.microsoft.com/office/infopath/2007/PartnerControls"/>
-    <ds:schemaRef ds:uri="http://schemas.microsoft.com/office/2006/documentManagement/types"/>
-    <ds:schemaRef ds:uri="http://schemas.openxmlformats.org/package/2006/metadata/core-properties"/>
-    <ds:schemaRef ds:uri="4873beb7-5857-4685-be1f-d57550cc96cc"/>
-    <ds:schemaRef ds:uri="http://schemas.microsoft.com/office/2006/metadata/properties"/>
-  </ds:schemaRefs>
-</ds:datastoreItem>
 </file>
</xml_diff>